<commit_message>
adding screenshots to presentation
</commit_message>
<xml_diff>
--- a/agile2011/presentation.pptx
+++ b/agile2011/presentation.pptx
@@ -6,7 +6,7 @@
     <p:sldMasterId id="2147483660" r:id="rId2"/>
   </p:sldMasterIdLst>
   <p:notesMasterIdLst>
-    <p:notesMasterId r:id="rId22"/>
+    <p:notesMasterId r:id="rId21"/>
   </p:notesMasterIdLst>
   <p:sldIdLst>
     <p:sldId id="257" r:id="rId3"/>
@@ -21,13 +21,12 @@
     <p:sldId id="266" r:id="rId12"/>
     <p:sldId id="267" r:id="rId13"/>
     <p:sldId id="268" r:id="rId14"/>
-    <p:sldId id="269" r:id="rId15"/>
-    <p:sldId id="270" r:id="rId16"/>
-    <p:sldId id="271" r:id="rId17"/>
-    <p:sldId id="272" r:id="rId18"/>
-    <p:sldId id="273" r:id="rId19"/>
-    <p:sldId id="274" r:id="rId20"/>
-    <p:sldId id="275" r:id="rId21"/>
+    <p:sldId id="270" r:id="rId15"/>
+    <p:sldId id="271" r:id="rId16"/>
+    <p:sldId id="272" r:id="rId17"/>
+    <p:sldId id="273" r:id="rId18"/>
+    <p:sldId id="274" r:id="rId19"/>
+    <p:sldId id="275" r:id="rId20"/>
   </p:sldIdLst>
   <p:sldSz cx="9144000" cy="6858000" type="screen4x3"/>
   <p:notesSz cx="6858000" cy="9144000"/>
@@ -7430,6 +7429,10 @@
               <a:buFont typeface="Arial" pitchFamily="34" charset="0"/>
               <a:buNone/>
             </a:pPr>
+            <a:r>
+              <a:rPr lang="en-US" dirty="0" err="1" smtClean="0"/>
+              <a:t>Mspec</a:t>
+            </a:r>
             <a:endParaRPr lang="en-US" dirty="0"/>
           </a:p>
         </p:txBody>
@@ -7690,6 +7693,44 @@
               <a:rPr lang="en-US" dirty="0" err="1" smtClean="0"/>
               <a:t>SoC</a:t>
             </a:r>
+            <a:endParaRPr lang="en-US" dirty="0" smtClean="0"/>
+          </a:p>
+          <a:p>
+            <a:pPr marL="0" indent="0">
+              <a:buNone/>
+            </a:pPr>
+            <a:r>
+              <a:rPr lang="en-US" dirty="0" smtClean="0"/>
+              <a:t>1 regular </a:t>
+            </a:r>
+            <a:r>
+              <a:rPr lang="en-US" dirty="0" err="1" smtClean="0"/>
+              <a:t>mbunit</a:t>
+            </a:r>
+            <a:endParaRPr lang="en-US" dirty="0" smtClean="0"/>
+          </a:p>
+          <a:p>
+            <a:pPr marL="0" indent="0">
+              <a:buNone/>
+            </a:pPr>
+            <a:r>
+              <a:rPr lang="en-US" dirty="0" err="1" smtClean="0"/>
+              <a:t>Vs</a:t>
+            </a:r>
+            <a:endParaRPr lang="en-US" dirty="0" smtClean="0"/>
+          </a:p>
+          <a:p>
+            <a:pPr marL="0" indent="0">
+              <a:buNone/>
+            </a:pPr>
+            <a:r>
+              <a:rPr lang="en-US" dirty="0" smtClean="0"/>
+              <a:t>F+R+S in </a:t>
+            </a:r>
+            <a:r>
+              <a:rPr lang="en-US" dirty="0" err="1" smtClean="0"/>
+              <a:t>Rac</a:t>
+            </a:r>
             <a:endParaRPr lang="en-US" dirty="0"/>
           </a:p>
         </p:txBody>
@@ -7956,6 +7997,33 @@
             </a:r>
             <a:endParaRPr lang="en-US" dirty="0"/>
           </a:p>
+          <a:p>
+            <a:pPr marL="0" indent="0">
+              <a:buNone/>
+            </a:pPr>
+            <a:r>
+              <a:rPr lang="en-US" dirty="0" smtClean="0"/>
+              <a:t>2 test looking like each other</a:t>
+            </a:r>
+          </a:p>
+          <a:p>
+            <a:pPr marL="0" indent="0">
+              <a:buNone/>
+            </a:pPr>
+            <a:r>
+              <a:rPr lang="en-US" dirty="0" smtClean="0"/>
+              <a:t>1 </a:t>
+            </a:r>
+            <a:r>
+              <a:rPr lang="en-US" dirty="0" err="1" smtClean="0"/>
+              <a:t>rac</a:t>
+            </a:r>
+            <a:r>
+              <a:rPr lang="en-US" dirty="0" smtClean="0"/>
+              <a:t> test</a:t>
+            </a:r>
+            <a:endParaRPr lang="en-US" dirty="0"/>
+          </a:p>
         </p:txBody>
       </p:sp>
     </p:spTree>
@@ -8012,8 +8080,8 @@
               <a:t> - </a:t>
             </a:r>
             <a:r>
-              <a:rPr lang="en-US" dirty="0" err="1"/>
-              <a:t>xUnit</a:t>
+              <a:rPr lang="en-US" dirty="0" smtClean="0"/>
+              <a:t>AT</a:t>
             </a:r>
             <a:endParaRPr lang="en-US" dirty="0"/>
           </a:p>
@@ -8216,7 +8284,16 @@
           <a:p>
             <a:r>
               <a:rPr lang="en-US" dirty="0" smtClean="0"/>
-              <a:t>External DSL</a:t>
+              <a:t>IDE</a:t>
+            </a:r>
+          </a:p>
+          <a:p>
+            <a:pPr marL="0" indent="0">
+              <a:buNone/>
+            </a:pPr>
+            <a:r>
+              <a:rPr lang="en-US" dirty="0" err="1" smtClean="0"/>
+              <a:t>Featu|Step</a:t>
             </a:r>
             <a:endParaRPr lang="en-US" dirty="0"/>
           </a:p>
@@ -8225,7 +8302,7 @@
     </p:spTree>
     <p:extLst>
       <p:ext uri="{BB962C8B-B14F-4D97-AF65-F5344CB8AC3E}">
-        <p14:creationId xmlns:p14="http://schemas.microsoft.com/office/powerpoint/2010/main" val="1805086443"/>
+        <p14:creationId xmlns:p14="http://schemas.microsoft.com/office/powerpoint/2010/main" val="246938362"/>
       </p:ext>
     </p:extLst>
   </p:cSld>
@@ -8480,7 +8557,16 @@
           <a:p>
             <a:r>
               <a:rPr lang="en-US" dirty="0" smtClean="0"/>
-              <a:t>IDE</a:t>
+              <a:t>Flow</a:t>
+            </a:r>
+          </a:p>
+          <a:p>
+            <a:pPr marL="0" indent="0">
+              <a:buNone/>
+            </a:pPr>
+            <a:r>
+              <a:rPr lang="en-US" dirty="0" smtClean="0"/>
+              <a:t>F+R+S</a:t>
             </a:r>
             <a:endParaRPr lang="en-US" dirty="0"/>
           </a:p>
@@ -8489,7 +8575,7 @@
     </p:spTree>
     <p:extLst>
       <p:ext uri="{BB962C8B-B14F-4D97-AF65-F5344CB8AC3E}">
-        <p14:creationId xmlns:p14="http://schemas.microsoft.com/office/powerpoint/2010/main" val="246938362"/>
+        <p14:creationId xmlns:p14="http://schemas.microsoft.com/office/powerpoint/2010/main" val="1500072901"/>
       </p:ext>
     </p:extLst>
   </p:cSld>
@@ -8744,7 +8830,16 @@
           <a:p>
             <a:r>
               <a:rPr lang="en-US" dirty="0" smtClean="0"/>
-              <a:t>Flow</a:t>
+              <a:t>Organization</a:t>
+            </a:r>
+          </a:p>
+          <a:p>
+            <a:pPr marL="0" indent="0">
+              <a:buNone/>
+            </a:pPr>
+            <a:r>
+              <a:rPr lang="en-US" dirty="0" smtClean="0"/>
+              <a:t>Sol Explorer | Alt+f7</a:t>
             </a:r>
             <a:endParaRPr lang="en-US" dirty="0"/>
           </a:p>
@@ -9008,7 +9103,20 @@
           <a:p>
             <a:r>
               <a:rPr lang="en-US" dirty="0" smtClean="0"/>
-              <a:t>Organization</a:t>
+              <a:t>Keep language</a:t>
+            </a:r>
+          </a:p>
+          <a:p>
+            <a:pPr marL="0" indent="0">
+              <a:buNone/>
+            </a:pPr>
+            <a:r>
+              <a:rPr lang="en-US" dirty="0" smtClean="0"/>
+              <a:t>Feature with using and comments, multiline </a:t>
+            </a:r>
+            <a:r>
+              <a:rPr lang="en-US" dirty="0" err="1" smtClean="0"/>
+              <a:t>args</a:t>
             </a:r>
             <a:endParaRPr lang="en-US" dirty="0"/>
           </a:p>
@@ -9028,270 +9136,6 @@
 </file>
 
 <file path=ppt/slides/slide17.xml><?xml version="1.0" encoding="utf-8"?>
-<p:sld xmlns:a="http://schemas.openxmlformats.org/drawingml/2006/main" xmlns:r="http://schemas.openxmlformats.org/officeDocument/2006/relationships" xmlns:p="http://schemas.openxmlformats.org/presentationml/2006/main">
-  <p:cSld>
-    <p:spTree>
-      <p:nvGrpSpPr>
-        <p:cNvPr id="1" name=""/>
-        <p:cNvGrpSpPr/>
-        <p:nvPr/>
-      </p:nvGrpSpPr>
-      <p:grpSpPr>
-        <a:xfrm>
-          <a:off x="0" y="0"/>
-          <a:ext cx="0" cy="0"/>
-          <a:chOff x="0" y="0"/>
-          <a:chExt cx="0" cy="0"/>
-        </a:xfrm>
-      </p:grpSpPr>
-      <p:sp>
-        <p:nvSpPr>
-          <p:cNvPr id="3" name="Title 2"/>
-          <p:cNvSpPr>
-            <a:spLocks noGrp="1"/>
-          </p:cNvSpPr>
-          <p:nvPr>
-            <p:ph type="title"/>
-          </p:nvPr>
-        </p:nvSpPr>
-        <p:spPr/>
-        <p:txBody>
-          <a:bodyPr/>
-          <a:lstStyle/>
-          <a:p>
-            <a:r>
-              <a:rPr lang="en-US" dirty="0" smtClean="0"/>
-              <a:t>Developer</a:t>
-            </a:r>
-            <a:r>
-              <a:rPr lang="en-US" dirty="0"/>
-              <a:t> - </a:t>
-            </a:r>
-            <a:r>
-              <a:rPr lang="en-US" dirty="0" smtClean="0"/>
-              <a:t>AT</a:t>
-            </a:r>
-            <a:endParaRPr lang="en-US" dirty="0"/>
-          </a:p>
-        </p:txBody>
-      </p:sp>
-      <p:sp>
-        <p:nvSpPr>
-          <p:cNvPr id="2" name="Slide Number Placeholder 1"/>
-          <p:cNvSpPr>
-            <a:spLocks noGrp="1"/>
-          </p:cNvSpPr>
-          <p:nvPr>
-            <p:ph type="sldNum" sz="quarter" idx="12"/>
-          </p:nvPr>
-        </p:nvSpPr>
-        <p:spPr/>
-        <p:txBody>
-          <a:bodyPr/>
-          <a:lstStyle/>
-          <a:p>
-            <a:fld id="{B6F15528-21DE-4FAA-801E-634DDDAF4B2B}" type="slidenum">
-              <a:rPr lang="en-US" smtClean="0">
-                <a:solidFill>
-                  <a:prstClr val="black">
-                    <a:tint val="75000"/>
-                  </a:prstClr>
-                </a:solidFill>
-              </a:rPr>
-              <a:pPr/>
-              <a:t>17</a:t>
-            </a:fld>
-            <a:endParaRPr lang="en-US">
-              <a:solidFill>
-                <a:prstClr val="black">
-                  <a:tint val="75000"/>
-                </a:prstClr>
-              </a:solidFill>
-            </a:endParaRPr>
-          </a:p>
-        </p:txBody>
-      </p:sp>
-      <p:sp>
-        <p:nvSpPr>
-          <p:cNvPr id="5" name="Content Placeholder 3"/>
-          <p:cNvSpPr txBox="1">
-            <a:spLocks/>
-          </p:cNvSpPr>
-          <p:nvPr/>
-        </p:nvSpPr>
-        <p:spPr>
-          <a:xfrm>
-            <a:off x="609600" y="1752600"/>
-            <a:ext cx="8229600" cy="4525963"/>
-          </a:xfrm>
-          <a:prstGeom prst="rect">
-            <a:avLst/>
-          </a:prstGeom>
-        </p:spPr>
-        <p:txBody>
-          <a:bodyPr vert="horz" lIns="91440" tIns="45720" rIns="91440" bIns="45720" rtlCol="0">
-            <a:normAutofit/>
-          </a:bodyPr>
-          <a:lstStyle>
-            <a:lvl1pPr marL="342900" indent="-342900" algn="l" defTabSz="914400" rtl="0" eaLnBrk="1" latinLnBrk="0" hangingPunct="1">
-              <a:spcBef>
-                <a:spcPct val="20000"/>
-              </a:spcBef>
-              <a:buFont typeface="Arial" pitchFamily="34" charset="0"/>
-              <a:buChar char="•"/>
-              <a:defRPr sz="3200" kern="1200">
-                <a:solidFill>
-                  <a:schemeClr val="tx1"/>
-                </a:solidFill>
-                <a:latin typeface="+mn-lt"/>
-                <a:ea typeface="+mn-ea"/>
-                <a:cs typeface="+mn-cs"/>
-              </a:defRPr>
-            </a:lvl1pPr>
-            <a:lvl2pPr marL="742950" indent="-285750" algn="l" defTabSz="914400" rtl="0" eaLnBrk="1" latinLnBrk="0" hangingPunct="1">
-              <a:spcBef>
-                <a:spcPct val="20000"/>
-              </a:spcBef>
-              <a:buFont typeface="Arial" pitchFamily="34" charset="0"/>
-              <a:buChar char="–"/>
-              <a:defRPr sz="2800" kern="1200">
-                <a:solidFill>
-                  <a:schemeClr val="tx1"/>
-                </a:solidFill>
-                <a:latin typeface="+mn-lt"/>
-                <a:ea typeface="+mn-ea"/>
-                <a:cs typeface="+mn-cs"/>
-              </a:defRPr>
-            </a:lvl2pPr>
-            <a:lvl3pPr marL="1143000" indent="-228600" algn="l" defTabSz="914400" rtl="0" eaLnBrk="1" latinLnBrk="0" hangingPunct="1">
-              <a:spcBef>
-                <a:spcPct val="20000"/>
-              </a:spcBef>
-              <a:buFont typeface="Arial" pitchFamily="34" charset="0"/>
-              <a:buChar char="•"/>
-              <a:defRPr sz="2400" kern="1200">
-                <a:solidFill>
-                  <a:schemeClr val="tx1"/>
-                </a:solidFill>
-                <a:latin typeface="+mn-lt"/>
-                <a:ea typeface="+mn-ea"/>
-                <a:cs typeface="+mn-cs"/>
-              </a:defRPr>
-            </a:lvl3pPr>
-            <a:lvl4pPr marL="1600200" indent="-228600" algn="l" defTabSz="914400" rtl="0" eaLnBrk="1" latinLnBrk="0" hangingPunct="1">
-              <a:spcBef>
-                <a:spcPct val="20000"/>
-              </a:spcBef>
-              <a:buFont typeface="Arial" pitchFamily="34" charset="0"/>
-              <a:buChar char="–"/>
-              <a:defRPr sz="2000" kern="1200">
-                <a:solidFill>
-                  <a:schemeClr val="tx1"/>
-                </a:solidFill>
-                <a:latin typeface="+mn-lt"/>
-                <a:ea typeface="+mn-ea"/>
-                <a:cs typeface="+mn-cs"/>
-              </a:defRPr>
-            </a:lvl4pPr>
-            <a:lvl5pPr marL="2057400" indent="-228600" algn="l" defTabSz="914400" rtl="0" eaLnBrk="1" latinLnBrk="0" hangingPunct="1">
-              <a:spcBef>
-                <a:spcPct val="20000"/>
-              </a:spcBef>
-              <a:buFont typeface="Arial" pitchFamily="34" charset="0"/>
-              <a:buChar char="»"/>
-              <a:defRPr sz="2000" kern="1200">
-                <a:solidFill>
-                  <a:schemeClr val="tx1"/>
-                </a:solidFill>
-                <a:latin typeface="+mn-lt"/>
-                <a:ea typeface="+mn-ea"/>
-                <a:cs typeface="+mn-cs"/>
-              </a:defRPr>
-            </a:lvl5pPr>
-            <a:lvl6pPr marL="2514600" indent="-228600" algn="l" defTabSz="914400" rtl="0" eaLnBrk="1" latinLnBrk="0" hangingPunct="1">
-              <a:spcBef>
-                <a:spcPct val="20000"/>
-              </a:spcBef>
-              <a:buFont typeface="Arial" pitchFamily="34" charset="0"/>
-              <a:buChar char="•"/>
-              <a:defRPr sz="2000" kern="1200">
-                <a:solidFill>
-                  <a:schemeClr val="tx1"/>
-                </a:solidFill>
-                <a:latin typeface="+mn-lt"/>
-                <a:ea typeface="+mn-ea"/>
-                <a:cs typeface="+mn-cs"/>
-              </a:defRPr>
-            </a:lvl6pPr>
-            <a:lvl7pPr marL="2971800" indent="-228600" algn="l" defTabSz="914400" rtl="0" eaLnBrk="1" latinLnBrk="0" hangingPunct="1">
-              <a:spcBef>
-                <a:spcPct val="20000"/>
-              </a:spcBef>
-              <a:buFont typeface="Arial" pitchFamily="34" charset="0"/>
-              <a:buChar char="•"/>
-              <a:defRPr sz="2000" kern="1200">
-                <a:solidFill>
-                  <a:schemeClr val="tx1"/>
-                </a:solidFill>
-                <a:latin typeface="+mn-lt"/>
-                <a:ea typeface="+mn-ea"/>
-                <a:cs typeface="+mn-cs"/>
-              </a:defRPr>
-            </a:lvl7pPr>
-            <a:lvl8pPr marL="3429000" indent="-228600" algn="l" defTabSz="914400" rtl="0" eaLnBrk="1" latinLnBrk="0" hangingPunct="1">
-              <a:spcBef>
-                <a:spcPct val="20000"/>
-              </a:spcBef>
-              <a:buFont typeface="Arial" pitchFamily="34" charset="0"/>
-              <a:buChar char="•"/>
-              <a:defRPr sz="2000" kern="1200">
-                <a:solidFill>
-                  <a:schemeClr val="tx1"/>
-                </a:solidFill>
-                <a:latin typeface="+mn-lt"/>
-                <a:ea typeface="+mn-ea"/>
-                <a:cs typeface="+mn-cs"/>
-              </a:defRPr>
-            </a:lvl8pPr>
-            <a:lvl9pPr marL="3886200" indent="-228600" algn="l" defTabSz="914400" rtl="0" eaLnBrk="1" latinLnBrk="0" hangingPunct="1">
-              <a:spcBef>
-                <a:spcPct val="20000"/>
-              </a:spcBef>
-              <a:buFont typeface="Arial" pitchFamily="34" charset="0"/>
-              <a:buChar char="•"/>
-              <a:defRPr sz="2000" kern="1200">
-                <a:solidFill>
-                  <a:schemeClr val="tx1"/>
-                </a:solidFill>
-                <a:latin typeface="+mn-lt"/>
-                <a:ea typeface="+mn-ea"/>
-                <a:cs typeface="+mn-cs"/>
-              </a:defRPr>
-            </a:lvl9pPr>
-          </a:lstStyle>
-          <a:p>
-            <a:r>
-              <a:rPr lang="en-US" dirty="0" smtClean="0"/>
-              <a:t>Keep language</a:t>
-            </a:r>
-            <a:endParaRPr lang="en-US" dirty="0"/>
-          </a:p>
-        </p:txBody>
-      </p:sp>
-    </p:spTree>
-    <p:extLst>
-      <p:ext uri="{BB962C8B-B14F-4D97-AF65-F5344CB8AC3E}">
-        <p14:creationId xmlns:p14="http://schemas.microsoft.com/office/powerpoint/2010/main" val="1500072901"/>
-      </p:ext>
-    </p:extLst>
-  </p:cSld>
-  <p:clrMapOvr>
-    <a:masterClrMapping/>
-  </p:clrMapOvr>
-</p:sld>
-</file>
-
-<file path=ppt/slides/slide18.xml><?xml version="1.0" encoding="utf-8"?>
 <p:sld xmlns:a="http://schemas.openxmlformats.org/drawingml/2006/main" xmlns:r="http://schemas.openxmlformats.org/officeDocument/2006/relationships" xmlns:p="http://schemas.openxmlformats.org/presentationml/2006/main">
   <p:cSld>
     <p:spTree>
@@ -9367,7 +9211,7 @@
             <a:fld id="{B6F15528-21DE-4FAA-801E-634DDDAF4B2B}" type="slidenum">
               <a:rPr lang="en-US" smtClean="0"/>
               <a:pPr/>
-              <a:t>18</a:t>
+              <a:t>17</a:t>
             </a:fld>
             <a:endParaRPr lang="en-US"/>
           </a:p>
@@ -9393,7 +9237,7 @@
 </p:sld>
 </file>
 
-<file path=ppt/slides/slide19.xml><?xml version="1.0" encoding="utf-8"?>
+<file path=ppt/slides/slide18.xml><?xml version="1.0" encoding="utf-8"?>
 <p:sld xmlns:a="http://schemas.openxmlformats.org/drawingml/2006/main" xmlns:r="http://schemas.openxmlformats.org/officeDocument/2006/relationships" xmlns:p="http://schemas.openxmlformats.org/presentationml/2006/main">
   <p:cSld>
     <p:spTree>
@@ -9469,7 +9313,7 @@
             <a:fld id="{B6F15528-21DE-4FAA-801E-634DDDAF4B2B}" type="slidenum">
               <a:rPr lang="en-US" smtClean="0"/>
               <a:pPr/>
-              <a:t>19</a:t>
+              <a:t>18</a:t>
             </a:fld>
             <a:endParaRPr lang="en-US"/>
           </a:p>
@@ -9527,9 +9371,10 @@
           <a:bodyPr/>
           <a:lstStyle/>
           <a:p>
-            <a:r>
-              <a:rPr lang="en-US" dirty="0" smtClean="0"/>
-              <a:t>Define: Raconteur</a:t>
+            <a:pPr algn="l"/>
+            <a:r>
+              <a:rPr lang="en-US" b="1" dirty="0" err="1"/>
+              <a:t>rac·on·teur</a:t>
             </a:r>
             <a:endParaRPr lang="en-US" dirty="0"/>
           </a:p>
@@ -9545,22 +9390,126 @@
             <p:ph idx="1"/>
           </p:nvPr>
         </p:nvSpPr>
-        <p:spPr/>
-        <p:txBody>
-          <a:bodyPr/>
-          <a:lstStyle/>
-          <a:p>
-            <a:r>
-              <a:rPr lang="en-US" dirty="0" smtClean="0"/>
-              <a:t>Dictionary definition</a:t>
-            </a:r>
-          </a:p>
-          <a:p>
-            <a:r>
-              <a:rPr lang="en-US" dirty="0" smtClean="0"/>
-              <a:t>Programming definition</a:t>
-            </a:r>
-            <a:endParaRPr lang="en-US" dirty="0"/>
+        <p:spPr>
+          <a:xfrm>
+            <a:off x="457200" y="1112837"/>
+            <a:ext cx="8229600" cy="4525963"/>
+          </a:xfrm>
+        </p:spPr>
+        <p:txBody>
+          <a:bodyPr>
+            <a:normAutofit/>
+          </a:bodyPr>
+          <a:lstStyle/>
+          <a:p>
+            <a:pPr marL="0" indent="0">
+              <a:buNone/>
+            </a:pPr>
+            <a:r>
+              <a:rPr lang="fr-FR" sz="2200" b="1" dirty="0" err="1"/>
+              <a:t>noun</a:t>
+            </a:r>
+            <a:r>
+              <a:rPr lang="fr-FR" sz="2200" dirty="0"/>
+              <a:t> /ˌ</a:t>
+            </a:r>
+            <a:r>
+              <a:rPr lang="fr-FR" sz="2200" dirty="0" err="1"/>
+              <a:t>rakˌänˈtər</a:t>
+            </a:r>
+            <a:r>
+              <a:rPr lang="fr-FR" sz="2200" dirty="0"/>
+              <a:t>/  /-</a:t>
+            </a:r>
+            <a:r>
+              <a:rPr lang="fr-FR" sz="2200" dirty="0" err="1"/>
+              <a:t>ən</a:t>
+            </a:r>
+            <a:r>
+              <a:rPr lang="fr-FR" sz="2200" dirty="0"/>
+              <a:t>-/ </a:t>
+            </a:r>
+            <a:br>
+              <a:rPr lang="fr-FR" sz="2200" dirty="0"/>
+            </a:br>
+            <a:r>
+              <a:rPr lang="fr-FR" sz="2200" i="1" dirty="0"/>
+              <a:t>raconteurs, plural</a:t>
+            </a:r>
+            <a:endParaRPr lang="en-US" sz="2200" i="1" dirty="0" smtClean="0"/>
+          </a:p>
+          <a:p>
+            <a:pPr marL="857250" lvl="1" indent="-457200">
+              <a:buFont typeface="+mj-lt"/>
+              <a:buAutoNum type="arabicPeriod"/>
+            </a:pPr>
+            <a:r>
+              <a:rPr lang="en-US" sz="2200" dirty="0"/>
+              <a:t>A person who tells anecdotes in a skillful and amusing </a:t>
+            </a:r>
+            <a:r>
+              <a:rPr lang="en-US" sz="2200" dirty="0" smtClean="0"/>
+              <a:t>way</a:t>
+            </a:r>
+          </a:p>
+          <a:p>
+            <a:pPr marL="857250" lvl="1" indent="-457200">
+              <a:buFont typeface="+mj-lt"/>
+              <a:buAutoNum type="arabicPeriod"/>
+            </a:pPr>
+            <a:r>
+              <a:rPr lang="en-US" sz="2200" dirty="0" smtClean="0"/>
+              <a:t>Acceptance </a:t>
+            </a:r>
+            <a:r>
+              <a:rPr lang="en-US" sz="2200" dirty="0"/>
+              <a:t>test framework for C</a:t>
+            </a:r>
+            <a:r>
+              <a:rPr lang="en-US" sz="2200" dirty="0" smtClean="0"/>
+              <a:t>#</a:t>
+            </a:r>
+          </a:p>
+          <a:p>
+            <a:pPr marL="800100" lvl="2" indent="0">
+              <a:buNone/>
+            </a:pPr>
+            <a:r>
+              <a:rPr lang="en-US" sz="1800" dirty="0"/>
+              <a:t>Allows writing stories in plain </a:t>
+            </a:r>
+            <a:r>
+              <a:rPr lang="en-US" sz="1800" dirty="0" smtClean="0"/>
+              <a:t>text with </a:t>
+            </a:r>
+            <a:r>
+              <a:rPr lang="en-US" sz="1800" dirty="0" err="1" smtClean="0"/>
+              <a:t>VisualStudio</a:t>
+            </a:r>
+            <a:r>
+              <a:rPr lang="en-US" sz="1800" dirty="0"/>
+              <a:t/>
+            </a:r>
+            <a:br>
+              <a:rPr lang="en-US" sz="1800" dirty="0"/>
+            </a:br>
+            <a:r>
+              <a:rPr lang="en-US" sz="1800" dirty="0"/>
+              <a:t>The stories are executed as </a:t>
+            </a:r>
+            <a:r>
+              <a:rPr lang="en-US" sz="1800" dirty="0" err="1"/>
+              <a:t>xUnit</a:t>
+            </a:r>
+            <a:r>
+              <a:rPr lang="en-US" sz="1800" dirty="0"/>
+              <a:t> </a:t>
+            </a:r>
+            <a:r>
+              <a:rPr lang="en-US" sz="1800" dirty="0" smtClean="0"/>
+              <a:t>tests</a:t>
+            </a:r>
+            <a:endParaRPr lang="en-US" sz="1800" dirty="0"/>
           </a:p>
         </p:txBody>
       </p:sp>
@@ -9574,6 +9523,13 @@
   <p:clrMapOvr>
     <a:masterClrMapping/>
   </p:clrMapOvr>
+  <p:timing>
+    <p:tnLst>
+      <p:par>
+        <p:cTn id="1" dur="indefinite" restart="never" nodeType="tmRoot"/>
+      </p:par>
+    </p:tnLst>
+  </p:timing>
 </p:sld>
 </file>
 
@@ -9755,6 +9711,44 @@
             <a:pPr marL="0" indent="0">
               <a:buNone/>
             </a:pPr>
+            <a:r>
+              <a:rPr lang="en-US" dirty="0" err="1" smtClean="0"/>
+              <a:t>Fitnesse</a:t>
+            </a:r>
+            <a:r>
+              <a:rPr lang="en-US" dirty="0" smtClean="0"/>
+              <a:t> Page/ </a:t>
+            </a:r>
+            <a:r>
+              <a:rPr lang="en-US" dirty="0" err="1" smtClean="0"/>
+              <a:t>Rac</a:t>
+            </a:r>
+            <a:r>
+              <a:rPr lang="en-US" dirty="0" smtClean="0"/>
+              <a:t> Feature</a:t>
+            </a:r>
+          </a:p>
+          <a:p>
+            <a:pPr marL="0" indent="0">
+              <a:buNone/>
+            </a:pPr>
+            <a:r>
+              <a:rPr lang="en-US" dirty="0" smtClean="0"/>
+              <a:t>Cucumber / </a:t>
+            </a:r>
+            <a:r>
+              <a:rPr lang="en-US" dirty="0" err="1" smtClean="0"/>
+              <a:t>Rac</a:t>
+            </a:r>
+            <a:r>
+              <a:rPr lang="en-US" dirty="0" smtClean="0"/>
+              <a:t> </a:t>
+            </a:r>
+          </a:p>
+          <a:p>
+            <a:pPr marL="0" indent="0">
+              <a:buNone/>
+            </a:pPr>
             <a:endParaRPr lang="en-US" dirty="0"/>
           </a:p>
         </p:txBody>
@@ -9805,6 +9799,13 @@
   <p:clrMapOvr>
     <a:masterClrMapping/>
   </p:clrMapOvr>
+  <p:timing>
+    <p:tnLst>
+      <p:par>
+        <p:cTn id="1" dur="indefinite" restart="never" nodeType="tmRoot"/>
+      </p:par>
+    </p:tnLst>
+  </p:timing>
 </p:sld>
 </file>
 
@@ -9866,6 +9867,23 @@
             <a:r>
               <a:rPr lang="en-US" dirty="0" smtClean="0"/>
               <a:t>Search and navigation</a:t>
+            </a:r>
+          </a:p>
+          <a:p>
+            <a:pPr marL="0" indent="0">
+              <a:buNone/>
+            </a:pPr>
+            <a:r>
+              <a:rPr lang="en-US" dirty="0" smtClean="0"/>
+              <a:t>R# </a:t>
+            </a:r>
+            <a:r>
+              <a:rPr lang="en-US" dirty="0" err="1" smtClean="0"/>
+              <a:t>ctrl+sft+n</a:t>
+            </a:r>
+            <a:r>
+              <a:rPr lang="en-US" dirty="0" smtClean="0"/>
+              <a:t> </a:t>
             </a:r>
           </a:p>
           <a:p>
@@ -9990,6 +10008,18 @@
             <a:pPr marL="0" indent="0">
               <a:buNone/>
             </a:pPr>
+            <a:r>
+              <a:rPr lang="en-US" dirty="0" smtClean="0"/>
+              <a:t>Raconteur screenshot (pending </a:t>
+            </a:r>
+            <a:r>
+              <a:rPr lang="en-US" dirty="0" err="1" smtClean="0"/>
+              <a:t>ctrl+space</a:t>
+            </a:r>
+            <a:r>
+              <a:rPr lang="en-US" dirty="0" smtClean="0"/>
+              <a:t>) </a:t>
+            </a:r>
             <a:endParaRPr lang="en-US" dirty="0"/>
           </a:p>
         </p:txBody>
@@ -10107,7 +10137,14 @@
             <a:pPr marL="0" indent="0">
               <a:buNone/>
             </a:pPr>
-            <a:endParaRPr lang="en-US" dirty="0"/>
+            <a:r>
+              <a:rPr lang="en-US" dirty="0" err="1"/>
+              <a:t>Rac</a:t>
+            </a:r>
+            <a:r>
+              <a:rPr lang="en-US" dirty="0"/>
+              <a:t> Change by Rate</a:t>
+            </a:r>
           </a:p>
         </p:txBody>
       </p:sp>
@@ -10224,6 +10261,27 @@
             <a:pPr marL="0" indent="0">
               <a:buNone/>
             </a:pPr>
+            <a:r>
+              <a:rPr lang="en-US" dirty="0" err="1" smtClean="0"/>
+              <a:t>Fitnesse</a:t>
+            </a:r>
+            <a:r>
+              <a:rPr lang="en-US" dirty="0" smtClean="0"/>
+              <a:t> Debug Feature code + fixture in page</a:t>
+            </a:r>
+          </a:p>
+          <a:p>
+            <a:pPr marL="0" indent="0">
+              <a:buNone/>
+            </a:pPr>
+            <a:r>
+              <a:rPr lang="en-US" dirty="0" err="1" smtClean="0"/>
+              <a:t>Rac</a:t>
+            </a:r>
+            <a:r>
+              <a:rPr lang="en-US" dirty="0" smtClean="0"/>
+              <a:t> present/future </a:t>
+            </a:r>
             <a:endParaRPr lang="en-US" dirty="0"/>
           </a:p>
         </p:txBody>
@@ -10341,6 +10399,18 @@
             <a:pPr marL="0" indent="0">
               <a:buNone/>
             </a:pPr>
+            <a:r>
+              <a:rPr lang="en-US" dirty="0" smtClean="0"/>
+              <a:t>Screenshot  </a:t>
+            </a:r>
+            <a:r>
+              <a:rPr lang="en-US" dirty="0" err="1" smtClean="0"/>
+              <a:t>alt+enter</a:t>
+            </a:r>
+            <a:r>
+              <a:rPr lang="en-US" dirty="0" smtClean="0"/>
+              <a:t> + rename</a:t>
+            </a:r>
             <a:endParaRPr lang="en-US" dirty="0"/>
           </a:p>
         </p:txBody>

</xml_diff>

<commit_message>
cleanup samples ... more sliding ... looking pretty :)
</commit_message>
<xml_diff>
--- a/agile2011/presentation.pptx
+++ b/agile2011/presentation.pptx
@@ -4,10 +4,13 @@
   <p:sldMasterIdLst>
     <p:sldMasterId id="2147483648" r:id="rId1"/>
   </p:sldMasterIdLst>
+  <p:notesMasterIdLst>
+    <p:notesMasterId r:id="rId26"/>
+  </p:notesMasterIdLst>
   <p:sldIdLst>
     <p:sldId id="256" r:id="rId2"/>
     <p:sldId id="257" r:id="rId3"/>
-    <p:sldId id="258" r:id="rId4"/>
+    <p:sldId id="280" r:id="rId4"/>
     <p:sldId id="259" r:id="rId5"/>
     <p:sldId id="278" r:id="rId6"/>
     <p:sldId id="260" r:id="rId7"/>
@@ -26,8 +29,9 @@
     <p:sldId id="272" r:id="rId20"/>
     <p:sldId id="274" r:id="rId21"/>
     <p:sldId id="277" r:id="rId22"/>
-    <p:sldId id="275" r:id="rId23"/>
-    <p:sldId id="276" r:id="rId24"/>
+    <p:sldId id="279" r:id="rId23"/>
+    <p:sldId id="275" r:id="rId24"/>
+    <p:sldId id="276" r:id="rId25"/>
   </p:sldIdLst>
   <p:sldSz cx="9144000" cy="6858000" type="screen4x3"/>
   <p:notesSz cx="6858000" cy="9144000"/>
@@ -129,6 +133,440 @@
 </p:presentation>
 </file>
 
+<file path=ppt/notesMasters/notesMaster1.xml><?xml version="1.0" encoding="utf-8"?>
+<p:notesMaster xmlns:a="http://schemas.openxmlformats.org/drawingml/2006/main" xmlns:r="http://schemas.openxmlformats.org/officeDocument/2006/relationships" xmlns:p="http://schemas.openxmlformats.org/presentationml/2006/main">
+  <p:cSld>
+    <p:bg>
+      <p:bgRef idx="1001">
+        <a:schemeClr val="bg1"/>
+      </p:bgRef>
+    </p:bg>
+    <p:spTree>
+      <p:nvGrpSpPr>
+        <p:cNvPr id="1" name=""/>
+        <p:cNvGrpSpPr/>
+        <p:nvPr/>
+      </p:nvGrpSpPr>
+      <p:grpSpPr>
+        <a:xfrm>
+          <a:off x="0" y="0"/>
+          <a:ext cx="0" cy="0"/>
+          <a:chOff x="0" y="0"/>
+          <a:chExt cx="0" cy="0"/>
+        </a:xfrm>
+      </p:grpSpPr>
+      <p:sp>
+        <p:nvSpPr>
+          <p:cNvPr id="2" name="Header Placeholder 1"/>
+          <p:cNvSpPr>
+            <a:spLocks noGrp="1"/>
+          </p:cNvSpPr>
+          <p:nvPr>
+            <p:ph type="hdr" sz="quarter"/>
+          </p:nvPr>
+        </p:nvSpPr>
+        <p:spPr>
+          <a:xfrm>
+            <a:off x="0" y="0"/>
+            <a:ext cx="2971800" cy="457200"/>
+          </a:xfrm>
+          <a:prstGeom prst="rect">
+            <a:avLst/>
+          </a:prstGeom>
+        </p:spPr>
+        <p:txBody>
+          <a:bodyPr vert="horz" lIns="91440" tIns="45720" rIns="91440" bIns="45720" rtlCol="0"/>
+          <a:lstStyle>
+            <a:lvl1pPr algn="l">
+              <a:defRPr sz="1200"/>
+            </a:lvl1pPr>
+          </a:lstStyle>
+          <a:p>
+            <a:endParaRPr lang="en-US"/>
+          </a:p>
+        </p:txBody>
+      </p:sp>
+      <p:sp>
+        <p:nvSpPr>
+          <p:cNvPr id="3" name="Date Placeholder 2"/>
+          <p:cNvSpPr>
+            <a:spLocks noGrp="1"/>
+          </p:cNvSpPr>
+          <p:nvPr>
+            <p:ph type="dt" idx="1"/>
+          </p:nvPr>
+        </p:nvSpPr>
+        <p:spPr>
+          <a:xfrm>
+            <a:off x="3884613" y="0"/>
+            <a:ext cx="2971800" cy="457200"/>
+          </a:xfrm>
+          <a:prstGeom prst="rect">
+            <a:avLst/>
+          </a:prstGeom>
+        </p:spPr>
+        <p:txBody>
+          <a:bodyPr vert="horz" lIns="91440" tIns="45720" rIns="91440" bIns="45720" rtlCol="0"/>
+          <a:lstStyle>
+            <a:lvl1pPr algn="r">
+              <a:defRPr sz="1200"/>
+            </a:lvl1pPr>
+          </a:lstStyle>
+          <a:p>
+            <a:fld id="{7BFC7A15-C5F0-4935-8A79-CF816787578F}" type="datetimeFigureOut">
+              <a:rPr lang="en-US" smtClean="0"/>
+              <a:t>8/4/2011</a:t>
+            </a:fld>
+            <a:endParaRPr lang="en-US"/>
+          </a:p>
+        </p:txBody>
+      </p:sp>
+      <p:sp>
+        <p:nvSpPr>
+          <p:cNvPr id="4" name="Slide Image Placeholder 3"/>
+          <p:cNvSpPr>
+            <a:spLocks noGrp="1" noRot="1" noChangeAspect="1"/>
+          </p:cNvSpPr>
+          <p:nvPr>
+            <p:ph type="sldImg" idx="2"/>
+          </p:nvPr>
+        </p:nvSpPr>
+        <p:spPr>
+          <a:xfrm>
+            <a:off x="1143000" y="685800"/>
+            <a:ext cx="4572000" cy="3429000"/>
+          </a:xfrm>
+          <a:prstGeom prst="rect">
+            <a:avLst/>
+          </a:prstGeom>
+          <a:noFill/>
+          <a:ln w="12700">
+            <a:solidFill>
+              <a:prstClr val="black"/>
+            </a:solidFill>
+          </a:ln>
+        </p:spPr>
+        <p:txBody>
+          <a:bodyPr vert="horz" lIns="91440" tIns="45720" rIns="91440" bIns="45720" rtlCol="0" anchor="ctr"/>
+          <a:lstStyle/>
+          <a:p>
+            <a:endParaRPr lang="en-US"/>
+          </a:p>
+        </p:txBody>
+      </p:sp>
+      <p:sp>
+        <p:nvSpPr>
+          <p:cNvPr id="5" name="Notes Placeholder 4"/>
+          <p:cNvSpPr>
+            <a:spLocks noGrp="1"/>
+          </p:cNvSpPr>
+          <p:nvPr>
+            <p:ph type="body" sz="quarter" idx="3"/>
+          </p:nvPr>
+        </p:nvSpPr>
+        <p:spPr>
+          <a:xfrm>
+            <a:off x="685800" y="4343400"/>
+            <a:ext cx="5486400" cy="4114800"/>
+          </a:xfrm>
+          <a:prstGeom prst="rect">
+            <a:avLst/>
+          </a:prstGeom>
+        </p:spPr>
+        <p:txBody>
+          <a:bodyPr vert="horz" lIns="91440" tIns="45720" rIns="91440" bIns="45720" rtlCol="0"/>
+          <a:lstStyle/>
+          <a:p>
+            <a:pPr lvl="0"/>
+            <a:r>
+              <a:rPr lang="en-US" smtClean="0"/>
+              <a:t>Click to edit Master text styles</a:t>
+            </a:r>
+          </a:p>
+          <a:p>
+            <a:pPr lvl="1"/>
+            <a:r>
+              <a:rPr lang="en-US" smtClean="0"/>
+              <a:t>Second level</a:t>
+            </a:r>
+          </a:p>
+          <a:p>
+            <a:pPr lvl="2"/>
+            <a:r>
+              <a:rPr lang="en-US" smtClean="0"/>
+              <a:t>Third level</a:t>
+            </a:r>
+          </a:p>
+          <a:p>
+            <a:pPr lvl="3"/>
+            <a:r>
+              <a:rPr lang="en-US" smtClean="0"/>
+              <a:t>Fourth level</a:t>
+            </a:r>
+          </a:p>
+          <a:p>
+            <a:pPr lvl="4"/>
+            <a:r>
+              <a:rPr lang="en-US" smtClean="0"/>
+              <a:t>Fifth level</a:t>
+            </a:r>
+            <a:endParaRPr lang="en-US"/>
+          </a:p>
+        </p:txBody>
+      </p:sp>
+      <p:sp>
+        <p:nvSpPr>
+          <p:cNvPr id="6" name="Footer Placeholder 5"/>
+          <p:cNvSpPr>
+            <a:spLocks noGrp="1"/>
+          </p:cNvSpPr>
+          <p:nvPr>
+            <p:ph type="ftr" sz="quarter" idx="4"/>
+          </p:nvPr>
+        </p:nvSpPr>
+        <p:spPr>
+          <a:xfrm>
+            <a:off x="0" y="8685213"/>
+            <a:ext cx="2971800" cy="457200"/>
+          </a:xfrm>
+          <a:prstGeom prst="rect">
+            <a:avLst/>
+          </a:prstGeom>
+        </p:spPr>
+        <p:txBody>
+          <a:bodyPr vert="horz" lIns="91440" tIns="45720" rIns="91440" bIns="45720" rtlCol="0" anchor="b"/>
+          <a:lstStyle>
+            <a:lvl1pPr algn="l">
+              <a:defRPr sz="1200"/>
+            </a:lvl1pPr>
+          </a:lstStyle>
+          <a:p>
+            <a:endParaRPr lang="en-US"/>
+          </a:p>
+        </p:txBody>
+      </p:sp>
+      <p:sp>
+        <p:nvSpPr>
+          <p:cNvPr id="7" name="Slide Number Placeholder 6"/>
+          <p:cNvSpPr>
+            <a:spLocks noGrp="1"/>
+          </p:cNvSpPr>
+          <p:nvPr>
+            <p:ph type="sldNum" sz="quarter" idx="5"/>
+          </p:nvPr>
+        </p:nvSpPr>
+        <p:spPr>
+          <a:xfrm>
+            <a:off x="3884613" y="8685213"/>
+            <a:ext cx="2971800" cy="457200"/>
+          </a:xfrm>
+          <a:prstGeom prst="rect">
+            <a:avLst/>
+          </a:prstGeom>
+        </p:spPr>
+        <p:txBody>
+          <a:bodyPr vert="horz" lIns="91440" tIns="45720" rIns="91440" bIns="45720" rtlCol="0" anchor="b"/>
+          <a:lstStyle>
+            <a:lvl1pPr algn="r">
+              <a:defRPr sz="1200"/>
+            </a:lvl1pPr>
+          </a:lstStyle>
+          <a:p>
+            <a:fld id="{0103B538-982E-4A29-859D-B6204CD1750D}" type="slidenum">
+              <a:rPr lang="en-US" smtClean="0"/>
+              <a:t>‹#›</a:t>
+            </a:fld>
+            <a:endParaRPr lang="en-US"/>
+          </a:p>
+        </p:txBody>
+      </p:sp>
+    </p:spTree>
+    <p:extLst>
+      <p:ext uri="{BB962C8B-B14F-4D97-AF65-F5344CB8AC3E}">
+        <p14:creationId xmlns:p14="http://schemas.microsoft.com/office/powerpoint/2010/main" val="1114732104"/>
+      </p:ext>
+    </p:extLst>
+  </p:cSld>
+  <p:clrMap bg1="lt1" tx1="dk1" bg2="lt2" tx2="dk2" accent1="accent1" accent2="accent2" accent3="accent3" accent4="accent4" accent5="accent5" accent6="accent6" hlink="hlink" folHlink="folHlink"/>
+  <p:notesStyle>
+    <a:lvl1pPr marL="0" algn="l" defTabSz="914400" rtl="0" eaLnBrk="1" latinLnBrk="0" hangingPunct="1">
+      <a:defRPr sz="1200" kern="1200">
+        <a:solidFill>
+          <a:schemeClr val="tx1"/>
+        </a:solidFill>
+        <a:latin typeface="+mn-lt"/>
+        <a:ea typeface="+mn-ea"/>
+        <a:cs typeface="+mn-cs"/>
+      </a:defRPr>
+    </a:lvl1pPr>
+    <a:lvl2pPr marL="457200" algn="l" defTabSz="914400" rtl="0" eaLnBrk="1" latinLnBrk="0" hangingPunct="1">
+      <a:defRPr sz="1200" kern="1200">
+        <a:solidFill>
+          <a:schemeClr val="tx1"/>
+        </a:solidFill>
+        <a:latin typeface="+mn-lt"/>
+        <a:ea typeface="+mn-ea"/>
+        <a:cs typeface="+mn-cs"/>
+      </a:defRPr>
+    </a:lvl2pPr>
+    <a:lvl3pPr marL="914400" algn="l" defTabSz="914400" rtl="0" eaLnBrk="1" latinLnBrk="0" hangingPunct="1">
+      <a:defRPr sz="1200" kern="1200">
+        <a:solidFill>
+          <a:schemeClr val="tx1"/>
+        </a:solidFill>
+        <a:latin typeface="+mn-lt"/>
+        <a:ea typeface="+mn-ea"/>
+        <a:cs typeface="+mn-cs"/>
+      </a:defRPr>
+    </a:lvl3pPr>
+    <a:lvl4pPr marL="1371600" algn="l" defTabSz="914400" rtl="0" eaLnBrk="1" latinLnBrk="0" hangingPunct="1">
+      <a:defRPr sz="1200" kern="1200">
+        <a:solidFill>
+          <a:schemeClr val="tx1"/>
+        </a:solidFill>
+        <a:latin typeface="+mn-lt"/>
+        <a:ea typeface="+mn-ea"/>
+        <a:cs typeface="+mn-cs"/>
+      </a:defRPr>
+    </a:lvl4pPr>
+    <a:lvl5pPr marL="1828800" algn="l" defTabSz="914400" rtl="0" eaLnBrk="1" latinLnBrk="0" hangingPunct="1">
+      <a:defRPr sz="1200" kern="1200">
+        <a:solidFill>
+          <a:schemeClr val="tx1"/>
+        </a:solidFill>
+        <a:latin typeface="+mn-lt"/>
+        <a:ea typeface="+mn-ea"/>
+        <a:cs typeface="+mn-cs"/>
+      </a:defRPr>
+    </a:lvl5pPr>
+    <a:lvl6pPr marL="2286000" algn="l" defTabSz="914400" rtl="0" eaLnBrk="1" latinLnBrk="0" hangingPunct="1">
+      <a:defRPr sz="1200" kern="1200">
+        <a:solidFill>
+          <a:schemeClr val="tx1"/>
+        </a:solidFill>
+        <a:latin typeface="+mn-lt"/>
+        <a:ea typeface="+mn-ea"/>
+        <a:cs typeface="+mn-cs"/>
+      </a:defRPr>
+    </a:lvl6pPr>
+    <a:lvl7pPr marL="2743200" algn="l" defTabSz="914400" rtl="0" eaLnBrk="1" latinLnBrk="0" hangingPunct="1">
+      <a:defRPr sz="1200" kern="1200">
+        <a:solidFill>
+          <a:schemeClr val="tx1"/>
+        </a:solidFill>
+        <a:latin typeface="+mn-lt"/>
+        <a:ea typeface="+mn-ea"/>
+        <a:cs typeface="+mn-cs"/>
+      </a:defRPr>
+    </a:lvl7pPr>
+    <a:lvl8pPr marL="3200400" algn="l" defTabSz="914400" rtl="0" eaLnBrk="1" latinLnBrk="0" hangingPunct="1">
+      <a:defRPr sz="1200" kern="1200">
+        <a:solidFill>
+          <a:schemeClr val="tx1"/>
+        </a:solidFill>
+        <a:latin typeface="+mn-lt"/>
+        <a:ea typeface="+mn-ea"/>
+        <a:cs typeface="+mn-cs"/>
+      </a:defRPr>
+    </a:lvl8pPr>
+    <a:lvl9pPr marL="3657600" algn="l" defTabSz="914400" rtl="0" eaLnBrk="1" latinLnBrk="0" hangingPunct="1">
+      <a:defRPr sz="1200" kern="1200">
+        <a:solidFill>
+          <a:schemeClr val="tx1"/>
+        </a:solidFill>
+        <a:latin typeface="+mn-lt"/>
+        <a:ea typeface="+mn-ea"/>
+        <a:cs typeface="+mn-cs"/>
+      </a:defRPr>
+    </a:lvl9pPr>
+  </p:notesStyle>
+</p:notesMaster>
+</file>
+
+<file path=ppt/notesSlides/notesSlide1.xml><?xml version="1.0" encoding="utf-8"?>
+<p:notes xmlns:a="http://schemas.openxmlformats.org/drawingml/2006/main" xmlns:r="http://schemas.openxmlformats.org/officeDocument/2006/relationships" xmlns:p="http://schemas.openxmlformats.org/presentationml/2006/main">
+  <p:cSld>
+    <p:spTree>
+      <p:nvGrpSpPr>
+        <p:cNvPr id="1" name=""/>
+        <p:cNvGrpSpPr/>
+        <p:nvPr/>
+      </p:nvGrpSpPr>
+      <p:grpSpPr>
+        <a:xfrm>
+          <a:off x="0" y="0"/>
+          <a:ext cx="0" cy="0"/>
+          <a:chOff x="0" y="0"/>
+          <a:chExt cx="0" cy="0"/>
+        </a:xfrm>
+      </p:grpSpPr>
+      <p:sp>
+        <p:nvSpPr>
+          <p:cNvPr id="2" name="Slide Image Placeholder 1"/>
+          <p:cNvSpPr>
+            <a:spLocks noGrp="1" noRot="1" noChangeAspect="1"/>
+          </p:cNvSpPr>
+          <p:nvPr>
+            <p:ph type="sldImg"/>
+          </p:nvPr>
+        </p:nvSpPr>
+        <p:spPr/>
+      </p:sp>
+      <p:sp>
+        <p:nvSpPr>
+          <p:cNvPr id="3" name="Notes Placeholder 2"/>
+          <p:cNvSpPr>
+            <a:spLocks noGrp="1"/>
+          </p:cNvSpPr>
+          <p:nvPr>
+            <p:ph type="body" idx="1"/>
+          </p:nvPr>
+        </p:nvSpPr>
+        <p:spPr/>
+        <p:txBody>
+          <a:bodyPr/>
+          <a:lstStyle/>
+          <a:p>
+            <a:endParaRPr lang="en-US" dirty="0"/>
+          </a:p>
+        </p:txBody>
+      </p:sp>
+      <p:sp>
+        <p:nvSpPr>
+          <p:cNvPr id="4" name="Slide Number Placeholder 3"/>
+          <p:cNvSpPr>
+            <a:spLocks noGrp="1"/>
+          </p:cNvSpPr>
+          <p:nvPr>
+            <p:ph type="sldNum" sz="quarter" idx="10"/>
+          </p:nvPr>
+        </p:nvSpPr>
+        <p:spPr/>
+        <p:txBody>
+          <a:bodyPr/>
+          <a:lstStyle/>
+          <a:p>
+            <a:fld id="{0103B538-982E-4A29-859D-B6204CD1750D}" type="slidenum">
+              <a:rPr lang="en-US" smtClean="0"/>
+              <a:t>22</a:t>
+            </a:fld>
+            <a:endParaRPr lang="en-US"/>
+          </a:p>
+        </p:txBody>
+      </p:sp>
+    </p:spTree>
+    <p:extLst>
+      <p:ext uri="{BB962C8B-B14F-4D97-AF65-F5344CB8AC3E}">
+        <p14:creationId xmlns:p14="http://schemas.microsoft.com/office/powerpoint/2010/main" val="3901714980"/>
+      </p:ext>
+    </p:extLst>
+  </p:cSld>
+  <p:clrMapOvr>
+    <a:masterClrMapping/>
+  </p:clrMapOvr>
+</p:notes>
+</file>
+
 <file path=ppt/slideLayouts/slideLayout1.xml><?xml version="1.0" encoding="utf-8"?>
 <p:sldLayout xmlns:a="http://schemas.openxmlformats.org/drawingml/2006/main" xmlns:r="http://schemas.openxmlformats.org/officeDocument/2006/relationships" xmlns:p="http://schemas.openxmlformats.org/presentationml/2006/main" type="title" preserve="1">
   <p:cSld name="Title Slide">
@@ -310,7 +748,7 @@
           <a:p>
             <a:fld id="{81DFBED3-2DB5-49B9-B599-B34C410A1673}" type="datetimeFigureOut">
               <a:rPr lang="en-US" smtClean="0"/>
-              <a:t>8/3/2011</a:t>
+              <a:t>8/4/2011</a:t>
             </a:fld>
             <a:endParaRPr lang="en-US"/>
           </a:p>
@@ -480,7 +918,7 @@
           <a:p>
             <a:fld id="{81DFBED3-2DB5-49B9-B599-B34C410A1673}" type="datetimeFigureOut">
               <a:rPr lang="en-US" smtClean="0"/>
-              <a:t>8/3/2011</a:t>
+              <a:t>8/4/2011</a:t>
             </a:fld>
             <a:endParaRPr lang="en-US"/>
           </a:p>
@@ -660,7 +1098,7 @@
           <a:p>
             <a:fld id="{81DFBED3-2DB5-49B9-B599-B34C410A1673}" type="datetimeFigureOut">
               <a:rPr lang="en-US" smtClean="0"/>
-              <a:t>8/3/2011</a:t>
+              <a:t>8/4/2011</a:t>
             </a:fld>
             <a:endParaRPr lang="en-US"/>
           </a:p>
@@ -838,7 +1276,7 @@
           <a:p>
             <a:fld id="{81DFBED3-2DB5-49B9-B599-B34C410A1673}" type="datetimeFigureOut">
               <a:rPr lang="en-US" smtClean="0"/>
-              <a:t>8/3/2011</a:t>
+              <a:t>8/4/2011</a:t>
             </a:fld>
             <a:endParaRPr lang="en-US"/>
           </a:p>
@@ -896,6 +1334,13 @@
   <p:clrMapOvr>
     <a:masterClrMapping/>
   </p:clrMapOvr>
+  <p:timing>
+    <p:tnLst>
+      <p:par>
+        <p:cTn id="1" dur="indefinite" restart="never" nodeType="tmRoot"/>
+      </p:par>
+    </p:tnLst>
+  </p:timing>
 </p:sldLayout>
 </file>
 
@@ -1084,7 +1529,7 @@
           <a:p>
             <a:fld id="{81DFBED3-2DB5-49B9-B599-B34C410A1673}" type="datetimeFigureOut">
               <a:rPr lang="en-US" smtClean="0"/>
-              <a:t>8/3/2011</a:t>
+              <a:t>8/4/2011</a:t>
             </a:fld>
             <a:endParaRPr lang="en-US"/>
           </a:p>
@@ -1372,7 +1817,7 @@
           <a:p>
             <a:fld id="{81DFBED3-2DB5-49B9-B599-B34C410A1673}" type="datetimeFigureOut">
               <a:rPr lang="en-US" smtClean="0"/>
-              <a:t>8/3/2011</a:t>
+              <a:t>8/4/2011</a:t>
             </a:fld>
             <a:endParaRPr lang="en-US"/>
           </a:p>
@@ -1794,7 +2239,7 @@
           <a:p>
             <a:fld id="{81DFBED3-2DB5-49B9-B599-B34C410A1673}" type="datetimeFigureOut">
               <a:rPr lang="en-US" smtClean="0"/>
-              <a:t>8/3/2011</a:t>
+              <a:t>8/4/2011</a:t>
             </a:fld>
             <a:endParaRPr lang="en-US"/>
           </a:p>
@@ -1912,7 +2357,7 @@
           <a:p>
             <a:fld id="{81DFBED3-2DB5-49B9-B599-B34C410A1673}" type="datetimeFigureOut">
               <a:rPr lang="en-US" smtClean="0"/>
-              <a:t>8/3/2011</a:t>
+              <a:t>8/4/2011</a:t>
             </a:fld>
             <a:endParaRPr lang="en-US"/>
           </a:p>
@@ -2007,7 +2452,7 @@
           <a:p>
             <a:fld id="{81DFBED3-2DB5-49B9-B599-B34C410A1673}" type="datetimeFigureOut">
               <a:rPr lang="en-US" smtClean="0"/>
-              <a:t>8/3/2011</a:t>
+              <a:t>8/4/2011</a:t>
             </a:fld>
             <a:endParaRPr lang="en-US"/>
           </a:p>
@@ -2284,7 +2729,7 @@
           <a:p>
             <a:fld id="{81DFBED3-2DB5-49B9-B599-B34C410A1673}" type="datetimeFigureOut">
               <a:rPr lang="en-US" smtClean="0"/>
-              <a:t>8/3/2011</a:t>
+              <a:t>8/4/2011</a:t>
             </a:fld>
             <a:endParaRPr lang="en-US"/>
           </a:p>
@@ -2537,7 +2982,7 @@
           <a:p>
             <a:fld id="{81DFBED3-2DB5-49B9-B599-B34C410A1673}" type="datetimeFigureOut">
               <a:rPr lang="en-US" smtClean="0"/>
-              <a:t>8/3/2011</a:t>
+              <a:t>8/4/2011</a:t>
             </a:fld>
             <a:endParaRPr lang="en-US"/>
           </a:p>
@@ -2641,16 +3086,23 @@
         </p:nvSpPr>
         <p:spPr>
           <a:xfrm>
-            <a:off x="457200" y="274638"/>
-            <a:ext cx="8229600" cy="1143000"/>
+            <a:off x="775127" y="0"/>
+            <a:ext cx="7593745" cy="769441"/>
           </a:xfrm>
           <a:prstGeom prst="rect">
             <a:avLst/>
           </a:prstGeom>
         </p:spPr>
         <p:txBody>
-          <a:bodyPr vert="horz" lIns="91440" tIns="45720" rIns="91440" bIns="45720" rtlCol="0" anchor="ctr">
-            <a:normAutofit/>
+          <a:bodyPr vert="horz" wrap="none" lIns="91440" tIns="45720" rIns="91440" bIns="45720" rtlCol="0" anchor="ctr">
+            <a:spAutoFit/>
+            <a:scene3d>
+              <a:camera prst="orthographicFront"/>
+              <a:lightRig rig="threePt" dir="t"/>
+            </a:scene3d>
+            <a:sp3d prstMaterial="metal">
+              <a:bevelT w="31750" h="12700"/>
+            </a:sp3d>
           </a:bodyPr>
           <a:lstStyle/>
           <a:p>
@@ -2675,15 +3127,15 @@
         <p:spPr>
           <a:xfrm>
             <a:off x="457200" y="1600200"/>
-            <a:ext cx="8229600" cy="4525963"/>
+            <a:ext cx="5535618" cy="2283702"/>
           </a:xfrm>
           <a:prstGeom prst="rect">
             <a:avLst/>
           </a:prstGeom>
         </p:spPr>
         <p:txBody>
-          <a:bodyPr vert="horz" lIns="91440" tIns="45720" rIns="91440" bIns="45720" rtlCol="0">
-            <a:normAutofit/>
+          <a:bodyPr vert="horz" wrap="none" lIns="91440" tIns="45720" rIns="91440" bIns="45720" rtlCol="0">
+            <a:spAutoFit/>
           </a:bodyPr>
           <a:lstStyle/>
           <a:p>
@@ -2759,7 +3211,7 @@
           <a:p>
             <a:fld id="{81DFBED3-2DB5-49B9-B599-B34C410A1673}" type="datetimeFigureOut">
               <a:rPr lang="en-US" smtClean="0"/>
-              <a:t>8/3/2011</a:t>
+              <a:t>8/4/2011</a:t>
             </a:fld>
             <a:endParaRPr lang="en-US"/>
           </a:p>
@@ -2864,6 +3316,13 @@
     <p:sldLayoutId id="2147483658" r:id="rId10"/>
     <p:sldLayoutId id="2147483659" r:id="rId11"/>
   </p:sldLayoutIdLst>
+  <p:timing>
+    <p:tnLst>
+      <p:par>
+        <p:cTn id="1" dur="indefinite" restart="never" nodeType="tmRoot"/>
+      </p:par>
+    </p:tnLst>
+  </p:timing>
   <p:txStyles>
     <p:titleStyle>
       <a:lvl1pPr algn="ctr" defTabSz="914400" rtl="0" eaLnBrk="1" latinLnBrk="0" hangingPunct="1">
@@ -2872,9 +3331,29 @@
         </a:spcBef>
         <a:buNone/>
         <a:defRPr sz="4400" kern="1200">
-          <a:solidFill>
-            <a:schemeClr val="tx1"/>
-          </a:solidFill>
+          <a:gradFill>
+            <a:gsLst>
+              <a:gs pos="10000">
+                <a:schemeClr val="tx1">
+                  <a:lumMod val="50000"/>
+                  <a:lumOff val="50000"/>
+                </a:schemeClr>
+              </a:gs>
+              <a:gs pos="45000">
+                <a:schemeClr val="tx1">
+                  <a:lumMod val="96000"/>
+                  <a:lumOff val="4000"/>
+                </a:schemeClr>
+              </a:gs>
+              <a:gs pos="100000">
+                <a:schemeClr val="tx1">
+                  <a:lumMod val="85000"/>
+                  <a:lumOff val="15000"/>
+                </a:schemeClr>
+              </a:gs>
+            </a:gsLst>
+            <a:lin ang="5400000" scaled="0"/>
+          </a:gradFill>
           <a:latin typeface="+mj-lt"/>
           <a:ea typeface="+mj-ea"/>
           <a:cs typeface="+mj-cs"/>
@@ -3134,6 +3613,88 @@
           <a:chExt cx="0" cy="0"/>
         </a:xfrm>
       </p:grpSpPr>
+      <p:pic>
+        <p:nvPicPr>
+          <p:cNvPr id="3075" name="Picture 3" descr="\\THE-ARCHTK\a$\dev\porfolio\agile2011\img\raconteur-wiki.png"/>
+          <p:cNvPicPr>
+            <a:picLocks noChangeAspect="1" noChangeArrowheads="1"/>
+          </p:cNvPicPr>
+          <p:nvPr/>
+        </p:nvPicPr>
+        <p:blipFill>
+          <a:blip r:embed="rId2">
+            <a:extLst>
+              <a:ext uri="{28A0092B-C50C-407E-A947-70E740481C1C}">
+                <a14:useLocalDpi xmlns:a14="http://schemas.microsoft.com/office/drawing/2010/main" val="0"/>
+              </a:ext>
+            </a:extLst>
+          </a:blip>
+          <a:srcRect/>
+          <a:stretch>
+            <a:fillRect/>
+          </a:stretch>
+        </p:blipFill>
+        <p:spPr bwMode="auto">
+          <a:xfrm>
+            <a:off x="1051560" y="1820333"/>
+            <a:ext cx="7040880" cy="4120744"/>
+          </a:xfrm>
+          <a:prstGeom prst="rect">
+            <a:avLst/>
+          </a:prstGeom>
+          <a:noFill/>
+          <a:extLst>
+            <a:ext uri="{909E8E84-426E-40DD-AFC4-6F175D3DCCD1}">
+              <a14:hiddenFill xmlns:a14="http://schemas.microsoft.com/office/drawing/2010/main">
+                <a:solidFill>
+                  <a:srgbClr val="FFFFFF"/>
+                </a:solidFill>
+              </a14:hiddenFill>
+            </a:ext>
+          </a:extLst>
+        </p:spPr>
+      </p:pic>
+      <p:pic>
+        <p:nvPicPr>
+          <p:cNvPr id="3074" name="Picture 2" descr="\\THE-ARCHTK\a$\dev\porfolio\agile2011\img\raconteur-home.png"/>
+          <p:cNvPicPr>
+            <a:picLocks noChangeAspect="1" noChangeArrowheads="1"/>
+          </p:cNvPicPr>
+          <p:nvPr/>
+        </p:nvPicPr>
+        <p:blipFill>
+          <a:blip r:embed="rId3">
+            <a:extLst>
+              <a:ext uri="{28A0092B-C50C-407E-A947-70E740481C1C}">
+                <a14:useLocalDpi xmlns:a14="http://schemas.microsoft.com/office/drawing/2010/main" val="0"/>
+              </a:ext>
+            </a:extLst>
+          </a:blip>
+          <a:srcRect/>
+          <a:stretch>
+            <a:fillRect/>
+          </a:stretch>
+        </p:blipFill>
+        <p:spPr bwMode="auto">
+          <a:xfrm>
+            <a:off x="1051560" y="1820333"/>
+            <a:ext cx="7040880" cy="4054761"/>
+          </a:xfrm>
+          <a:prstGeom prst="rect">
+            <a:avLst/>
+          </a:prstGeom>
+          <a:noFill/>
+          <a:extLst>
+            <a:ext uri="{909E8E84-426E-40DD-AFC4-6F175D3DCCD1}">
+              <a14:hiddenFill xmlns:a14="http://schemas.microsoft.com/office/drawing/2010/main">
+                <a:solidFill>
+                  <a:srgbClr val="FFFFFF"/>
+                </a:solidFill>
+              </a14:hiddenFill>
+            </a:ext>
+          </a:extLst>
+        </p:spPr>
+      </p:pic>
       <p:grpSp>
         <p:nvGrpSpPr>
           <p:cNvPr id="4" name="Group 3"/>
@@ -3142,7 +3703,7 @@
         </p:nvGrpSpPr>
         <p:grpSpPr>
           <a:xfrm>
-            <a:off x="7681817" y="5614297"/>
+            <a:off x="8148711" y="5726817"/>
             <a:ext cx="625149" cy="702257"/>
             <a:chOff x="3481387" y="3260725"/>
             <a:chExt cx="703237" cy="777875"/>
@@ -3157,7 +3718,7 @@
             <p:nvPr/>
           </p:nvPicPr>
           <p:blipFill>
-            <a:blip r:embed="rId2" cstate="print">
+            <a:blip r:embed="rId4" cstate="print">
               <a:extLst>
                 <a:ext uri="{28A0092B-C50C-407E-A947-70E740481C1C}">
                   <a14:useLocalDpi xmlns:a14="http://schemas.microsoft.com/office/drawing/2010/main" val="0"/>
@@ -3221,7 +3782,7 @@
             <p:nvPr/>
           </p:nvPicPr>
           <p:blipFill>
-            <a:blip r:embed="rId3">
+            <a:blip r:embed="rId5">
               <a:extLst>
                 <a:ext uri="{28A0092B-C50C-407E-A947-70E740481C1C}">
                   <a14:useLocalDpi xmlns:a14="http://schemas.microsoft.com/office/drawing/2010/main" val="0"/>
@@ -3254,35 +3815,6 @@
           </p:spPr>
         </p:pic>
       </p:grpSp>
-      <p:sp>
-        <p:nvSpPr>
-          <p:cNvPr id="10" name="Slide Number Placeholder 11"/>
-          <p:cNvSpPr>
-            <a:spLocks noGrp="1"/>
-          </p:cNvSpPr>
-          <p:nvPr>
-            <p:ph type="sldNum" sz="quarter" idx="12"/>
-          </p:nvPr>
-        </p:nvSpPr>
-        <p:spPr>
-          <a:xfrm>
-            <a:off x="6553200" y="6416675"/>
-            <a:ext cx="2133600" cy="365125"/>
-          </a:xfrm>
-        </p:spPr>
-        <p:txBody>
-          <a:bodyPr/>
-          <a:lstStyle/>
-          <a:p>
-            <a:fld id="{B6F15528-21DE-4FAA-801E-634DDDAF4B2B}" type="slidenum">
-              <a:rPr lang="en-US" smtClean="0"/>
-              <a:pPr/>
-              <a:t>1</a:t>
-            </a:fld>
-            <a:endParaRPr lang="en-US" dirty="0"/>
-          </a:p>
-        </p:txBody>
-      </p:sp>
       <p:pic>
         <p:nvPicPr>
           <p:cNvPr id="11" name="Picture 2" descr="\\THE-ARCHTK\a$\dev\porfolio\agile2011\img\logo2.png"/>
@@ -3292,7 +3824,7 @@
           <p:nvPr/>
         </p:nvPicPr>
         <p:blipFill>
-          <a:blip r:embed="rId4">
+          <a:blip r:embed="rId6">
             <a:extLst>
               <a:ext uri="{28A0092B-C50C-407E-A947-70E740481C1C}">
                 <a14:useLocalDpi xmlns:a14="http://schemas.microsoft.com/office/drawing/2010/main" val="0"/>
@@ -3332,7 +3864,7 @@
         </p:nvGrpSpPr>
         <p:grpSpPr>
           <a:xfrm>
-            <a:off x="6919818" y="5622342"/>
+            <a:off x="7386712" y="5734862"/>
             <a:ext cx="623584" cy="702257"/>
             <a:chOff x="6375895" y="3274445"/>
             <a:chExt cx="701477" cy="777875"/>
@@ -3347,7 +3879,7 @@
             <p:nvPr/>
           </p:nvPicPr>
           <p:blipFill>
-            <a:blip r:embed="rId5">
+            <a:blip r:embed="rId7">
               <a:extLst>
                 <a:ext uri="{28A0092B-C50C-407E-A947-70E740481C1C}">
                   <a14:useLocalDpi xmlns:a14="http://schemas.microsoft.com/office/drawing/2010/main" val="0"/>
@@ -3388,7 +3920,7 @@
             <p:nvPr/>
           </p:nvPicPr>
           <p:blipFill>
-            <a:blip r:embed="rId3">
+            <a:blip r:embed="rId5">
               <a:extLst>
                 <a:ext uri="{28A0092B-C50C-407E-A947-70E740481C1C}">
                   <a14:useLocalDpi xmlns:a14="http://schemas.microsoft.com/office/drawing/2010/main" val="0"/>
@@ -3429,7 +3961,7 @@
         </p:nvGrpSpPr>
         <p:grpSpPr>
           <a:xfrm>
-            <a:off x="6143728" y="5622343"/>
+            <a:off x="6610622" y="5734863"/>
             <a:ext cx="623584" cy="702257"/>
             <a:chOff x="4931643" y="3242520"/>
             <a:chExt cx="701477" cy="777875"/>
@@ -3444,7 +3976,7 @@
             <p:nvPr/>
           </p:nvPicPr>
           <p:blipFill>
-            <a:blip r:embed="rId6" cstate="print">
+            <a:blip r:embed="rId8" cstate="print">
               <a:extLst>
                 <a:ext uri="{28A0092B-C50C-407E-A947-70E740481C1C}">
                   <a14:useLocalDpi xmlns:a14="http://schemas.microsoft.com/office/drawing/2010/main" val="0"/>
@@ -3508,7 +4040,7 @@
             <p:nvPr/>
           </p:nvPicPr>
           <p:blipFill>
-            <a:blip r:embed="rId3">
+            <a:blip r:embed="rId5">
               <a:extLst>
                 <a:ext uri="{28A0092B-C50C-407E-A947-70E740481C1C}">
                   <a14:useLocalDpi xmlns:a14="http://schemas.microsoft.com/office/drawing/2010/main" val="0"/>
@@ -3549,8 +4081,113 @@
         </p:nvSpPr>
         <p:spPr>
           <a:xfrm>
-            <a:off x="3107635" y="2053244"/>
-            <a:ext cx="3978966" cy="769441"/>
+            <a:off x="5380538" y="1411069"/>
+            <a:ext cx="2799228" cy="523220"/>
+          </a:xfrm>
+          <a:prstGeom prst="rect">
+            <a:avLst/>
+          </a:prstGeom>
+          <a:noFill/>
+          <a:ln>
+            <a:noFill/>
+          </a:ln>
+          <a:effectLst/>
+        </p:spPr>
+        <p:txBody>
+          <a:bodyPr wrap="none" rtlCol="0">
+            <a:spAutoFit/>
+            <a:scene3d>
+              <a:camera prst="orthographicFront"/>
+              <a:lightRig rig="threePt" dir="t"/>
+            </a:scene3d>
+            <a:sp3d extrusionH="57150">
+              <a:bevelT w="82550" h="25400"/>
+            </a:sp3d>
+          </a:bodyPr>
+          <a:lstStyle/>
+          <a:p>
+            <a:pPr algn="r"/>
+            <a:r>
+              <a:rPr lang="en-US" sz="2400" dirty="0" smtClean="0">
+                <a:solidFill>
+                  <a:srgbClr val="287C28"/>
+                </a:solidFill>
+                <a:latin typeface="+mj-lt"/>
+                <a:cs typeface="Lucida Sans" pitchFamily="34" charset="0"/>
+              </a:rPr>
+              <a:t>for</a:t>
+            </a:r>
+            <a:r>
+              <a:rPr lang="en-US" sz="2000" dirty="0" smtClean="0">
+                <a:latin typeface="+mj-lt"/>
+                <a:cs typeface="Lucida Sans" pitchFamily="34" charset="0"/>
+              </a:rPr>
+              <a:t> </a:t>
+            </a:r>
+            <a:r>
+              <a:rPr lang="en-US" sz="2800" dirty="0" smtClean="0">
+                <a:solidFill>
+                  <a:srgbClr val="232323"/>
+                </a:solidFill>
+                <a:latin typeface="+mj-lt"/>
+                <a:cs typeface="Lucida Sans" pitchFamily="34" charset="0"/>
+              </a:rPr>
+              <a:t>Devs</a:t>
+            </a:r>
+            <a:r>
+              <a:rPr lang="en-US" sz="2800" dirty="0">
+                <a:latin typeface="+mj-lt"/>
+                <a:cs typeface="Lucida Sans" pitchFamily="34" charset="0"/>
+              </a:rPr>
+              <a:t> </a:t>
+            </a:r>
+            <a:r>
+              <a:rPr lang="en-US" sz="2400" dirty="0" smtClean="0">
+                <a:solidFill>
+                  <a:srgbClr val="287C28"/>
+                </a:solidFill>
+                <a:latin typeface="+mj-lt"/>
+                <a:cs typeface="Lucida Sans" pitchFamily="34" charset="0"/>
+              </a:rPr>
+              <a:t>&amp;</a:t>
+            </a:r>
+            <a:r>
+              <a:rPr lang="en-US" sz="1100" dirty="0" smtClean="0">
+                <a:latin typeface="+mj-lt"/>
+                <a:cs typeface="Lucida Sans" pitchFamily="34" charset="0"/>
+              </a:rPr>
+              <a:t> </a:t>
+            </a:r>
+            <a:r>
+              <a:rPr lang="en-US" sz="2800" dirty="0" smtClean="0">
+                <a:solidFill>
+                  <a:srgbClr val="232323"/>
+                </a:solidFill>
+                <a:latin typeface="+mj-lt"/>
+                <a:cs typeface="Lucida Sans" pitchFamily="34" charset="0"/>
+              </a:rPr>
+              <a:t>Testers</a:t>
+            </a:r>
+            <a:endParaRPr lang="en-US" sz="2800" dirty="0">
+              <a:solidFill>
+                <a:srgbClr val="232323"/>
+              </a:solidFill>
+              <a:latin typeface="+mj-lt"/>
+              <a:cs typeface="Lucida Sans" pitchFamily="34" charset="0"/>
+            </a:endParaRPr>
+          </a:p>
+        </p:txBody>
+      </p:sp>
+      <p:sp>
+        <p:nvSpPr>
+          <p:cNvPr id="8" name="TextBox 7"/>
+          <p:cNvSpPr txBox="1"/>
+          <p:nvPr/>
+        </p:nvSpPr>
+        <p:spPr>
+          <a:xfrm>
+            <a:off x="6627261" y="6456288"/>
+            <a:ext cx="509755" cy="184666"/>
           </a:xfrm>
           <a:prstGeom prst="rect">
             <a:avLst/>
@@ -3558,109 +4195,79 @@
           <a:noFill/>
         </p:spPr>
         <p:txBody>
-          <a:bodyPr wrap="square" rtlCol="0">
+          <a:bodyPr wrap="none" lIns="0" tIns="0" rIns="0" bIns="0" rtlCol="0">
             <a:spAutoFit/>
           </a:bodyPr>
           <a:lstStyle/>
           <a:p>
             <a:r>
-              <a:rPr lang="en-US" sz="4400" dirty="0" smtClean="0"/>
-              <a:t>4 </a:t>
-            </a:r>
-            <a:r>
-              <a:rPr lang="en-US" sz="4400" dirty="0" err="1" smtClean="0"/>
-              <a:t>Devs</a:t>
-            </a:r>
-            <a:r>
-              <a:rPr lang="en-US" sz="4400" dirty="0" smtClean="0"/>
-              <a:t> &amp; Testers</a:t>
-            </a:r>
-            <a:endParaRPr lang="en-US" sz="4400" dirty="0"/>
-          </a:p>
-        </p:txBody>
-      </p:sp>
-      <p:pic>
-        <p:nvPicPr>
-          <p:cNvPr id="3074" name="Picture 2" descr="\\THE-ARCHTK\a$\dev\porfolio\agile2011\img\raconteur-home.png"/>
-          <p:cNvPicPr>
-            <a:picLocks noChangeAspect="1" noChangeArrowheads="1"/>
-          </p:cNvPicPr>
+              <a:rPr lang="en-US" sz="1200" b="1" dirty="0" smtClean="0"/>
+              <a:t>@isel77</a:t>
+            </a:r>
+            <a:endParaRPr lang="en-US" sz="1200" b="1" dirty="0"/>
+          </a:p>
+        </p:txBody>
+      </p:sp>
+      <p:sp>
+        <p:nvSpPr>
+          <p:cNvPr id="17" name="TextBox 16"/>
+          <p:cNvSpPr txBox="1"/>
           <p:nvPr/>
-        </p:nvPicPr>
-        <p:blipFill>
-          <a:blip r:embed="rId7">
-            <a:extLst>
-              <a:ext uri="{28A0092B-C50C-407E-A947-70E740481C1C}">
-                <a14:useLocalDpi xmlns:a14="http://schemas.microsoft.com/office/drawing/2010/main" val="0"/>
-              </a:ext>
-            </a:extLst>
-          </a:blip>
-          <a:srcRect/>
-          <a:stretch>
-            <a:fillRect/>
-          </a:stretch>
-        </p:blipFill>
-        <p:spPr bwMode="auto">
+        </p:nvSpPr>
+        <p:spPr>
           <a:xfrm>
-            <a:off x="2667000" y="1892773"/>
-            <a:ext cx="5879825" cy="3441227"/>
+            <a:off x="7300879" y="6456288"/>
+            <a:ext cx="798873" cy="184666"/>
           </a:xfrm>
           <a:prstGeom prst="rect">
             <a:avLst/>
           </a:prstGeom>
           <a:noFill/>
-          <a:extLst>
-            <a:ext uri="{909E8E84-426E-40DD-AFC4-6F175D3DCCD1}">
-              <a14:hiddenFill xmlns:a14="http://schemas.microsoft.com/office/drawing/2010/main">
-                <a:solidFill>
-                  <a:srgbClr val="FFFFFF"/>
-                </a:solidFill>
-              </a14:hiddenFill>
-            </a:ext>
-          </a:extLst>
         </p:spPr>
-      </p:pic>
-      <p:pic>
-        <p:nvPicPr>
-          <p:cNvPr id="3075" name="Picture 3" descr="\\THE-ARCHTK\a$\dev\porfolio\agile2011\img\raconteur-wiki.png"/>
-          <p:cNvPicPr>
-            <a:picLocks noChangeAspect="1" noChangeArrowheads="1"/>
-          </p:cNvPicPr>
+        <p:txBody>
+          <a:bodyPr wrap="none" lIns="0" tIns="0" rIns="0" bIns="0" rtlCol="0">
+            <a:spAutoFit/>
+          </a:bodyPr>
+          <a:lstStyle/>
+          <a:p>
+            <a:r>
+              <a:rPr lang="en-US" sz="1200" b="1" dirty="0" smtClean="0"/>
+              <a:t>@jperkelens</a:t>
+            </a:r>
+            <a:endParaRPr lang="en-US" sz="1200" b="1" dirty="0"/>
+          </a:p>
+        </p:txBody>
+      </p:sp>
+      <p:sp>
+        <p:nvSpPr>
+          <p:cNvPr id="18" name="TextBox 17"/>
+          <p:cNvSpPr txBox="1"/>
           <p:nvPr/>
-        </p:nvPicPr>
-        <p:blipFill>
-          <a:blip r:embed="rId8">
-            <a:extLst>
-              <a:ext uri="{28A0092B-C50C-407E-A947-70E740481C1C}">
-                <a14:useLocalDpi xmlns:a14="http://schemas.microsoft.com/office/drawing/2010/main" val="0"/>
-              </a:ext>
-            </a:extLst>
-          </a:blip>
-          <a:srcRect/>
-          <a:stretch>
-            <a:fillRect/>
-          </a:stretch>
-        </p:blipFill>
-        <p:spPr bwMode="auto">
+        </p:nvSpPr>
+        <p:spPr>
           <a:xfrm>
-            <a:off x="4090103" y="1892773"/>
-            <a:ext cx="4444297" cy="3441227"/>
+            <a:off x="8161867" y="6456288"/>
+            <a:ext cx="597921" cy="184666"/>
           </a:xfrm>
           <a:prstGeom prst="rect">
             <a:avLst/>
           </a:prstGeom>
           <a:noFill/>
-          <a:extLst>
-            <a:ext uri="{909E8E84-426E-40DD-AFC4-6F175D3DCCD1}">
-              <a14:hiddenFill xmlns:a14="http://schemas.microsoft.com/office/drawing/2010/main">
-                <a:solidFill>
-                  <a:srgbClr val="FFFFFF"/>
-                </a:solidFill>
-              </a14:hiddenFill>
-            </a:ext>
-          </a:extLst>
         </p:spPr>
-      </p:pic>
+        <p:txBody>
+          <a:bodyPr wrap="none" lIns="0" tIns="0" rIns="0" bIns="0" rtlCol="0">
+            <a:spAutoFit/>
+          </a:bodyPr>
+          <a:lstStyle/>
+          <a:p>
+            <a:r>
+              <a:rPr lang="en-US" sz="1200" b="1" dirty="0" smtClean="0"/>
+              <a:t>@msuarz</a:t>
+            </a:r>
+            <a:endParaRPr lang="en-US" sz="1200" b="1" dirty="0"/>
+          </a:p>
+        </p:txBody>
+      </p:sp>
     </p:spTree>
     <p:extLst>
       <p:ext uri="{BB962C8B-B14F-4D97-AF65-F5344CB8AC3E}">
@@ -3674,7 +4281,171 @@
   <p:timing>
     <p:tnLst>
       <p:par>
-        <p:cTn id="1" dur="indefinite" restart="never" nodeType="tmRoot"/>
+        <p:cTn id="1" dur="indefinite" restart="never" nodeType="tmRoot">
+          <p:childTnLst>
+            <p:seq concurrent="1" nextAc="seek">
+              <p:cTn id="2" dur="indefinite" nodeType="mainSeq">
+                <p:childTnLst>
+                  <p:par>
+                    <p:cTn id="3" fill="hold">
+                      <p:stCondLst>
+                        <p:cond delay="indefinite"/>
+                      </p:stCondLst>
+                      <p:childTnLst>
+                        <p:par>
+                          <p:cTn id="4" fill="hold">
+                            <p:stCondLst>
+                              <p:cond delay="0"/>
+                            </p:stCondLst>
+                            <p:childTnLst>
+                              <p:par>
+                                <p:cTn id="5" presetID="10" presetClass="entr" presetSubtype="0" fill="hold" nodeType="clickEffect">
+                                  <p:stCondLst>
+                                    <p:cond delay="0"/>
+                                  </p:stCondLst>
+                                  <p:childTnLst>
+                                    <p:set>
+                                      <p:cBhvr>
+                                        <p:cTn id="6" dur="1" fill="hold">
+                                          <p:stCondLst>
+                                            <p:cond delay="0"/>
+                                          </p:stCondLst>
+                                        </p:cTn>
+                                        <p:tgtEl>
+                                          <p:spTgt spid="3074"/>
+                                        </p:tgtEl>
+                                        <p:attrNameLst>
+                                          <p:attrName>style.visibility</p:attrName>
+                                        </p:attrNameLst>
+                                      </p:cBhvr>
+                                      <p:to>
+                                        <p:strVal val="visible"/>
+                                      </p:to>
+                                    </p:set>
+                                    <p:animEffect transition="in" filter="fade">
+                                      <p:cBhvr>
+                                        <p:cTn id="7" dur="500"/>
+                                        <p:tgtEl>
+                                          <p:spTgt spid="3074"/>
+                                        </p:tgtEl>
+                                      </p:cBhvr>
+                                    </p:animEffect>
+                                  </p:childTnLst>
+                                </p:cTn>
+                              </p:par>
+                            </p:childTnLst>
+                          </p:cTn>
+                        </p:par>
+                      </p:childTnLst>
+                    </p:cTn>
+                  </p:par>
+                  <p:par>
+                    <p:cTn id="8" fill="hold">
+                      <p:stCondLst>
+                        <p:cond delay="indefinite"/>
+                      </p:stCondLst>
+                      <p:childTnLst>
+                        <p:par>
+                          <p:cTn id="9" fill="hold">
+                            <p:stCondLst>
+                              <p:cond delay="0"/>
+                            </p:stCondLst>
+                            <p:childTnLst>
+                              <p:par>
+                                <p:cTn id="10" presetID="10" presetClass="exit" presetSubtype="0" fill="hold" nodeType="clickEffect">
+                                  <p:stCondLst>
+                                    <p:cond delay="0"/>
+                                  </p:stCondLst>
+                                  <p:childTnLst>
+                                    <p:animEffect transition="out" filter="fade">
+                                      <p:cBhvr>
+                                        <p:cTn id="11" dur="500"/>
+                                        <p:tgtEl>
+                                          <p:spTgt spid="3074"/>
+                                        </p:tgtEl>
+                                      </p:cBhvr>
+                                    </p:animEffect>
+                                    <p:set>
+                                      <p:cBhvr>
+                                        <p:cTn id="12" dur="1" fill="hold">
+                                          <p:stCondLst>
+                                            <p:cond delay="499"/>
+                                          </p:stCondLst>
+                                        </p:cTn>
+                                        <p:tgtEl>
+                                          <p:spTgt spid="3074"/>
+                                        </p:tgtEl>
+                                        <p:attrNameLst>
+                                          <p:attrName>style.visibility</p:attrName>
+                                        </p:attrNameLst>
+                                      </p:cBhvr>
+                                      <p:to>
+                                        <p:strVal val="hidden"/>
+                                      </p:to>
+                                    </p:set>
+                                  </p:childTnLst>
+                                </p:cTn>
+                              </p:par>
+                              <p:par>
+                                <p:cTn id="13" presetID="10" presetClass="entr" presetSubtype="0" fill="hold" nodeType="withEffect">
+                                  <p:stCondLst>
+                                    <p:cond delay="0"/>
+                                  </p:stCondLst>
+                                  <p:childTnLst>
+                                    <p:set>
+                                      <p:cBhvr>
+                                        <p:cTn id="14" dur="1" fill="hold">
+                                          <p:stCondLst>
+                                            <p:cond delay="0"/>
+                                          </p:stCondLst>
+                                        </p:cTn>
+                                        <p:tgtEl>
+                                          <p:spTgt spid="3075"/>
+                                        </p:tgtEl>
+                                        <p:attrNameLst>
+                                          <p:attrName>style.visibility</p:attrName>
+                                        </p:attrNameLst>
+                                      </p:cBhvr>
+                                      <p:to>
+                                        <p:strVal val="visible"/>
+                                      </p:to>
+                                    </p:set>
+                                    <p:animEffect transition="in" filter="fade">
+                                      <p:cBhvr>
+                                        <p:cTn id="15" dur="500"/>
+                                        <p:tgtEl>
+                                          <p:spTgt spid="3075"/>
+                                        </p:tgtEl>
+                                      </p:cBhvr>
+                                    </p:animEffect>
+                                  </p:childTnLst>
+                                </p:cTn>
+                              </p:par>
+                            </p:childTnLst>
+                          </p:cTn>
+                        </p:par>
+                      </p:childTnLst>
+                    </p:cTn>
+                  </p:par>
+                </p:childTnLst>
+              </p:cTn>
+              <p:prevCondLst>
+                <p:cond evt="onPrev" delay="0">
+                  <p:tgtEl>
+                    <p:sldTgt/>
+                  </p:tgtEl>
+                </p:cond>
+              </p:prevCondLst>
+              <p:nextCondLst>
+                <p:cond evt="onNext" delay="0">
+                  <p:tgtEl>
+                    <p:sldTgt/>
+                  </p:tgtEl>
+                </p:cond>
+              </p:nextCondLst>
+            </p:seq>
+          </p:childTnLst>
+        </p:cTn>
       </p:par>
     </p:tnLst>
   </p:timing>
@@ -3744,8 +4515,49 @@
         </p:blipFill>
         <p:spPr bwMode="auto">
           <a:xfrm>
-            <a:off x="719138" y="1523999"/>
-            <a:ext cx="7705725" cy="4410075"/>
+            <a:off x="997225" y="1089830"/>
+            <a:ext cx="7149551" cy="4091770"/>
+          </a:xfrm>
+          <a:prstGeom prst="rect">
+            <a:avLst/>
+          </a:prstGeom>
+          <a:noFill/>
+          <a:extLst>
+            <a:ext uri="{909E8E84-426E-40DD-AFC4-6F175D3DCCD1}">
+              <a14:hiddenFill xmlns:a14="http://schemas.microsoft.com/office/drawing/2010/main">
+                <a:solidFill>
+                  <a:srgbClr val="FFFFFF"/>
+                </a:solidFill>
+              </a14:hiddenFill>
+            </a:ext>
+          </a:extLst>
+        </p:spPr>
+      </p:pic>
+      <p:pic>
+        <p:nvPicPr>
+          <p:cNvPr id="4" name="Picture 2" descr="\\THE-ARCHTK\a$\dev\porfolio\agile2011\img\_0001_elmer-tester.png"/>
+          <p:cNvPicPr>
+            <a:picLocks noChangeAspect="1" noChangeArrowheads="1"/>
+          </p:cNvPicPr>
+          <p:nvPr/>
+        </p:nvPicPr>
+        <p:blipFill>
+          <a:blip r:embed="rId3">
+            <a:extLst>
+              <a:ext uri="{28A0092B-C50C-407E-A947-70E740481C1C}">
+                <a14:useLocalDpi xmlns:a14="http://schemas.microsoft.com/office/drawing/2010/main" val="0"/>
+              </a:ext>
+            </a:extLst>
+          </a:blip>
+          <a:srcRect/>
+          <a:stretch>
+            <a:fillRect/>
+          </a:stretch>
+        </p:blipFill>
+        <p:spPr bwMode="auto">
+          <a:xfrm>
+            <a:off x="7162800" y="4114800"/>
+            <a:ext cx="990600" cy="1781175"/>
           </a:xfrm>
           <a:prstGeom prst="rect">
             <a:avLst/>
@@ -3845,7 +4657,7 @@
         </p:blipFill>
         <p:spPr bwMode="auto">
           <a:xfrm>
-            <a:off x="4876800" y="1447800"/>
+            <a:off x="4876800" y="1219200"/>
             <a:ext cx="3486149" cy="4931827"/>
           </a:xfrm>
           <a:prstGeom prst="rect">
@@ -3886,8 +4698,49 @@
         </p:blipFill>
         <p:spPr bwMode="auto">
           <a:xfrm>
-            <a:off x="657225" y="1447800"/>
+            <a:off x="657225" y="1219200"/>
             <a:ext cx="3923982" cy="2486565"/>
+          </a:xfrm>
+          <a:prstGeom prst="rect">
+            <a:avLst/>
+          </a:prstGeom>
+          <a:noFill/>
+          <a:extLst>
+            <a:ext uri="{909E8E84-426E-40DD-AFC4-6F175D3DCCD1}">
+              <a14:hiddenFill xmlns:a14="http://schemas.microsoft.com/office/drawing/2010/main">
+                <a:solidFill>
+                  <a:srgbClr val="FFFFFF"/>
+                </a:solidFill>
+              </a14:hiddenFill>
+            </a:ext>
+          </a:extLst>
+        </p:spPr>
+      </p:pic>
+      <p:pic>
+        <p:nvPicPr>
+          <p:cNvPr id="6" name="Picture 2" descr="\\THE-ARCHTK\a$\dev\porfolio\agile2011\img\_0001_elmer-tester.png"/>
+          <p:cNvPicPr>
+            <a:picLocks noChangeAspect="1" noChangeArrowheads="1"/>
+          </p:cNvPicPr>
+          <p:nvPr/>
+        </p:nvPicPr>
+        <p:blipFill>
+          <a:blip r:embed="rId4">
+            <a:extLst>
+              <a:ext uri="{28A0092B-C50C-407E-A947-70E740481C1C}">
+                <a14:useLocalDpi xmlns:a14="http://schemas.microsoft.com/office/drawing/2010/main" val="0"/>
+              </a:ext>
+            </a:extLst>
+          </a:blip>
+          <a:srcRect/>
+          <a:stretch>
+            <a:fillRect/>
+          </a:stretch>
+        </p:blipFill>
+        <p:spPr bwMode="auto">
+          <a:xfrm>
+            <a:off x="3200400" y="3362390"/>
+            <a:ext cx="990600" cy="1781175"/>
           </a:xfrm>
           <a:prstGeom prst="rect">
             <a:avLst/>
@@ -3926,6 +4779,9 @@
                     <p:cTn id="3" fill="hold">
                       <p:stCondLst>
                         <p:cond delay="indefinite"/>
+                        <p:cond evt="onBegin" delay="0">
+                          <p:tn val="2"/>
+                        </p:cond>
                       </p:stCondLst>
                       <p:childTnLst>
                         <p:par>
@@ -3935,7 +4791,7 @@
                             </p:stCondLst>
                             <p:childTnLst>
                               <p:par>
-                                <p:cTn id="5" presetID="1" presetClass="entr" presetSubtype="0" fill="hold" nodeType="clickEffect">
+                                <p:cTn id="5" presetID="10" presetClass="entr" presetSubtype="0" fill="hold" nodeType="withEffect">
                                   <p:stCondLst>
                                     <p:cond delay="0"/>
                                   </p:stCondLst>
@@ -3958,6 +4814,14 @@
                                         <p:strVal val="visible"/>
                                       </p:to>
                                     </p:set>
+                                    <p:animEffect transition="in" filter="fade">
+                                      <p:cBhvr>
+                                        <p:cTn id="7" dur="500"/>
+                                        <p:tgtEl>
+                                          <p:spTgt spid="5"/>
+                                        </p:tgtEl>
+                                      </p:cBhvr>
+                                    </p:animEffect>
                                   </p:childTnLst>
                                 </p:cTn>
                               </p:par>
@@ -3968,26 +4832,26 @@
                     </p:cTn>
                   </p:par>
                   <p:par>
-                    <p:cTn id="7" fill="hold">
+                    <p:cTn id="8" fill="hold">
                       <p:stCondLst>
                         <p:cond delay="indefinite"/>
                       </p:stCondLst>
                       <p:childTnLst>
                         <p:par>
-                          <p:cTn id="8" fill="hold">
+                          <p:cTn id="9" fill="hold">
                             <p:stCondLst>
                               <p:cond delay="0"/>
                             </p:stCondLst>
                             <p:childTnLst>
                               <p:par>
-                                <p:cTn id="9" presetID="1" presetClass="entr" presetSubtype="0" fill="hold" nodeType="clickEffect">
+                                <p:cTn id="10" presetID="10" presetClass="entr" presetSubtype="0" fill="hold" nodeType="clickEffect">
                                   <p:stCondLst>
                                     <p:cond delay="0"/>
                                   </p:stCondLst>
                                   <p:childTnLst>
                                     <p:set>
                                       <p:cBhvr>
-                                        <p:cTn id="10" dur="1" fill="hold">
+                                        <p:cTn id="11" dur="1" fill="hold">
                                           <p:stCondLst>
                                             <p:cond delay="0"/>
                                           </p:stCondLst>
@@ -4003,6 +4867,14 @@
                                         <p:strVal val="visible"/>
                                       </p:to>
                                     </p:set>
+                                    <p:animEffect transition="in" filter="fade">
+                                      <p:cBhvr>
+                                        <p:cTn id="12" dur="500"/>
+                                        <p:tgtEl>
+                                          <p:spTgt spid="4"/>
+                                        </p:tgtEl>
+                                      </p:cBhvr>
+                                    </p:animEffect>
                                   </p:childTnLst>
                                 </p:cTn>
                               </p:par>
@@ -4100,7 +4972,7 @@
         </p:blipFill>
         <p:spPr bwMode="auto">
           <a:xfrm>
-            <a:off x="3733800" y="1261968"/>
+            <a:off x="2895600" y="990600"/>
             <a:ext cx="3400425" cy="1842234"/>
           </a:xfrm>
           <a:prstGeom prst="rect">
@@ -4141,8 +5013,49 @@
         </p:blipFill>
         <p:spPr bwMode="auto">
           <a:xfrm>
-            <a:off x="3733800" y="3200400"/>
+            <a:off x="3962400" y="2031076"/>
             <a:ext cx="3941083" cy="3457470"/>
+          </a:xfrm>
+          <a:prstGeom prst="rect">
+            <a:avLst/>
+          </a:prstGeom>
+          <a:noFill/>
+          <a:extLst>
+            <a:ext uri="{909E8E84-426E-40DD-AFC4-6F175D3DCCD1}">
+              <a14:hiddenFill xmlns:a14="http://schemas.microsoft.com/office/drawing/2010/main">
+                <a:solidFill>
+                  <a:srgbClr val="FFFFFF"/>
+                </a:solidFill>
+              </a14:hiddenFill>
+            </a:ext>
+          </a:extLst>
+        </p:spPr>
+      </p:pic>
+      <p:pic>
+        <p:nvPicPr>
+          <p:cNvPr id="11266" name="Picture 2" descr="\\THE-ARCHTK\a$\dev\porfolio\agile2011\img\_0001_elmer-tester.png"/>
+          <p:cNvPicPr>
+            <a:picLocks noChangeAspect="1" noChangeArrowheads="1"/>
+          </p:cNvPicPr>
+          <p:nvPr/>
+        </p:nvPicPr>
+        <p:blipFill>
+          <a:blip r:embed="rId4">
+            <a:extLst>
+              <a:ext uri="{28A0092B-C50C-407E-A947-70E740481C1C}">
+                <a14:useLocalDpi xmlns:a14="http://schemas.microsoft.com/office/drawing/2010/main" val="0"/>
+              </a:ext>
+            </a:extLst>
+          </a:blip>
+          <a:srcRect/>
+          <a:stretch>
+            <a:fillRect/>
+          </a:stretch>
+        </p:blipFill>
+        <p:spPr bwMode="auto">
+          <a:xfrm>
+            <a:off x="7620000" y="4114800"/>
+            <a:ext cx="990600" cy="1781175"/>
           </a:xfrm>
           <a:prstGeom prst="rect">
             <a:avLst/>
@@ -4181,6 +5094,9 @@
                     <p:cTn id="3" fill="hold">
                       <p:stCondLst>
                         <p:cond delay="indefinite"/>
+                        <p:cond evt="onBegin" delay="0">
+                          <p:tn val="2"/>
+                        </p:cond>
                       </p:stCondLst>
                       <p:childTnLst>
                         <p:par>
@@ -4190,7 +5106,7 @@
                             </p:stCondLst>
                             <p:childTnLst>
                               <p:par>
-                                <p:cTn id="5" presetID="1" presetClass="entr" presetSubtype="0" fill="hold" nodeType="clickEffect">
+                                <p:cTn id="5" presetID="10" presetClass="entr" presetSubtype="0" fill="hold" nodeType="withEffect">
                                   <p:stCondLst>
                                     <p:cond delay="0"/>
                                   </p:stCondLst>
@@ -4213,6 +5129,14 @@
                                         <p:strVal val="visible"/>
                                       </p:to>
                                     </p:set>
+                                    <p:animEffect transition="in" filter="fade">
+                                      <p:cBhvr>
+                                        <p:cTn id="7" dur="500"/>
+                                        <p:tgtEl>
+                                          <p:spTgt spid="6"/>
+                                        </p:tgtEl>
+                                      </p:cBhvr>
+                                    </p:animEffect>
                                   </p:childTnLst>
                                 </p:cTn>
                               </p:par>
@@ -4223,26 +5147,26 @@
                     </p:cTn>
                   </p:par>
                   <p:par>
-                    <p:cTn id="7" fill="hold">
+                    <p:cTn id="8" fill="hold">
                       <p:stCondLst>
                         <p:cond delay="indefinite"/>
                       </p:stCondLst>
                       <p:childTnLst>
                         <p:par>
-                          <p:cTn id="8" fill="hold">
+                          <p:cTn id="9" fill="hold">
                             <p:stCondLst>
                               <p:cond delay="0"/>
                             </p:stCondLst>
                             <p:childTnLst>
                               <p:par>
-                                <p:cTn id="9" presetID="1" presetClass="entr" presetSubtype="0" fill="hold" nodeType="clickEffect">
+                                <p:cTn id="10" presetID="10" presetClass="entr" presetSubtype="0" fill="hold" nodeType="clickEffect">
                                   <p:stCondLst>
                                     <p:cond delay="0"/>
                                   </p:stCondLst>
                                   <p:childTnLst>
                                     <p:set>
                                       <p:cBhvr>
-                                        <p:cTn id="10" dur="1" fill="hold">
+                                        <p:cTn id="11" dur="1" fill="hold">
                                           <p:stCondLst>
                                             <p:cond delay="0"/>
                                           </p:stCondLst>
@@ -4258,6 +5182,14 @@
                                         <p:strVal val="visible"/>
                                       </p:to>
                                     </p:set>
+                                    <p:animEffect transition="in" filter="fade">
+                                      <p:cBhvr>
+                                        <p:cTn id="12" dur="500"/>
+                                        <p:tgtEl>
+                                          <p:spTgt spid="7"/>
+                                        </p:tgtEl>
+                                      </p:cBhvr>
+                                    </p:animEffect>
                                   </p:childTnLst>
                                 </p:cTn>
                               </p:par>
@@ -4334,7 +5266,7 @@
       </p:sp>
       <p:pic>
         <p:nvPicPr>
-          <p:cNvPr id="4" name="Picture 3" descr="A:\dev\porfolio\agile2011\img\RenameStep.png"/>
+          <p:cNvPr id="5" name="Picture 2" descr="\\THE-ARCHTK\a$\dev\porfolio\agile2011\img\_0000s_0014_TriggerRename.png"/>
           <p:cNvPicPr>
             <a:picLocks noChangeAspect="1" noChangeArrowheads="1"/>
           </p:cNvPicPr>
@@ -4355,8 +5287,8 @@
         </p:blipFill>
         <p:spPr bwMode="auto">
           <a:xfrm>
-            <a:off x="3733800" y="4800600"/>
-            <a:ext cx="4572000" cy="1687086"/>
+            <a:off x="2362200" y="914400"/>
+            <a:ext cx="4572000" cy="3149150"/>
           </a:xfrm>
           <a:prstGeom prst="rect">
             <a:avLst/>
@@ -4375,7 +5307,7 @@
       </p:pic>
       <p:pic>
         <p:nvPicPr>
-          <p:cNvPr id="5" name="Picture 2" descr="\\THE-ARCHTK\a$\dev\porfolio\agile2011\img\_0000s_0014_TriggerRename.png"/>
+          <p:cNvPr id="4" name="Picture 3" descr="A:\dev\porfolio\agile2011\img\RenameStep.png"/>
           <p:cNvPicPr>
             <a:picLocks noChangeAspect="1" noChangeArrowheads="1"/>
           </p:cNvPicPr>
@@ -4396,8 +5328,49 @@
         </p:blipFill>
         <p:spPr bwMode="auto">
           <a:xfrm>
-            <a:off x="3733800" y="1422850"/>
-            <a:ext cx="4572000" cy="3149150"/>
+            <a:off x="3429000" y="3505200"/>
+            <a:ext cx="4572000" cy="1687086"/>
+          </a:xfrm>
+          <a:prstGeom prst="rect">
+            <a:avLst/>
+          </a:prstGeom>
+          <a:noFill/>
+          <a:extLst>
+            <a:ext uri="{909E8E84-426E-40DD-AFC4-6F175D3DCCD1}">
+              <a14:hiddenFill xmlns:a14="http://schemas.microsoft.com/office/drawing/2010/main">
+                <a:solidFill>
+                  <a:srgbClr val="FFFFFF"/>
+                </a:solidFill>
+              </a14:hiddenFill>
+            </a:ext>
+          </a:extLst>
+        </p:spPr>
+      </p:pic>
+      <p:pic>
+        <p:nvPicPr>
+          <p:cNvPr id="12290" name="Picture 2" descr="\\THE-ARCHTK\a$\dev\porfolio\agile2011\img\_0001_elmer-tester.png"/>
+          <p:cNvPicPr>
+            <a:picLocks noChangeAspect="1" noChangeArrowheads="1"/>
+          </p:cNvPicPr>
+          <p:nvPr/>
+        </p:nvPicPr>
+        <p:blipFill>
+          <a:blip r:embed="rId4">
+            <a:extLst>
+              <a:ext uri="{28A0092B-C50C-407E-A947-70E740481C1C}">
+                <a14:useLocalDpi xmlns:a14="http://schemas.microsoft.com/office/drawing/2010/main" val="0"/>
+              </a:ext>
+            </a:extLst>
+          </a:blip>
+          <a:srcRect/>
+          <a:stretch>
+            <a:fillRect/>
+          </a:stretch>
+        </p:blipFill>
+        <p:spPr bwMode="auto">
+          <a:xfrm>
+            <a:off x="7620000" y="3520440"/>
+            <a:ext cx="990600" cy="1781175"/>
           </a:xfrm>
           <a:prstGeom prst="rect">
             <a:avLst/>
@@ -4427,7 +5400,139 @@
   <p:timing>
     <p:tnLst>
       <p:par>
-        <p:cTn id="1" dur="indefinite" restart="never" nodeType="tmRoot"/>
+        <p:cTn id="1" dur="indefinite" restart="never" nodeType="tmRoot">
+          <p:childTnLst>
+            <p:seq concurrent="1" nextAc="seek">
+              <p:cTn id="2" dur="indefinite" nodeType="mainSeq">
+                <p:childTnLst>
+                  <p:par>
+                    <p:cTn id="3" fill="hold">
+                      <p:stCondLst>
+                        <p:cond delay="indefinite"/>
+                        <p:cond evt="onBegin" delay="0">
+                          <p:tn val="2"/>
+                        </p:cond>
+                      </p:stCondLst>
+                      <p:childTnLst>
+                        <p:par>
+                          <p:cTn id="4" fill="hold">
+                            <p:stCondLst>
+                              <p:cond delay="0"/>
+                            </p:stCondLst>
+                            <p:childTnLst>
+                              <p:par>
+                                <p:cTn id="5" presetID="10" presetClass="entr" presetSubtype="0" fill="hold" nodeType="withEffect">
+                                  <p:stCondLst>
+                                    <p:cond delay="0"/>
+                                  </p:stCondLst>
+                                  <p:childTnLst>
+                                    <p:set>
+                                      <p:cBhvr>
+                                        <p:cTn id="6" dur="1" fill="hold">
+                                          <p:stCondLst>
+                                            <p:cond delay="0"/>
+                                          </p:stCondLst>
+                                        </p:cTn>
+                                        <p:tgtEl>
+                                          <p:spTgt spid="5"/>
+                                        </p:tgtEl>
+                                        <p:attrNameLst>
+                                          <p:attrName>style.visibility</p:attrName>
+                                        </p:attrNameLst>
+                                      </p:cBhvr>
+                                      <p:to>
+                                        <p:strVal val="visible"/>
+                                      </p:to>
+                                    </p:set>
+                                    <p:animEffect transition="in" filter="fade">
+                                      <p:cBhvr>
+                                        <p:cTn id="7" dur="500"/>
+                                        <p:tgtEl>
+                                          <p:spTgt spid="5"/>
+                                        </p:tgtEl>
+                                      </p:cBhvr>
+                                    </p:animEffect>
+                                  </p:childTnLst>
+                                </p:cTn>
+                              </p:par>
+                            </p:childTnLst>
+                          </p:cTn>
+                        </p:par>
+                      </p:childTnLst>
+                    </p:cTn>
+                  </p:par>
+                  <p:par>
+                    <p:cTn id="8" fill="hold">
+                      <p:stCondLst>
+                        <p:cond delay="indefinite"/>
+                      </p:stCondLst>
+                      <p:childTnLst>
+                        <p:par>
+                          <p:cTn id="9" fill="hold">
+                            <p:stCondLst>
+                              <p:cond delay="0"/>
+                            </p:stCondLst>
+                            <p:childTnLst>
+                              <p:par>
+                                <p:cTn id="10" presetID="10" presetClass="entr" presetSubtype="0" fill="hold" nodeType="clickEffect">
+                                  <p:stCondLst>
+                                    <p:cond delay="0"/>
+                                  </p:stCondLst>
+                                  <p:childTnLst>
+                                    <p:set>
+                                      <p:cBhvr>
+                                        <p:cTn id="11" dur="1" fill="hold">
+                                          <p:stCondLst>
+                                            <p:cond delay="0"/>
+                                          </p:stCondLst>
+                                        </p:cTn>
+                                        <p:tgtEl>
+                                          <p:spTgt spid="4"/>
+                                        </p:tgtEl>
+                                        <p:attrNameLst>
+                                          <p:attrName>style.visibility</p:attrName>
+                                        </p:attrNameLst>
+                                      </p:cBhvr>
+                                      <p:to>
+                                        <p:strVal val="visible"/>
+                                      </p:to>
+                                    </p:set>
+                                    <p:animEffect transition="in" filter="fade">
+                                      <p:cBhvr>
+                                        <p:cTn id="12" dur="500"/>
+                                        <p:tgtEl>
+                                          <p:spTgt spid="4"/>
+                                        </p:tgtEl>
+                                      </p:cBhvr>
+                                    </p:animEffect>
+                                  </p:childTnLst>
+                                </p:cTn>
+                              </p:par>
+                            </p:childTnLst>
+                          </p:cTn>
+                        </p:par>
+                      </p:childTnLst>
+                    </p:cTn>
+                  </p:par>
+                </p:childTnLst>
+              </p:cTn>
+              <p:prevCondLst>
+                <p:cond evt="onPrev" delay="0">
+                  <p:tgtEl>
+                    <p:sldTgt/>
+                  </p:tgtEl>
+                </p:cond>
+              </p:prevCondLst>
+              <p:nextCondLst>
+                <p:cond evt="onNext" delay="0">
+                  <p:tgtEl>
+                    <p:sldTgt/>
+                  </p:tgtEl>
+                </p:cond>
+              </p:nextCondLst>
+            </p:seq>
+          </p:childTnLst>
+        </p:cTn>
       </p:par>
     </p:tnLst>
   </p:timing>
@@ -4467,8 +5572,8 @@
           <a:lstStyle/>
           <a:p>
             <a:r>
-              <a:rPr lang="en-US" dirty="0" smtClean="0"/>
-              <a:t>Free text</a:t>
+              <a:rPr lang="en-US" dirty="0" err="1" smtClean="0"/>
+              <a:t>MSpec</a:t>
             </a:r>
             <a:endParaRPr lang="en-US" dirty="0"/>
           </a:p>
@@ -4499,6 +5604,47 @@
           <a:xfrm>
             <a:off x="999066" y="1524000"/>
             <a:ext cx="7145869" cy="3762375"/>
+          </a:xfrm>
+          <a:prstGeom prst="rect">
+            <a:avLst/>
+          </a:prstGeom>
+          <a:noFill/>
+          <a:extLst>
+            <a:ext uri="{909E8E84-426E-40DD-AFC4-6F175D3DCCD1}">
+              <a14:hiddenFill xmlns:a14="http://schemas.microsoft.com/office/drawing/2010/main">
+                <a:solidFill>
+                  <a:srgbClr val="FFFFFF"/>
+                </a:solidFill>
+              </a14:hiddenFill>
+            </a:ext>
+          </a:extLst>
+        </p:spPr>
+      </p:pic>
+      <p:pic>
+        <p:nvPicPr>
+          <p:cNvPr id="13314" name="Picture 2" descr="\\THE-ARCHTK\a$\dev\porfolio\agile2011\img\_0000_Goofy-dev-copy.png"/>
+          <p:cNvPicPr>
+            <a:picLocks noChangeAspect="1" noChangeArrowheads="1"/>
+          </p:cNvPicPr>
+          <p:nvPr/>
+        </p:nvPicPr>
+        <p:blipFill>
+          <a:blip r:embed="rId3">
+            <a:extLst>
+              <a:ext uri="{28A0092B-C50C-407E-A947-70E740481C1C}">
+                <a14:useLocalDpi xmlns:a14="http://schemas.microsoft.com/office/drawing/2010/main" val="0"/>
+              </a:ext>
+            </a:extLst>
+          </a:blip>
+          <a:srcRect/>
+          <a:stretch>
+            <a:fillRect/>
+          </a:stretch>
+        </p:blipFill>
+        <p:spPr bwMode="auto">
+          <a:xfrm>
+            <a:off x="7467600" y="3638550"/>
+            <a:ext cx="752475" cy="2305050"/>
           </a:xfrm>
           <a:prstGeom prst="rect">
             <a:avLst/>
@@ -4657,6 +5803,47 @@
           </a:extLst>
         </p:spPr>
       </p:pic>
+      <p:pic>
+        <p:nvPicPr>
+          <p:cNvPr id="6" name="Picture 2" descr="\\THE-ARCHTK\a$\dev\porfolio\agile2011\img\_0000_Goofy-dev-copy.png"/>
+          <p:cNvPicPr>
+            <a:picLocks noChangeAspect="1" noChangeArrowheads="1"/>
+          </p:cNvPicPr>
+          <p:nvPr/>
+        </p:nvPicPr>
+        <p:blipFill>
+          <a:blip r:embed="rId4">
+            <a:extLst>
+              <a:ext uri="{28A0092B-C50C-407E-A947-70E740481C1C}">
+                <a14:useLocalDpi xmlns:a14="http://schemas.microsoft.com/office/drawing/2010/main" val="0"/>
+              </a:ext>
+            </a:extLst>
+          </a:blip>
+          <a:srcRect/>
+          <a:stretch>
+            <a:fillRect/>
+          </a:stretch>
+        </p:blipFill>
+        <p:spPr bwMode="auto">
+          <a:xfrm>
+            <a:off x="4343400" y="4038600"/>
+            <a:ext cx="752475" cy="2305050"/>
+          </a:xfrm>
+          <a:prstGeom prst="rect">
+            <a:avLst/>
+          </a:prstGeom>
+          <a:noFill/>
+          <a:extLst>
+            <a:ext uri="{909E8E84-426E-40DD-AFC4-6F175D3DCCD1}">
+              <a14:hiddenFill xmlns:a14="http://schemas.microsoft.com/office/drawing/2010/main">
+                <a:solidFill>
+                  <a:srgbClr val="FFFFFF"/>
+                </a:solidFill>
+              </a14:hiddenFill>
+            </a:ext>
+          </a:extLst>
+        </p:spPr>
+      </p:pic>
     </p:spTree>
     <p:extLst>
       <p:ext uri="{BB962C8B-B14F-4D97-AF65-F5344CB8AC3E}">
@@ -4679,6 +5866,9 @@
                     <p:cTn id="3" fill="hold">
                       <p:stCondLst>
                         <p:cond delay="indefinite"/>
+                        <p:cond evt="onBegin" delay="0">
+                          <p:tn val="2"/>
+                        </p:cond>
                       </p:stCondLst>
                       <p:childTnLst>
                         <p:par>
@@ -4688,7 +5878,7 @@
                             </p:stCondLst>
                             <p:childTnLst>
                               <p:par>
-                                <p:cTn id="5" presetID="1" presetClass="entr" presetSubtype="0" fill="hold" nodeType="clickEffect">
+                                <p:cTn id="5" presetID="10" presetClass="entr" presetSubtype="0" fill="hold" nodeType="withEffect">
                                   <p:stCondLst>
                                     <p:cond delay="0"/>
                                   </p:stCondLst>
@@ -4696,6 +5886,59 @@
                                     <p:set>
                                       <p:cBhvr>
                                         <p:cTn id="6" dur="1" fill="hold">
+                                          <p:stCondLst>
+                                            <p:cond delay="0"/>
+                                          </p:stCondLst>
+                                        </p:cTn>
+                                        <p:tgtEl>
+                                          <p:spTgt spid="1026"/>
+                                        </p:tgtEl>
+                                        <p:attrNameLst>
+                                          <p:attrName>style.visibility</p:attrName>
+                                        </p:attrNameLst>
+                                      </p:cBhvr>
+                                      <p:to>
+                                        <p:strVal val="visible"/>
+                                      </p:to>
+                                    </p:set>
+                                    <p:animEffect transition="in" filter="fade">
+                                      <p:cBhvr>
+                                        <p:cTn id="7" dur="500"/>
+                                        <p:tgtEl>
+                                          <p:spTgt spid="1026"/>
+                                        </p:tgtEl>
+                                      </p:cBhvr>
+                                    </p:animEffect>
+                                  </p:childTnLst>
+                                </p:cTn>
+                              </p:par>
+                            </p:childTnLst>
+                          </p:cTn>
+                        </p:par>
+                      </p:childTnLst>
+                    </p:cTn>
+                  </p:par>
+                  <p:par>
+                    <p:cTn id="8" fill="hold">
+                      <p:stCondLst>
+                        <p:cond delay="indefinite"/>
+                      </p:stCondLst>
+                      <p:childTnLst>
+                        <p:par>
+                          <p:cTn id="9" fill="hold">
+                            <p:stCondLst>
+                              <p:cond delay="0"/>
+                            </p:stCondLst>
+                            <p:childTnLst>
+                              <p:par>
+                                <p:cTn id="10" presetID="10" presetClass="entr" presetSubtype="0" fill="hold" nodeType="clickEffect">
+                                  <p:stCondLst>
+                                    <p:cond delay="0"/>
+                                  </p:stCondLst>
+                                  <p:childTnLst>
+                                    <p:set>
+                                      <p:cBhvr>
+                                        <p:cTn id="11" dur="1" fill="hold">
                                           <p:stCondLst>
                                             <p:cond delay="0"/>
                                           </p:stCondLst>
@@ -4711,6 +5954,14 @@
                                         <p:strVal val="visible"/>
                                       </p:to>
                                     </p:set>
+                                    <p:animEffect transition="in" filter="fade">
+                                      <p:cBhvr>
+                                        <p:cTn id="12" dur="500"/>
+                                        <p:tgtEl>
+                                          <p:spTgt spid="4"/>
+                                        </p:tgtEl>
+                                      </p:cBhvr>
+                                    </p:animEffect>
                                   </p:childTnLst>
                                 </p:cTn>
                               </p:par>
@@ -4867,6 +6118,47 @@
           </a:extLst>
         </p:spPr>
       </p:pic>
+      <p:pic>
+        <p:nvPicPr>
+          <p:cNvPr id="6" name="Picture 2" descr="\\THE-ARCHTK\a$\dev\porfolio\agile2011\img\_0000_Goofy-dev-copy.png"/>
+          <p:cNvPicPr>
+            <a:picLocks noChangeAspect="1" noChangeArrowheads="1"/>
+          </p:cNvPicPr>
+          <p:nvPr/>
+        </p:nvPicPr>
+        <p:blipFill>
+          <a:blip r:embed="rId4">
+            <a:extLst>
+              <a:ext uri="{28A0092B-C50C-407E-A947-70E740481C1C}">
+                <a14:useLocalDpi xmlns:a14="http://schemas.microsoft.com/office/drawing/2010/main" val="0"/>
+              </a:ext>
+            </a:extLst>
+          </a:blip>
+          <a:srcRect/>
+          <a:stretch>
+            <a:fillRect/>
+          </a:stretch>
+        </p:blipFill>
+        <p:spPr bwMode="auto">
+          <a:xfrm>
+            <a:off x="3971925" y="4419600"/>
+            <a:ext cx="752475" cy="2305050"/>
+          </a:xfrm>
+          <a:prstGeom prst="rect">
+            <a:avLst/>
+          </a:prstGeom>
+          <a:noFill/>
+          <a:extLst>
+            <a:ext uri="{909E8E84-426E-40DD-AFC4-6F175D3DCCD1}">
+              <a14:hiddenFill xmlns:a14="http://schemas.microsoft.com/office/drawing/2010/main">
+                <a:solidFill>
+                  <a:srgbClr val="FFFFFF"/>
+                </a:solidFill>
+              </a14:hiddenFill>
+            </a:ext>
+          </a:extLst>
+        </p:spPr>
+      </p:pic>
     </p:spTree>
     <p:extLst>
       <p:ext uri="{BB962C8B-B14F-4D97-AF65-F5344CB8AC3E}">
@@ -4952,6 +6244,47 @@
           <a:xfrm>
             <a:off x="656432" y="1447800"/>
             <a:ext cx="7831137" cy="4872167"/>
+          </a:xfrm>
+          <a:prstGeom prst="rect">
+            <a:avLst/>
+          </a:prstGeom>
+          <a:noFill/>
+          <a:extLst>
+            <a:ext uri="{909E8E84-426E-40DD-AFC4-6F175D3DCCD1}">
+              <a14:hiddenFill xmlns:a14="http://schemas.microsoft.com/office/drawing/2010/main">
+                <a:solidFill>
+                  <a:srgbClr val="FFFFFF"/>
+                </a:solidFill>
+              </a14:hiddenFill>
+            </a:ext>
+          </a:extLst>
+        </p:spPr>
+      </p:pic>
+      <p:pic>
+        <p:nvPicPr>
+          <p:cNvPr id="5" name="Picture 2" descr="\\THE-ARCHTK\a$\dev\porfolio\agile2011\img\_0000_Goofy-dev-copy.png"/>
+          <p:cNvPicPr>
+            <a:picLocks noChangeAspect="1" noChangeArrowheads="1"/>
+          </p:cNvPicPr>
+          <p:nvPr/>
+        </p:nvPicPr>
+        <p:blipFill>
+          <a:blip r:embed="rId3">
+            <a:extLst>
+              <a:ext uri="{28A0092B-C50C-407E-A947-70E740481C1C}">
+                <a14:useLocalDpi xmlns:a14="http://schemas.microsoft.com/office/drawing/2010/main" val="0"/>
+              </a:ext>
+            </a:extLst>
+          </a:blip>
+          <a:srcRect/>
+          <a:stretch>
+            <a:fillRect/>
+          </a:stretch>
+        </p:blipFill>
+        <p:spPr bwMode="auto">
+          <a:xfrm>
+            <a:off x="7858125" y="4248150"/>
+            <a:ext cx="752475" cy="2305050"/>
           </a:xfrm>
           <a:prstGeom prst="rect">
             <a:avLst/>
@@ -5051,8 +6384,8 @@
         </p:blipFill>
         <p:spPr bwMode="auto">
           <a:xfrm>
-            <a:off x="628650" y="1524000"/>
-            <a:ext cx="3790950" cy="4524375"/>
+            <a:off x="628650" y="1523999"/>
+            <a:ext cx="3830855" cy="4572000"/>
           </a:xfrm>
           <a:prstGeom prst="rect">
             <a:avLst/>
@@ -5092,8 +6425,49 @@
         </p:blipFill>
         <p:spPr bwMode="auto">
           <a:xfrm>
-            <a:off x="4724400" y="1524000"/>
-            <a:ext cx="3698455" cy="4524375"/>
+            <a:off x="4724399" y="1523999"/>
+            <a:ext cx="3794760" cy="4572000"/>
+          </a:xfrm>
+          <a:prstGeom prst="rect">
+            <a:avLst/>
+          </a:prstGeom>
+          <a:noFill/>
+          <a:extLst>
+            <a:ext uri="{909E8E84-426E-40DD-AFC4-6F175D3DCCD1}">
+              <a14:hiddenFill xmlns:a14="http://schemas.microsoft.com/office/drawing/2010/main">
+                <a:solidFill>
+                  <a:srgbClr val="FFFFFF"/>
+                </a:solidFill>
+              </a14:hiddenFill>
+            </a:ext>
+          </a:extLst>
+        </p:spPr>
+      </p:pic>
+      <p:pic>
+        <p:nvPicPr>
+          <p:cNvPr id="6" name="Picture 2" descr="\\THE-ARCHTK\a$\dev\porfolio\agile2011\img\_0000_Goofy-dev-copy.png"/>
+          <p:cNvPicPr>
+            <a:picLocks noChangeAspect="1" noChangeArrowheads="1"/>
+          </p:cNvPicPr>
+          <p:nvPr/>
+        </p:nvPicPr>
+        <p:blipFill>
+          <a:blip r:embed="rId4">
+            <a:extLst>
+              <a:ext uri="{28A0092B-C50C-407E-A947-70E740481C1C}">
+                <a14:useLocalDpi xmlns:a14="http://schemas.microsoft.com/office/drawing/2010/main" val="0"/>
+              </a:ext>
+            </a:extLst>
+          </a:blip>
+          <a:srcRect/>
+          <a:stretch>
+            <a:fillRect/>
+          </a:stretch>
+        </p:blipFill>
+        <p:spPr bwMode="auto">
+          <a:xfrm>
+            <a:off x="8077200" y="4038600"/>
+            <a:ext cx="752475" cy="2305050"/>
           </a:xfrm>
           <a:prstGeom prst="rect">
             <a:avLst/>
@@ -5193,7 +6567,7 @@
         </p:blipFill>
         <p:spPr bwMode="auto">
           <a:xfrm>
-            <a:off x="6103796" y="2632874"/>
+            <a:off x="6103796" y="2309024"/>
             <a:ext cx="2735404" cy="2447925"/>
           </a:xfrm>
           <a:prstGeom prst="rect">
@@ -5234,7 +6608,7 @@
         </p:blipFill>
         <p:spPr bwMode="auto">
           <a:xfrm>
-            <a:off x="3200400" y="2632874"/>
+            <a:off x="3200400" y="2309024"/>
             <a:ext cx="2819400" cy="3234526"/>
           </a:xfrm>
           <a:prstGeom prst="rect">
@@ -5275,8 +6649,131 @@
         </p:blipFill>
         <p:spPr bwMode="auto">
           <a:xfrm>
-            <a:off x="304801" y="2632874"/>
+            <a:off x="304801" y="2309024"/>
             <a:ext cx="2800960" cy="2514600"/>
+          </a:xfrm>
+          <a:prstGeom prst="rect">
+            <a:avLst/>
+          </a:prstGeom>
+          <a:noFill/>
+          <a:extLst>
+            <a:ext uri="{909E8E84-426E-40DD-AFC4-6F175D3DCCD1}">
+              <a14:hiddenFill xmlns:a14="http://schemas.microsoft.com/office/drawing/2010/main">
+                <a:solidFill>
+                  <a:srgbClr val="FFFFFF"/>
+                </a:solidFill>
+              </a14:hiddenFill>
+            </a:ext>
+          </a:extLst>
+        </p:spPr>
+      </p:pic>
+      <p:pic>
+        <p:nvPicPr>
+          <p:cNvPr id="8194" name="Picture 2" descr="\\THE-ARCHTK\a$\dev\porfolio\agile2011\img\_0000_Goofy-dev-copy.png"/>
+          <p:cNvPicPr>
+            <a:picLocks noChangeAspect="1" noChangeArrowheads="1"/>
+          </p:cNvPicPr>
+          <p:nvPr/>
+        </p:nvPicPr>
+        <p:blipFill>
+          <a:blip r:embed="rId5">
+            <a:extLst>
+              <a:ext uri="{28A0092B-C50C-407E-A947-70E740481C1C}">
+                <a14:useLocalDpi xmlns:a14="http://schemas.microsoft.com/office/drawing/2010/main" val="0"/>
+              </a:ext>
+            </a:extLst>
+          </a:blip>
+          <a:srcRect/>
+          <a:stretch>
+            <a:fillRect/>
+          </a:stretch>
+        </p:blipFill>
+        <p:spPr bwMode="auto">
+          <a:xfrm>
+            <a:off x="2757487" y="3333750"/>
+            <a:ext cx="752475" cy="2305050"/>
+          </a:xfrm>
+          <a:prstGeom prst="rect">
+            <a:avLst/>
+          </a:prstGeom>
+          <a:noFill/>
+          <a:extLst>
+            <a:ext uri="{909E8E84-426E-40DD-AFC4-6F175D3DCCD1}">
+              <a14:hiddenFill xmlns:a14="http://schemas.microsoft.com/office/drawing/2010/main">
+                <a:solidFill>
+                  <a:srgbClr val="FFFFFF"/>
+                </a:solidFill>
+              </a14:hiddenFill>
+            </a:ext>
+          </a:extLst>
+        </p:spPr>
+      </p:pic>
+      <p:pic>
+        <p:nvPicPr>
+          <p:cNvPr id="7" name="Picture 2" descr="\\THE-ARCHTK\a$\dev\porfolio\agile2011\img\_0000_Goofy-dev-copy.png"/>
+          <p:cNvPicPr>
+            <a:picLocks noChangeAspect="1" noChangeArrowheads="1"/>
+          </p:cNvPicPr>
+          <p:nvPr/>
+        </p:nvPicPr>
+        <p:blipFill>
+          <a:blip r:embed="rId5">
+            <a:extLst>
+              <a:ext uri="{28A0092B-C50C-407E-A947-70E740481C1C}">
+                <a14:useLocalDpi xmlns:a14="http://schemas.microsoft.com/office/drawing/2010/main" val="0"/>
+              </a:ext>
+            </a:extLst>
+          </a:blip>
+          <a:srcRect/>
+          <a:stretch>
+            <a:fillRect/>
+          </a:stretch>
+        </p:blipFill>
+        <p:spPr bwMode="auto">
+          <a:xfrm>
+            <a:off x="5486400" y="3333750"/>
+            <a:ext cx="752475" cy="2305050"/>
+          </a:xfrm>
+          <a:prstGeom prst="rect">
+            <a:avLst/>
+          </a:prstGeom>
+          <a:noFill/>
+          <a:extLst>
+            <a:ext uri="{909E8E84-426E-40DD-AFC4-6F175D3DCCD1}">
+              <a14:hiddenFill xmlns:a14="http://schemas.microsoft.com/office/drawing/2010/main">
+                <a:solidFill>
+                  <a:srgbClr val="FFFFFF"/>
+                </a:solidFill>
+              </a14:hiddenFill>
+            </a:ext>
+          </a:extLst>
+        </p:spPr>
+      </p:pic>
+      <p:pic>
+        <p:nvPicPr>
+          <p:cNvPr id="8" name="Picture 2" descr="\\THE-ARCHTK\a$\dev\porfolio\agile2011\img\_0000_Goofy-dev-copy.png"/>
+          <p:cNvPicPr>
+            <a:picLocks noChangeAspect="1" noChangeArrowheads="1"/>
+          </p:cNvPicPr>
+          <p:nvPr/>
+        </p:nvPicPr>
+        <p:blipFill>
+          <a:blip r:embed="rId5">
+            <a:extLst>
+              <a:ext uri="{28A0092B-C50C-407E-A947-70E740481C1C}">
+                <a14:useLocalDpi xmlns:a14="http://schemas.microsoft.com/office/drawing/2010/main" val="0"/>
+              </a:ext>
+            </a:extLst>
+          </a:blip>
+          <a:srcRect/>
+          <a:stretch>
+            <a:fillRect/>
+          </a:stretch>
+        </p:blipFill>
+        <p:spPr bwMode="auto">
+          <a:xfrm>
+            <a:off x="8153400" y="3333750"/>
+            <a:ext cx="752475" cy="2305050"/>
           </a:xfrm>
           <a:prstGeom prst="rect">
             <a:avLst/>
@@ -5324,59 +6821,49 @@
                             </p:stCondLst>
                             <p:childTnLst>
                               <p:par>
-                                <p:cTn id="5" presetID="1" presetClass="entr" presetSubtype="0" fill="hold" nodeType="clickEffect">
+                                <p:cTn id="5" presetID="10" presetClass="exit" presetSubtype="0" fill="hold" nodeType="clickEffect">
+                                  <p:stCondLst>
+                                    <p:cond delay="0"/>
+                                  </p:stCondLst>
+                                  <p:childTnLst>
+                                    <p:animEffect transition="out" filter="fade">
+                                      <p:cBhvr>
+                                        <p:cTn id="6" dur="500"/>
+                                        <p:tgtEl>
+                                          <p:spTgt spid="8194"/>
+                                        </p:tgtEl>
+                                      </p:cBhvr>
+                                    </p:animEffect>
+                                    <p:set>
+                                      <p:cBhvr>
+                                        <p:cTn id="7" dur="1" fill="hold">
+                                          <p:stCondLst>
+                                            <p:cond delay="499"/>
+                                          </p:stCondLst>
+                                        </p:cTn>
+                                        <p:tgtEl>
+                                          <p:spTgt spid="8194"/>
+                                        </p:tgtEl>
+                                        <p:attrNameLst>
+                                          <p:attrName>style.visibility</p:attrName>
+                                        </p:attrNameLst>
+                                      </p:cBhvr>
+                                      <p:to>
+                                        <p:strVal val="hidden"/>
+                                      </p:to>
+                                    </p:set>
+                                  </p:childTnLst>
+                                </p:cTn>
+                              </p:par>
+                              <p:par>
+                                <p:cTn id="8" presetID="10" presetClass="entr" presetSubtype="0" fill="hold" nodeType="withEffect">
                                   <p:stCondLst>
                                     <p:cond delay="0"/>
                                   </p:stCondLst>
                                   <p:childTnLst>
                                     <p:set>
                                       <p:cBhvr>
-                                        <p:cTn id="6" dur="1" fill="hold">
-                                          <p:stCondLst>
-                                            <p:cond delay="0"/>
-                                          </p:stCondLst>
-                                        </p:cTn>
-                                        <p:tgtEl>
-                                          <p:spTgt spid="6"/>
-                                        </p:tgtEl>
-                                        <p:attrNameLst>
-                                          <p:attrName>style.visibility</p:attrName>
-                                        </p:attrNameLst>
-                                      </p:cBhvr>
-                                      <p:to>
-                                        <p:strVal val="visible"/>
-                                      </p:to>
-                                    </p:set>
-                                  </p:childTnLst>
-                                </p:cTn>
-                              </p:par>
-                            </p:childTnLst>
-                          </p:cTn>
-                        </p:par>
-                      </p:childTnLst>
-                    </p:cTn>
-                  </p:par>
-                  <p:par>
-                    <p:cTn id="7" fill="hold">
-                      <p:stCondLst>
-                        <p:cond delay="indefinite"/>
-                      </p:stCondLst>
-                      <p:childTnLst>
-                        <p:par>
-                          <p:cTn id="8" fill="hold">
-                            <p:stCondLst>
-                              <p:cond delay="0"/>
-                            </p:stCondLst>
-                            <p:childTnLst>
-                              <p:par>
-                                <p:cTn id="9" presetID="1" presetClass="entr" presetSubtype="0" fill="hold" nodeType="clickEffect">
-                                  <p:stCondLst>
-                                    <p:cond delay="0"/>
-                                  </p:stCondLst>
-                                  <p:childTnLst>
-                                    <p:set>
-                                      <p:cBhvr>
-                                        <p:cTn id="10" dur="1" fill="hold">
+                                        <p:cTn id="9" dur="1" fill="hold">
                                           <p:stCondLst>
                                             <p:cond delay="0"/>
                                           </p:stCondLst>
@@ -5392,6 +6879,49 @@
                                         <p:strVal val="visible"/>
                                       </p:to>
                                     </p:set>
+                                    <p:animEffect transition="in" filter="fade">
+                                      <p:cBhvr>
+                                        <p:cTn id="10" dur="500"/>
+                                        <p:tgtEl>
+                                          <p:spTgt spid="5"/>
+                                        </p:tgtEl>
+                                      </p:cBhvr>
+                                    </p:animEffect>
+                                  </p:childTnLst>
+                                </p:cTn>
+                              </p:par>
+                              <p:par>
+                                <p:cTn id="11" presetID="10" presetClass="entr" presetSubtype="0" fill="hold" nodeType="withEffect">
+                                  <p:stCondLst>
+                                    <p:cond delay="0"/>
+                                  </p:stCondLst>
+                                  <p:childTnLst>
+                                    <p:set>
+                                      <p:cBhvr>
+                                        <p:cTn id="12" dur="1" fill="hold">
+                                          <p:stCondLst>
+                                            <p:cond delay="0"/>
+                                          </p:stCondLst>
+                                        </p:cTn>
+                                        <p:tgtEl>
+                                          <p:spTgt spid="7"/>
+                                        </p:tgtEl>
+                                        <p:attrNameLst>
+                                          <p:attrName>style.visibility</p:attrName>
+                                        </p:attrNameLst>
+                                      </p:cBhvr>
+                                      <p:to>
+                                        <p:strVal val="visible"/>
+                                      </p:to>
+                                    </p:set>
+                                    <p:animEffect transition="in" filter="fade">
+                                      <p:cBhvr>
+                                        <p:cTn id="13" dur="500"/>
+                                        <p:tgtEl>
+                                          <p:spTgt spid="7"/>
+                                        </p:tgtEl>
+                                      </p:cBhvr>
+                                    </p:animEffect>
                                   </p:childTnLst>
                                 </p:cTn>
                               </p:par>
@@ -5402,26 +6932,61 @@
                     </p:cTn>
                   </p:par>
                   <p:par>
-                    <p:cTn id="11" fill="hold">
+                    <p:cTn id="14" fill="hold">
                       <p:stCondLst>
                         <p:cond delay="indefinite"/>
                       </p:stCondLst>
                       <p:childTnLst>
                         <p:par>
-                          <p:cTn id="12" fill="hold">
+                          <p:cTn id="15" fill="hold">
                             <p:stCondLst>
                               <p:cond delay="0"/>
                             </p:stCondLst>
                             <p:childTnLst>
                               <p:par>
-                                <p:cTn id="13" presetID="1" presetClass="entr" presetSubtype="0" fill="hold" nodeType="clickEffect">
+                                <p:cTn id="16" presetID="10" presetClass="exit" presetSubtype="0" fill="hold" nodeType="clickEffect">
+                                  <p:stCondLst>
+                                    <p:cond delay="0"/>
+                                  </p:stCondLst>
+                                  <p:childTnLst>
+                                    <p:animEffect transition="out" filter="fade">
+                                      <p:cBhvr>
+                                        <p:cTn id="17" dur="500"/>
+                                        <p:tgtEl>
+                                          <p:spTgt spid="7"/>
+                                        </p:tgtEl>
+                                      </p:cBhvr>
+                                    </p:animEffect>
+                                    <p:set>
+                                      <p:cBhvr>
+                                        <p:cTn id="18" dur="1" fill="hold">
+                                          <p:stCondLst>
+                                            <p:cond delay="499"/>
+                                          </p:stCondLst>
+                                        </p:cTn>
+                                        <p:tgtEl>
+                                          <p:spTgt spid="7"/>
+                                        </p:tgtEl>
+                                        <p:attrNameLst>
+                                          <p:attrName>style.visibility</p:attrName>
+                                        </p:attrNameLst>
+                                      </p:cBhvr>
+                                      <p:to>
+                                        <p:strVal val="hidden"/>
+                                      </p:to>
+                                    </p:set>
+                                  </p:childTnLst>
+                                </p:cTn>
+                              </p:par>
+                              <p:par>
+                                <p:cTn id="19" presetID="10" presetClass="entr" presetSubtype="0" fill="hold" nodeType="withEffect">
                                   <p:stCondLst>
                                     <p:cond delay="0"/>
                                   </p:stCondLst>
                                   <p:childTnLst>
                                     <p:set>
                                       <p:cBhvr>
-                                        <p:cTn id="14" dur="1" fill="hold">
+                                        <p:cTn id="20" dur="1" fill="hold">
                                           <p:stCondLst>
                                             <p:cond delay="0"/>
                                           </p:stCondLst>
@@ -5437,6 +7002,49 @@
                                         <p:strVal val="visible"/>
                                       </p:to>
                                     </p:set>
+                                    <p:animEffect transition="in" filter="fade">
+                                      <p:cBhvr>
+                                        <p:cTn id="21" dur="500"/>
+                                        <p:tgtEl>
+                                          <p:spTgt spid="4"/>
+                                        </p:tgtEl>
+                                      </p:cBhvr>
+                                    </p:animEffect>
+                                  </p:childTnLst>
+                                </p:cTn>
+                              </p:par>
+                              <p:par>
+                                <p:cTn id="22" presetID="10" presetClass="entr" presetSubtype="0" fill="hold" nodeType="withEffect">
+                                  <p:stCondLst>
+                                    <p:cond delay="0"/>
+                                  </p:stCondLst>
+                                  <p:childTnLst>
+                                    <p:set>
+                                      <p:cBhvr>
+                                        <p:cTn id="23" dur="1" fill="hold">
+                                          <p:stCondLst>
+                                            <p:cond delay="0"/>
+                                          </p:stCondLst>
+                                        </p:cTn>
+                                        <p:tgtEl>
+                                          <p:spTgt spid="8"/>
+                                        </p:tgtEl>
+                                        <p:attrNameLst>
+                                          <p:attrName>style.visibility</p:attrName>
+                                        </p:attrNameLst>
+                                      </p:cBhvr>
+                                      <p:to>
+                                        <p:strVal val="visible"/>
+                                      </p:to>
+                                    </p:set>
+                                    <p:animEffect transition="in" filter="fade">
+                                      <p:cBhvr>
+                                        <p:cTn id="24" dur="500"/>
+                                        <p:tgtEl>
+                                          <p:spTgt spid="8"/>
+                                        </p:tgtEl>
+                                      </p:cBhvr>
+                                    </p:animEffect>
                                   </p:childTnLst>
                                 </p:cTn>
                               </p:par>
@@ -5500,17 +7108,19 @@
         </p:nvSpPr>
         <p:spPr>
           <a:xfrm>
-            <a:off x="2743200" y="274638"/>
-            <a:ext cx="5943600" cy="1143000"/>
+            <a:off x="3035474" y="210078"/>
+            <a:ext cx="2817759" cy="769441"/>
           </a:xfrm>
         </p:spPr>
         <p:txBody>
-          <a:bodyPr/>
+          <a:bodyPr>
+            <a:spAutoFit/>
+          </a:bodyPr>
           <a:lstStyle/>
           <a:p>
             <a:pPr algn="l"/>
             <a:r>
-              <a:rPr lang="en-US" b="1" dirty="0" err="1" smtClean="0">
+              <a:rPr lang="en-US" b="1" dirty="0" smtClean="0">
                 <a:latin typeface="Arista 2.0" pitchFamily="2" charset="0"/>
               </a:rPr>
               <a:t>rac·on·teur</a:t>
@@ -5531,13 +7141,13 @@
         </p:nvSpPr>
         <p:spPr>
           <a:xfrm>
-            <a:off x="2743200" y="1265237"/>
-            <a:ext cx="5943600" cy="4525963"/>
+            <a:off x="3048000" y="822877"/>
+            <a:ext cx="5943600" cy="2529923"/>
           </a:xfrm>
         </p:spPr>
         <p:txBody>
-          <a:bodyPr>
-            <a:normAutofit/>
+          <a:bodyPr wrap="square">
+            <a:spAutoFit/>
           </a:bodyPr>
           <a:lstStyle/>
           <a:p>
@@ -5584,7 +7194,15 @@
             </a:pPr>
             <a:r>
               <a:rPr lang="en-US" sz="2200" dirty="0"/>
-              <a:t>A person who tells anecdotes in a skillful and amusing </a:t>
+              <a:t>A person who tells anecdotes </a:t>
+            </a:r>
+            <a:r>
+              <a:rPr lang="en-US" sz="2200" dirty="0" smtClean="0"/>
+              <a:t>in </a:t>
+            </a:r>
+            <a:r>
+              <a:rPr lang="en-US" sz="2200" dirty="0"/>
+              <a:t>a skillful and amusing </a:t>
             </a:r>
             <a:r>
               <a:rPr lang="en-US" sz="2200" dirty="0" smtClean="0"/>
@@ -5735,8 +7353,49 @@
         </p:blipFill>
         <p:spPr bwMode="auto">
           <a:xfrm>
-            <a:off x="3352800" y="1384300"/>
+            <a:off x="2743200" y="1155700"/>
             <a:ext cx="5014082" cy="5092700"/>
+          </a:xfrm>
+          <a:prstGeom prst="rect">
+            <a:avLst/>
+          </a:prstGeom>
+          <a:noFill/>
+          <a:extLst>
+            <a:ext uri="{909E8E84-426E-40DD-AFC4-6F175D3DCCD1}">
+              <a14:hiddenFill xmlns:a14="http://schemas.microsoft.com/office/drawing/2010/main">
+                <a:solidFill>
+                  <a:srgbClr val="FFFFFF"/>
+                </a:solidFill>
+              </a14:hiddenFill>
+            </a:ext>
+          </a:extLst>
+        </p:spPr>
+      </p:pic>
+      <p:pic>
+        <p:nvPicPr>
+          <p:cNvPr id="7170" name="Picture 2" descr="\\THE-ARCHTK\a$\dev\porfolio\agile2011\img\_0000_Goofy-dev-copy.png"/>
+          <p:cNvPicPr>
+            <a:picLocks noChangeAspect="1" noChangeArrowheads="1"/>
+          </p:cNvPicPr>
+          <p:nvPr/>
+        </p:nvPicPr>
+        <p:blipFill>
+          <a:blip r:embed="rId3">
+            <a:extLst>
+              <a:ext uri="{28A0092B-C50C-407E-A947-70E740481C1C}">
+                <a14:useLocalDpi xmlns:a14="http://schemas.microsoft.com/office/drawing/2010/main" val="0"/>
+              </a:ext>
+            </a:extLst>
+          </a:blip>
+          <a:srcRect/>
+          <a:stretch>
+            <a:fillRect/>
+          </a:stretch>
+        </p:blipFill>
+        <p:spPr bwMode="auto">
+          <a:xfrm>
+            <a:off x="7315200" y="4171950"/>
+            <a:ext cx="752475" cy="2305050"/>
           </a:xfrm>
           <a:prstGeom prst="rect">
             <a:avLst/>
@@ -5817,6 +7476,97 @@
           </a:p>
         </p:txBody>
       </p:sp>
+      <p:pic>
+        <p:nvPicPr>
+          <p:cNvPr id="4098" name="Picture 2" descr="\\THE-ARCHTK\a$\dev\porfolio\agile2011\img\change_salary.png"/>
+          <p:cNvPicPr>
+            <a:picLocks noChangeAspect="1" noChangeArrowheads="1"/>
+          </p:cNvPicPr>
+          <p:nvPr/>
+        </p:nvPicPr>
+        <p:blipFill>
+          <a:blip r:embed="rId2">
+            <a:extLst>
+              <a:ext uri="{28A0092B-C50C-407E-A947-70E740481C1C}">
+                <a14:useLocalDpi xmlns:a14="http://schemas.microsoft.com/office/drawing/2010/main" val="0"/>
+              </a:ext>
+            </a:extLst>
+          </a:blip>
+          <a:srcRect/>
+          <a:stretch>
+            <a:fillRect/>
+          </a:stretch>
+        </p:blipFill>
+        <p:spPr bwMode="auto">
+          <a:xfrm>
+            <a:off x="400050" y="1752600"/>
+            <a:ext cx="8343900" cy="4460916"/>
+          </a:xfrm>
+          <a:prstGeom prst="rect">
+            <a:avLst/>
+          </a:prstGeom>
+          <a:noFill/>
+          <a:extLst>
+            <a:ext uri="{909E8E84-426E-40DD-AFC4-6F175D3DCCD1}">
+              <a14:hiddenFill xmlns:a14="http://schemas.microsoft.com/office/drawing/2010/main">
+                <a:solidFill>
+                  <a:srgbClr val="FFFFFF"/>
+                </a:solidFill>
+              </a14:hiddenFill>
+            </a:ext>
+          </a:extLst>
+        </p:spPr>
+      </p:pic>
+      <p:sp>
+        <p:nvSpPr>
+          <p:cNvPr id="4" name="Title 1"/>
+          <p:cNvSpPr txBox="1">
+            <a:spLocks/>
+          </p:cNvSpPr>
+          <p:nvPr/>
+        </p:nvSpPr>
+        <p:spPr>
+          <a:xfrm>
+            <a:off x="2171700" y="1143000"/>
+            <a:ext cx="4800600" cy="685800"/>
+          </a:xfrm>
+          <a:prstGeom prst="rect">
+            <a:avLst/>
+          </a:prstGeom>
+        </p:spPr>
+        <p:txBody>
+          <a:bodyPr vert="horz" lIns="91440" tIns="45720" rIns="91440" bIns="45720" rtlCol="0" anchor="ctr">
+            <a:normAutofit/>
+          </a:bodyPr>
+          <a:lstStyle>
+            <a:lvl1pPr algn="ctr" defTabSz="914400" rtl="0" eaLnBrk="1" latinLnBrk="0" hangingPunct="1">
+              <a:spcBef>
+                <a:spcPct val="0"/>
+              </a:spcBef>
+              <a:buNone/>
+              <a:defRPr sz="4400" kern="1200">
+                <a:solidFill>
+                  <a:schemeClr val="tx1"/>
+                </a:solidFill>
+                <a:latin typeface="+mj-lt"/>
+                <a:ea typeface="+mj-ea"/>
+                <a:cs typeface="+mj-cs"/>
+              </a:defRPr>
+            </a:lvl1pPr>
+          </a:lstStyle>
+          <a:p>
+            <a:r>
+              <a:rPr lang="en-US" sz="3200" dirty="0" smtClean="0">
+                <a:latin typeface="+mn-lt"/>
+              </a:rPr>
+              <a:t>Update Compensation</a:t>
+            </a:r>
+            <a:endParaRPr lang="en-US" sz="3200" dirty="0">
+              <a:latin typeface="+mn-lt"/>
+            </a:endParaRPr>
+          </a:p>
+        </p:txBody>
+      </p:sp>
     </p:spTree>
     <p:extLst>
       <p:ext uri="{BB962C8B-B14F-4D97-AF65-F5344CB8AC3E}">
@@ -5838,6 +7588,161 @@
 </file>
 
 <file path=ppt/slides/slide22.xml><?xml version="1.0" encoding="utf-8"?>
+<p:sld xmlns:a="http://schemas.openxmlformats.org/drawingml/2006/main" xmlns:r="http://schemas.openxmlformats.org/officeDocument/2006/relationships" xmlns:p="http://schemas.openxmlformats.org/presentationml/2006/main">
+  <p:cSld>
+    <p:spTree>
+      <p:nvGrpSpPr>
+        <p:cNvPr id="1" name=""/>
+        <p:cNvGrpSpPr/>
+        <p:nvPr/>
+      </p:nvGrpSpPr>
+      <p:grpSpPr>
+        <a:xfrm>
+          <a:off x="0" y="0"/>
+          <a:ext cx="0" cy="0"/>
+          <a:chOff x="0" y="0"/>
+          <a:chExt cx="0" cy="0"/>
+        </a:xfrm>
+      </p:grpSpPr>
+      <p:sp>
+        <p:nvSpPr>
+          <p:cNvPr id="2" name="Title 1"/>
+          <p:cNvSpPr>
+            <a:spLocks noGrp="1"/>
+          </p:cNvSpPr>
+          <p:nvPr>
+            <p:ph type="title"/>
+          </p:nvPr>
+        </p:nvSpPr>
+        <p:spPr/>
+        <p:txBody>
+          <a:bodyPr/>
+          <a:lstStyle/>
+          <a:p>
+            <a:r>
+              <a:rPr lang="en-US" dirty="0" err="1" smtClean="0"/>
+              <a:t>UltiPro</a:t>
+            </a:r>
+            <a:r>
+              <a:rPr lang="en-US" dirty="0" smtClean="0"/>
+              <a:t> Web Services</a:t>
+            </a:r>
+            <a:endParaRPr lang="en-US" dirty="0"/>
+          </a:p>
+        </p:txBody>
+      </p:sp>
+      <p:sp>
+        <p:nvSpPr>
+          <p:cNvPr id="4" name="Title 1"/>
+          <p:cNvSpPr txBox="1">
+            <a:spLocks/>
+          </p:cNvSpPr>
+          <p:nvPr/>
+        </p:nvSpPr>
+        <p:spPr>
+          <a:xfrm>
+            <a:off x="2171700" y="1143000"/>
+            <a:ext cx="4800600" cy="685800"/>
+          </a:xfrm>
+          <a:prstGeom prst="rect">
+            <a:avLst/>
+          </a:prstGeom>
+        </p:spPr>
+        <p:txBody>
+          <a:bodyPr vert="horz" lIns="91440" tIns="45720" rIns="91440" bIns="45720" rtlCol="0" anchor="ctr">
+            <a:normAutofit/>
+          </a:bodyPr>
+          <a:lstStyle>
+            <a:lvl1pPr algn="ctr" defTabSz="914400" rtl="0" eaLnBrk="1" latinLnBrk="0" hangingPunct="1">
+              <a:spcBef>
+                <a:spcPct val="0"/>
+              </a:spcBef>
+              <a:buNone/>
+              <a:defRPr sz="4400" kern="1200">
+                <a:solidFill>
+                  <a:schemeClr val="tx1"/>
+                </a:solidFill>
+                <a:latin typeface="+mj-lt"/>
+                <a:ea typeface="+mj-ea"/>
+                <a:cs typeface="+mj-cs"/>
+              </a:defRPr>
+            </a:lvl1pPr>
+          </a:lstStyle>
+          <a:p>
+            <a:r>
+              <a:rPr lang="en-US" sz="3200" dirty="0" smtClean="0">
+                <a:latin typeface="+mn-lt"/>
+              </a:rPr>
+              <a:t>Validate Job</a:t>
+            </a:r>
+            <a:endParaRPr lang="en-US" sz="3200" dirty="0">
+              <a:latin typeface="+mn-lt"/>
+            </a:endParaRPr>
+          </a:p>
+        </p:txBody>
+      </p:sp>
+      <p:pic>
+        <p:nvPicPr>
+          <p:cNvPr id="5122" name="Picture 2" descr="\\THE-ARCHTK\a$\dev\porfolio\agile2011\img\change_job.png"/>
+          <p:cNvPicPr>
+            <a:picLocks noChangeAspect="1" noChangeArrowheads="1"/>
+          </p:cNvPicPr>
+          <p:nvPr/>
+        </p:nvPicPr>
+        <p:blipFill>
+          <a:blip r:embed="rId3">
+            <a:extLst>
+              <a:ext uri="{28A0092B-C50C-407E-A947-70E740481C1C}">
+                <a14:useLocalDpi xmlns:a14="http://schemas.microsoft.com/office/drawing/2010/main" val="0"/>
+              </a:ext>
+            </a:extLst>
+          </a:blip>
+          <a:srcRect/>
+          <a:stretch>
+            <a:fillRect/>
+          </a:stretch>
+        </p:blipFill>
+        <p:spPr bwMode="auto">
+          <a:xfrm>
+            <a:off x="1262409" y="1752600"/>
+            <a:ext cx="6619183" cy="4640508"/>
+          </a:xfrm>
+          <a:prstGeom prst="rect">
+            <a:avLst/>
+          </a:prstGeom>
+          <a:noFill/>
+          <a:extLst>
+            <a:ext uri="{909E8E84-426E-40DD-AFC4-6F175D3DCCD1}">
+              <a14:hiddenFill xmlns:a14="http://schemas.microsoft.com/office/drawing/2010/main">
+                <a:solidFill>
+                  <a:srgbClr val="FFFFFF"/>
+                </a:solidFill>
+              </a14:hiddenFill>
+            </a:ext>
+          </a:extLst>
+        </p:spPr>
+      </p:pic>
+    </p:spTree>
+    <p:extLst>
+      <p:ext uri="{BB962C8B-B14F-4D97-AF65-F5344CB8AC3E}">
+        <p14:creationId xmlns:p14="http://schemas.microsoft.com/office/powerpoint/2010/main" val="3477030200"/>
+      </p:ext>
+    </p:extLst>
+  </p:cSld>
+  <p:clrMapOvr>
+    <a:masterClrMapping/>
+  </p:clrMapOvr>
+  <p:timing>
+    <p:tnLst>
+      <p:par>
+        <p:cTn id="1" dur="indefinite" restart="never" nodeType="tmRoot"/>
+      </p:par>
+    </p:tnLst>
+  </p:timing>
+</p:sld>
+</file>
+
+<file path=ppt/slides/slide23.xml><?xml version="1.0" encoding="utf-8"?>
 <p:sld xmlns:a="http://schemas.openxmlformats.org/drawingml/2006/main" xmlns:r="http://schemas.openxmlformats.org/officeDocument/2006/relationships" xmlns:p="http://schemas.openxmlformats.org/presentationml/2006/main">
   <p:cSld>
     <p:spTree>
@@ -5938,7 +7843,7 @@
 </p:sld>
 </file>
 
-<file path=ppt/slides/slide23.xml><?xml version="1.0" encoding="utf-8"?>
+<file path=ppt/slides/slide24.xml><?xml version="1.0" encoding="utf-8"?>
 <p:sld xmlns:a="http://schemas.openxmlformats.org/drawingml/2006/main" xmlns:r="http://schemas.openxmlformats.org/officeDocument/2006/relationships" xmlns:p="http://schemas.openxmlformats.org/presentationml/2006/main">
   <p:cSld>
     <p:spTree>
@@ -5957,6 +7862,53 @@
       </p:grpSpPr>
       <p:sp>
         <p:nvSpPr>
+          <p:cNvPr id="2" name="Cloud Callout 1"/>
+          <p:cNvSpPr/>
+          <p:nvPr/>
+        </p:nvSpPr>
+        <p:spPr>
+          <a:xfrm rot="2117807">
+            <a:off x="3016708" y="344321"/>
+            <a:ext cx="4734855" cy="4743555"/>
+          </a:xfrm>
+          <a:prstGeom prst="cloudCallout">
+            <a:avLst/>
+          </a:prstGeom>
+          <a:noFill/>
+          <a:ln w="15875">
+            <a:solidFill>
+              <a:srgbClr val="014901"/>
+            </a:solidFill>
+            <a:prstDash val="sysDot"/>
+          </a:ln>
+        </p:spPr>
+        <p:style>
+          <a:lnRef idx="2">
+            <a:schemeClr val="accent1">
+              <a:shade val="50000"/>
+            </a:schemeClr>
+          </a:lnRef>
+          <a:fillRef idx="1">
+            <a:schemeClr val="accent1"/>
+          </a:fillRef>
+          <a:effectRef idx="0">
+            <a:schemeClr val="accent1"/>
+          </a:effectRef>
+          <a:fontRef idx="minor">
+            <a:schemeClr val="lt1"/>
+          </a:fontRef>
+        </p:style>
+        <p:txBody>
+          <a:bodyPr rtlCol="0" anchor="ctr"/>
+          <a:lstStyle/>
+          <a:p>
+            <a:pPr algn="ctr"/>
+            <a:endParaRPr lang="en-US"/>
+          </a:p>
+        </p:txBody>
+      </p:sp>
+      <p:sp>
+        <p:nvSpPr>
           <p:cNvPr id="4" name="Text Placeholder 6"/>
           <p:cNvSpPr txBox="1">
             <a:spLocks/>
@@ -5965,8 +7917,8 @@
         </p:nvSpPr>
         <p:spPr>
           <a:xfrm>
-            <a:off x="3505200" y="381000"/>
-            <a:ext cx="2133600" cy="4572000"/>
+            <a:off x="4368452" y="348641"/>
+            <a:ext cx="2133600" cy="3962400"/>
           </a:xfrm>
           <a:prstGeom prst="rect">
             <a:avLst/>
@@ -6118,13 +8070,21 @@
               <a:buNone/>
             </a:pPr>
             <a:r>
-              <a:rPr lang="en-US" sz="35000" dirty="0" smtClean="0">
-                <a:latin typeface="Arista 2.0" pitchFamily="2" charset="0"/>
+              <a:rPr lang="en-US" sz="30000" dirty="0" smtClean="0">
+                <a:solidFill>
+                  <a:srgbClr val="024402"/>
+                </a:solidFill>
+                <a:latin typeface="Calibri" pitchFamily="34" charset="0"/>
+                <a:cs typeface="Calibri" pitchFamily="34" charset="0"/>
               </a:rPr>
               <a:t>?</a:t>
             </a:r>
-            <a:endParaRPr lang="en-US" sz="35000" dirty="0">
-              <a:latin typeface="Arista 2.0" pitchFamily="2" charset="0"/>
+            <a:endParaRPr lang="en-US" sz="30000" dirty="0">
+              <a:solidFill>
+                <a:srgbClr val="024402"/>
+              </a:solidFill>
+              <a:latin typeface="Calibri" pitchFamily="34" charset="0"/>
+              <a:cs typeface="Calibri" pitchFamily="34" charset="0"/>
             </a:endParaRPr>
           </a:p>
         </p:txBody>
@@ -6178,15 +8138,14 @@
         </p:nvSpPr>
         <p:spPr>
           <a:xfrm>
-            <a:off x="3505200" y="274638"/>
-            <a:ext cx="5181600" cy="1143000"/>
+            <a:off x="3572367" y="0"/>
+            <a:ext cx="1999266" cy="769441"/>
           </a:xfrm>
         </p:spPr>
         <p:txBody>
           <a:bodyPr/>
           <a:lstStyle/>
           <a:p>
-            <a:pPr algn="l"/>
             <a:r>
               <a:rPr lang="en-US" dirty="0" smtClean="0"/>
               <a:t>Agenda</a:t>
@@ -6207,114 +8166,77 @@
         </p:nvSpPr>
         <p:spPr>
           <a:xfrm>
-            <a:off x="3505200" y="1219200"/>
-            <a:ext cx="5105400" cy="4754563"/>
+            <a:off x="3226627" y="825674"/>
+            <a:ext cx="3732625" cy="3477875"/>
           </a:xfrm>
         </p:spPr>
         <p:txBody>
-          <a:bodyPr/>
+          <a:bodyPr>
+            <a:spAutoFit/>
+          </a:bodyPr>
           <a:lstStyle/>
           <a:p>
-            <a:pPr marL="342900" marR="0" indent="-342900" algn="l" defTabSz="914400" rtl="0" eaLnBrk="1" fontAlgn="auto" latinLnBrk="0" hangingPunct="1">
-              <a:lnSpc>
-                <a:spcPct val="100000"/>
-              </a:lnSpc>
-              <a:spcBef>
-                <a:spcPct val="20000"/>
-              </a:spcBef>
-              <a:spcAft>
-                <a:spcPts val="0"/>
-              </a:spcAft>
-              <a:buClrTx/>
-              <a:buSzTx/>
-              <a:buFont typeface="Arial" pitchFamily="34" charset="0"/>
-              <a:buChar char="•"/>
-              <a:tabLst/>
+            <a:pPr>
               <a:defRPr/>
             </a:pPr>
             <a:r>
-              <a:rPr lang="en-US" sz="2800" kern="1200" dirty="0" smtClean="0">
-                <a:solidFill>
-                  <a:schemeClr val="tx1"/>
-                </a:solidFill>
-                <a:effectLst/>
-              </a:rPr>
+              <a:rPr lang="en-US" sz="2800" dirty="0"/>
               <a:t>The Situation</a:t>
             </a:r>
           </a:p>
           <a:p>
-            <a:pPr marL="342900" marR="0" indent="-342900" algn="l" defTabSz="914400" rtl="0" eaLnBrk="1" fontAlgn="auto" latinLnBrk="0" hangingPunct="1">
-              <a:lnSpc>
-                <a:spcPct val="100000"/>
-              </a:lnSpc>
-              <a:spcBef>
-                <a:spcPct val="20000"/>
-              </a:spcBef>
-              <a:spcAft>
-                <a:spcPts val="0"/>
-              </a:spcAft>
-              <a:buClrTx/>
-              <a:buSzTx/>
-              <a:buFont typeface="Arial" pitchFamily="34" charset="0"/>
-              <a:buChar char="•"/>
-              <a:tabLst/>
+            <a:pPr>
               <a:defRPr/>
             </a:pPr>
             <a:r>
-              <a:rPr lang="en-US" sz="2800" kern="1200" dirty="0" smtClean="0">
-                <a:solidFill>
-                  <a:schemeClr val="tx1"/>
-                </a:solidFill>
-                <a:effectLst/>
-              </a:rPr>
+              <a:rPr lang="en-US" sz="2800" dirty="0"/>
               <a:t>Hello Raconteur</a:t>
             </a:r>
-            <a:endParaRPr lang="en-US" sz="2800" dirty="0" smtClean="0">
-              <a:effectLst/>
-            </a:endParaRPr>
-          </a:p>
-          <a:p>
-            <a:r>
-              <a:rPr lang="en-US" sz="2800" dirty="0" smtClean="0"/>
+          </a:p>
+          <a:p>
+            <a:r>
+              <a:rPr lang="en-US" sz="2800" dirty="0"/>
               <a:t>Testers</a:t>
             </a:r>
           </a:p>
           <a:p>
             <a:r>
-              <a:rPr lang="en-US" sz="2800" dirty="0" smtClean="0"/>
+              <a:rPr lang="en-US" sz="2800" dirty="0"/>
               <a:t>Developers</a:t>
             </a:r>
           </a:p>
           <a:p>
             <a:r>
-              <a:rPr lang="en-US" sz="2800" dirty="0" err="1" smtClean="0"/>
+              <a:rPr lang="en-US" sz="2800" dirty="0" err="1"/>
               <a:t>UltiPro</a:t>
             </a:r>
             <a:r>
-              <a:rPr lang="en-US" sz="2800" dirty="0" smtClean="0"/>
+              <a:rPr lang="en-US" sz="2800" dirty="0"/>
               <a:t> </a:t>
             </a:r>
             <a:r>
-              <a:rPr lang="en-US" sz="2800" dirty="0" err="1" smtClean="0"/>
+              <a:rPr lang="en-US" sz="2800" dirty="0" err="1"/>
               <a:t>Webservices</a:t>
             </a:r>
-            <a:endParaRPr lang="en-US" sz="2800" dirty="0" smtClean="0"/>
+            <a:endParaRPr lang="en-US" sz="2800" dirty="0"/>
           </a:p>
           <a:p>
             <a:pPr lvl="1"/>
             <a:r>
+              <a:rPr lang="en-US" sz="2400" dirty="0"/>
+              <a:t>Update Compensation</a:t>
+            </a:r>
+          </a:p>
+          <a:p>
+            <a:pPr lvl="1"/>
+            <a:r>
+              <a:rPr lang="en-US" sz="2400" dirty="0"/>
+              <a:t>Validate </a:t>
+            </a:r>
+            <a:r>
               <a:rPr lang="en-US" sz="2400" dirty="0" smtClean="0"/>
-              <a:t>Update Compensation</a:t>
-            </a:r>
-          </a:p>
-          <a:p>
-            <a:pPr lvl="1"/>
-            <a:r>
-              <a:rPr lang="en-US" sz="2400" dirty="0" smtClean="0"/>
-              <a:t>Validate Job</a:t>
-            </a:r>
-          </a:p>
-          <a:p>
+              <a:t>Job</a:t>
+            </a:r>
             <a:endParaRPr lang="en-US" dirty="0"/>
           </a:p>
         </p:txBody>
@@ -6322,7 +8244,7 @@
     </p:spTree>
     <p:extLst>
       <p:ext uri="{BB962C8B-B14F-4D97-AF65-F5344CB8AC3E}">
-        <p14:creationId xmlns:p14="http://schemas.microsoft.com/office/powerpoint/2010/main" val="4232867743"/>
+        <p14:creationId xmlns:p14="http://schemas.microsoft.com/office/powerpoint/2010/main" val="1834910971"/>
       </p:ext>
     </p:extLst>
   </p:cSld>
@@ -6332,342 +8254,9 @@
   <p:timing>
     <p:tnLst>
       <p:par>
-        <p:cTn id="1" dur="indefinite" restart="never" nodeType="tmRoot">
-          <p:childTnLst>
-            <p:seq concurrent="1" nextAc="seek">
-              <p:cTn id="2" dur="indefinite" nodeType="mainSeq">
-                <p:childTnLst>
-                  <p:par>
-                    <p:cTn id="3" fill="hold">
-                      <p:stCondLst>
-                        <p:cond delay="indefinite"/>
-                      </p:stCondLst>
-                      <p:childTnLst>
-                        <p:par>
-                          <p:cTn id="4" fill="hold">
-                            <p:stCondLst>
-                              <p:cond delay="0"/>
-                            </p:stCondLst>
-                            <p:childTnLst>
-                              <p:par>
-                                <p:cTn id="5" presetID="1" presetClass="entr" presetSubtype="0" fill="hold" grpId="1" nodeType="clickEffect">
-                                  <p:stCondLst>
-                                    <p:cond delay="0"/>
-                                  </p:stCondLst>
-                                  <p:childTnLst>
-                                    <p:set>
-                                      <p:cBhvr>
-                                        <p:cTn id="6" dur="1" fill="hold">
-                                          <p:stCondLst>
-                                            <p:cond delay="0"/>
-                                          </p:stCondLst>
-                                        </p:cTn>
-                                        <p:tgtEl>
-                                          <p:spTgt spid="3">
-                                            <p:txEl>
-                                              <p:pRg st="0" end="0"/>
-                                            </p:txEl>
-                                          </p:spTgt>
-                                        </p:tgtEl>
-                                        <p:attrNameLst>
-                                          <p:attrName>style.visibility</p:attrName>
-                                        </p:attrNameLst>
-                                      </p:cBhvr>
-                                      <p:to>
-                                        <p:strVal val="visible"/>
-                                      </p:to>
-                                    </p:set>
-                                  </p:childTnLst>
-                                </p:cTn>
-                              </p:par>
-                            </p:childTnLst>
-                          </p:cTn>
-                        </p:par>
-                      </p:childTnLst>
-                    </p:cTn>
-                  </p:par>
-                  <p:par>
-                    <p:cTn id="7" fill="hold">
-                      <p:stCondLst>
-                        <p:cond delay="indefinite"/>
-                      </p:stCondLst>
-                      <p:childTnLst>
-                        <p:par>
-                          <p:cTn id="8" fill="hold">
-                            <p:stCondLst>
-                              <p:cond delay="0"/>
-                            </p:stCondLst>
-                            <p:childTnLst>
-                              <p:par>
-                                <p:cTn id="9" presetID="1" presetClass="entr" presetSubtype="0" fill="hold" grpId="1" nodeType="clickEffect">
-                                  <p:stCondLst>
-                                    <p:cond delay="0"/>
-                                  </p:stCondLst>
-                                  <p:childTnLst>
-                                    <p:set>
-                                      <p:cBhvr>
-                                        <p:cTn id="10" dur="1" fill="hold">
-                                          <p:stCondLst>
-                                            <p:cond delay="0"/>
-                                          </p:stCondLst>
-                                        </p:cTn>
-                                        <p:tgtEl>
-                                          <p:spTgt spid="3">
-                                            <p:txEl>
-                                              <p:pRg st="1" end="1"/>
-                                            </p:txEl>
-                                          </p:spTgt>
-                                        </p:tgtEl>
-                                        <p:attrNameLst>
-                                          <p:attrName>style.visibility</p:attrName>
-                                        </p:attrNameLst>
-                                      </p:cBhvr>
-                                      <p:to>
-                                        <p:strVal val="visible"/>
-                                      </p:to>
-                                    </p:set>
-                                  </p:childTnLst>
-                                </p:cTn>
-                              </p:par>
-                            </p:childTnLst>
-                          </p:cTn>
-                        </p:par>
-                      </p:childTnLst>
-                    </p:cTn>
-                  </p:par>
-                  <p:par>
-                    <p:cTn id="11" fill="hold">
-                      <p:stCondLst>
-                        <p:cond delay="indefinite"/>
-                      </p:stCondLst>
-                      <p:childTnLst>
-                        <p:par>
-                          <p:cTn id="12" fill="hold">
-                            <p:stCondLst>
-                              <p:cond delay="0"/>
-                            </p:stCondLst>
-                            <p:childTnLst>
-                              <p:par>
-                                <p:cTn id="13" presetID="1" presetClass="entr" presetSubtype="0" fill="hold" grpId="1" nodeType="clickEffect">
-                                  <p:stCondLst>
-                                    <p:cond delay="0"/>
-                                  </p:stCondLst>
-                                  <p:childTnLst>
-                                    <p:set>
-                                      <p:cBhvr>
-                                        <p:cTn id="14" dur="1" fill="hold">
-                                          <p:stCondLst>
-                                            <p:cond delay="0"/>
-                                          </p:stCondLst>
-                                        </p:cTn>
-                                        <p:tgtEl>
-                                          <p:spTgt spid="3">
-                                            <p:txEl>
-                                              <p:pRg st="2" end="2"/>
-                                            </p:txEl>
-                                          </p:spTgt>
-                                        </p:tgtEl>
-                                        <p:attrNameLst>
-                                          <p:attrName>style.visibility</p:attrName>
-                                        </p:attrNameLst>
-                                      </p:cBhvr>
-                                      <p:to>
-                                        <p:strVal val="visible"/>
-                                      </p:to>
-                                    </p:set>
-                                  </p:childTnLst>
-                                </p:cTn>
-                              </p:par>
-                            </p:childTnLst>
-                          </p:cTn>
-                        </p:par>
-                      </p:childTnLst>
-                    </p:cTn>
-                  </p:par>
-                  <p:par>
-                    <p:cTn id="15" fill="hold">
-                      <p:stCondLst>
-                        <p:cond delay="indefinite"/>
-                      </p:stCondLst>
-                      <p:childTnLst>
-                        <p:par>
-                          <p:cTn id="16" fill="hold">
-                            <p:stCondLst>
-                              <p:cond delay="0"/>
-                            </p:stCondLst>
-                            <p:childTnLst>
-                              <p:par>
-                                <p:cTn id="17" presetID="1" presetClass="entr" presetSubtype="0" fill="hold" grpId="1" nodeType="clickEffect">
-                                  <p:stCondLst>
-                                    <p:cond delay="0"/>
-                                  </p:stCondLst>
-                                  <p:childTnLst>
-                                    <p:set>
-                                      <p:cBhvr>
-                                        <p:cTn id="18" dur="1" fill="hold">
-                                          <p:stCondLst>
-                                            <p:cond delay="0"/>
-                                          </p:stCondLst>
-                                        </p:cTn>
-                                        <p:tgtEl>
-                                          <p:spTgt spid="3">
-                                            <p:txEl>
-                                              <p:pRg st="3" end="3"/>
-                                            </p:txEl>
-                                          </p:spTgt>
-                                        </p:tgtEl>
-                                        <p:attrNameLst>
-                                          <p:attrName>style.visibility</p:attrName>
-                                        </p:attrNameLst>
-                                      </p:cBhvr>
-                                      <p:to>
-                                        <p:strVal val="visible"/>
-                                      </p:to>
-                                    </p:set>
-                                  </p:childTnLst>
-                                </p:cTn>
-                              </p:par>
-                            </p:childTnLst>
-                          </p:cTn>
-                        </p:par>
-                      </p:childTnLst>
-                    </p:cTn>
-                  </p:par>
-                  <p:par>
-                    <p:cTn id="19" fill="hold">
-                      <p:stCondLst>
-                        <p:cond delay="indefinite"/>
-                      </p:stCondLst>
-                      <p:childTnLst>
-                        <p:par>
-                          <p:cTn id="20" fill="hold">
-                            <p:stCondLst>
-                              <p:cond delay="0"/>
-                            </p:stCondLst>
-                            <p:childTnLst>
-                              <p:par>
-                                <p:cTn id="21" presetID="1" presetClass="entr" presetSubtype="0" fill="hold" grpId="1" nodeType="clickEffect">
-                                  <p:stCondLst>
-                                    <p:cond delay="0"/>
-                                  </p:stCondLst>
-                                  <p:childTnLst>
-                                    <p:set>
-                                      <p:cBhvr>
-                                        <p:cTn id="22" dur="1" fill="hold">
-                                          <p:stCondLst>
-                                            <p:cond delay="0"/>
-                                          </p:stCondLst>
-                                        </p:cTn>
-                                        <p:tgtEl>
-                                          <p:spTgt spid="3">
-                                            <p:txEl>
-                                              <p:pRg st="4" end="4"/>
-                                            </p:txEl>
-                                          </p:spTgt>
-                                        </p:tgtEl>
-                                        <p:attrNameLst>
-                                          <p:attrName>style.visibility</p:attrName>
-                                        </p:attrNameLst>
-                                      </p:cBhvr>
-                                      <p:to>
-                                        <p:strVal val="visible"/>
-                                      </p:to>
-                                    </p:set>
-                                  </p:childTnLst>
-                                </p:cTn>
-                              </p:par>
-                              <p:par>
-                                <p:cTn id="23" presetID="1" presetClass="entr" presetSubtype="0" fill="hold" grpId="1" nodeType="withEffect">
-                                  <p:stCondLst>
-                                    <p:cond delay="0"/>
-                                  </p:stCondLst>
-                                  <p:childTnLst>
-                                    <p:set>
-                                      <p:cBhvr>
-                                        <p:cTn id="24" dur="1" fill="hold">
-                                          <p:stCondLst>
-                                            <p:cond delay="0"/>
-                                          </p:stCondLst>
-                                        </p:cTn>
-                                        <p:tgtEl>
-                                          <p:spTgt spid="3">
-                                            <p:txEl>
-                                              <p:pRg st="5" end="5"/>
-                                            </p:txEl>
-                                          </p:spTgt>
-                                        </p:tgtEl>
-                                        <p:attrNameLst>
-                                          <p:attrName>style.visibility</p:attrName>
-                                        </p:attrNameLst>
-                                      </p:cBhvr>
-                                      <p:to>
-                                        <p:strVal val="visible"/>
-                                      </p:to>
-                                    </p:set>
-                                  </p:childTnLst>
-                                </p:cTn>
-                              </p:par>
-                              <p:par>
-                                <p:cTn id="25" presetID="1" presetClass="entr" presetSubtype="0" fill="hold" grpId="1" nodeType="withEffect">
-                                  <p:stCondLst>
-                                    <p:cond delay="0"/>
-                                  </p:stCondLst>
-                                  <p:childTnLst>
-                                    <p:set>
-                                      <p:cBhvr>
-                                        <p:cTn id="26" dur="1" fill="hold">
-                                          <p:stCondLst>
-                                            <p:cond delay="0"/>
-                                          </p:stCondLst>
-                                        </p:cTn>
-                                        <p:tgtEl>
-                                          <p:spTgt spid="3">
-                                            <p:txEl>
-                                              <p:pRg st="6" end="6"/>
-                                            </p:txEl>
-                                          </p:spTgt>
-                                        </p:tgtEl>
-                                        <p:attrNameLst>
-                                          <p:attrName>style.visibility</p:attrName>
-                                        </p:attrNameLst>
-                                      </p:cBhvr>
-                                      <p:to>
-                                        <p:strVal val="visible"/>
-                                      </p:to>
-                                    </p:set>
-                                  </p:childTnLst>
-                                </p:cTn>
-                              </p:par>
-                            </p:childTnLst>
-                          </p:cTn>
-                        </p:par>
-                      </p:childTnLst>
-                    </p:cTn>
-                  </p:par>
-                </p:childTnLst>
-              </p:cTn>
-              <p:prevCondLst>
-                <p:cond evt="onPrev" delay="0">
-                  <p:tgtEl>
-                    <p:sldTgt/>
-                  </p:tgtEl>
-                </p:cond>
-              </p:prevCondLst>
-              <p:nextCondLst>
-                <p:cond evt="onNext" delay="0">
-                  <p:tgtEl>
-                    <p:sldTgt/>
-                  </p:tgtEl>
-                </p:cond>
-              </p:nextCondLst>
-            </p:seq>
-          </p:childTnLst>
-        </p:cTn>
+        <p:cTn id="1" dur="indefinite" restart="never" nodeType="tmRoot"/>
       </p:par>
     </p:tnLst>
-    <p:bldLst>
-      <p:bldP spid="3" grpId="1" build="p"/>
-    </p:bldLst>
   </p:timing>
 </p:sld>
 </file>
@@ -6896,7 +8485,7 @@
         </p:blipFill>
         <p:spPr bwMode="auto">
           <a:xfrm>
-            <a:off x="333374" y="1447800"/>
+            <a:off x="336115" y="990600"/>
             <a:ext cx="4010026" cy="5086350"/>
           </a:xfrm>
           <a:prstGeom prst="rect">
@@ -6937,8 +8526,49 @@
         </p:blipFill>
         <p:spPr bwMode="auto">
           <a:xfrm>
-            <a:off x="4572000" y="1447800"/>
+            <a:off x="4574741" y="990600"/>
             <a:ext cx="4210050" cy="5067300"/>
+          </a:xfrm>
+          <a:prstGeom prst="rect">
+            <a:avLst/>
+          </a:prstGeom>
+          <a:noFill/>
+          <a:extLst>
+            <a:ext uri="{909E8E84-426E-40DD-AFC4-6F175D3DCCD1}">
+              <a14:hiddenFill xmlns:a14="http://schemas.microsoft.com/office/drawing/2010/main">
+                <a:solidFill>
+                  <a:srgbClr val="FFFFFF"/>
+                </a:solidFill>
+              </a14:hiddenFill>
+            </a:ext>
+          </a:extLst>
+        </p:spPr>
+      </p:pic>
+      <p:pic>
+        <p:nvPicPr>
+          <p:cNvPr id="6147" name="Picture 3" descr="\\THE-ARCHTK\a$\dev\porfolio\agile2011\img\_0001_elmer-tester.png"/>
+          <p:cNvPicPr>
+            <a:picLocks noChangeAspect="1" noChangeArrowheads="1"/>
+          </p:cNvPicPr>
+          <p:nvPr/>
+        </p:nvPicPr>
+        <p:blipFill>
+          <a:blip r:embed="rId4">
+            <a:extLst>
+              <a:ext uri="{28A0092B-C50C-407E-A947-70E740481C1C}">
+                <a14:useLocalDpi xmlns:a14="http://schemas.microsoft.com/office/drawing/2010/main" val="0"/>
+              </a:ext>
+            </a:extLst>
+          </a:blip>
+          <a:srcRect/>
+          <a:stretch>
+            <a:fillRect/>
+          </a:stretch>
+        </p:blipFill>
+        <p:spPr bwMode="auto">
+          <a:xfrm>
+            <a:off x="8001000" y="4848225"/>
+            <a:ext cx="990600" cy="1781175"/>
           </a:xfrm>
           <a:prstGeom prst="rect">
             <a:avLst/>
@@ -7038,8 +8668,8 @@
         </p:blipFill>
         <p:spPr bwMode="auto">
           <a:xfrm>
-            <a:off x="3810000" y="1295400"/>
-            <a:ext cx="4771232" cy="2781719"/>
+            <a:off x="323589" y="1606463"/>
+            <a:ext cx="4082141" cy="2286000"/>
           </a:xfrm>
           <a:prstGeom prst="rect">
             <a:avLst/>
@@ -7079,8 +8709,49 @@
         </p:blipFill>
         <p:spPr bwMode="auto">
           <a:xfrm>
-            <a:off x="3826960" y="4191000"/>
-            <a:ext cx="4735222" cy="2421624"/>
+            <a:off x="4742145" y="1606463"/>
+            <a:ext cx="4082141" cy="2286000"/>
+          </a:xfrm>
+          <a:prstGeom prst="rect">
+            <a:avLst/>
+          </a:prstGeom>
+          <a:noFill/>
+          <a:extLst>
+            <a:ext uri="{909E8E84-426E-40DD-AFC4-6F175D3DCCD1}">
+              <a14:hiddenFill xmlns:a14="http://schemas.microsoft.com/office/drawing/2010/main">
+                <a:solidFill>
+                  <a:srgbClr val="FFFFFF"/>
+                </a:solidFill>
+              </a14:hiddenFill>
+            </a:ext>
+          </a:extLst>
+        </p:spPr>
+      </p:pic>
+      <p:pic>
+        <p:nvPicPr>
+          <p:cNvPr id="9218" name="Picture 2" descr="\\THE-ARCHTK\a$\dev\porfolio\agile2011\img\_0001_elmer-tester.png"/>
+          <p:cNvPicPr>
+            <a:picLocks noChangeAspect="1" noChangeArrowheads="1"/>
+          </p:cNvPicPr>
+          <p:nvPr/>
+        </p:nvPicPr>
+        <p:blipFill>
+          <a:blip r:embed="rId4">
+            <a:extLst>
+              <a:ext uri="{28A0092B-C50C-407E-A947-70E740481C1C}">
+                <a14:useLocalDpi xmlns:a14="http://schemas.microsoft.com/office/drawing/2010/main" val="0"/>
+              </a:ext>
+            </a:extLst>
+          </a:blip>
+          <a:srcRect/>
+          <a:stretch>
+            <a:fillRect/>
+          </a:stretch>
+        </p:blipFill>
+        <p:spPr bwMode="auto">
+          <a:xfrm>
+            <a:off x="7372611" y="3432784"/>
+            <a:ext cx="990600" cy="1781175"/>
           </a:xfrm>
           <a:prstGeom prst="rect">
             <a:avLst/>
@@ -7180,8 +8851,49 @@
         </p:blipFill>
         <p:spPr bwMode="auto">
           <a:xfrm>
-            <a:off x="2559942" y="1742629"/>
-            <a:ext cx="6163452" cy="2730500"/>
+            <a:off x="3250504" y="1410222"/>
+            <a:ext cx="5441058" cy="2410469"/>
+          </a:xfrm>
+          <a:prstGeom prst="rect">
+            <a:avLst/>
+          </a:prstGeom>
+          <a:noFill/>
+          <a:extLst>
+            <a:ext uri="{909E8E84-426E-40DD-AFC4-6F175D3DCCD1}">
+              <a14:hiddenFill xmlns:a14="http://schemas.microsoft.com/office/drawing/2010/main">
+                <a:solidFill>
+                  <a:srgbClr val="FFFFFF"/>
+                </a:solidFill>
+              </a14:hiddenFill>
+            </a:ext>
+          </a:extLst>
+        </p:spPr>
+      </p:pic>
+      <p:pic>
+        <p:nvPicPr>
+          <p:cNvPr id="10242" name="Picture 2" descr="\\THE-ARCHTK\a$\dev\porfolio\agile2011\img\_0001_elmer-tester.png"/>
+          <p:cNvPicPr>
+            <a:picLocks noChangeAspect="1" noChangeArrowheads="1"/>
+          </p:cNvPicPr>
+          <p:nvPr/>
+        </p:nvPicPr>
+        <p:blipFill>
+          <a:blip r:embed="rId3">
+            <a:extLst>
+              <a:ext uri="{28A0092B-C50C-407E-A947-70E740481C1C}">
+                <a14:useLocalDpi xmlns:a14="http://schemas.microsoft.com/office/drawing/2010/main" val="0"/>
+              </a:ext>
+            </a:extLst>
+          </a:blip>
+          <a:srcRect/>
+          <a:stretch>
+            <a:fillRect/>
+          </a:stretch>
+        </p:blipFill>
+        <p:spPr bwMode="auto">
+          <a:xfrm>
+            <a:off x="7373389" y="3429000"/>
+            <a:ext cx="990600" cy="1781175"/>
           </a:xfrm>
           <a:prstGeom prst="rect">
             <a:avLst/>
@@ -7291,6 +9003,47 @@
           </a:p>
         </p:txBody>
       </p:sp>
+      <p:pic>
+        <p:nvPicPr>
+          <p:cNvPr id="4" name="Picture 2" descr="\\THE-ARCHTK\a$\dev\porfolio\agile2011\img\_0001_elmer-tester.png"/>
+          <p:cNvPicPr>
+            <a:picLocks noChangeAspect="1" noChangeArrowheads="1"/>
+          </p:cNvPicPr>
+          <p:nvPr/>
+        </p:nvPicPr>
+        <p:blipFill>
+          <a:blip r:embed="rId2">
+            <a:extLst>
+              <a:ext uri="{28A0092B-C50C-407E-A947-70E740481C1C}">
+                <a14:useLocalDpi xmlns:a14="http://schemas.microsoft.com/office/drawing/2010/main" val="0"/>
+              </a:ext>
+            </a:extLst>
+          </a:blip>
+          <a:srcRect/>
+          <a:stretch>
+            <a:fillRect/>
+          </a:stretch>
+        </p:blipFill>
+        <p:spPr bwMode="auto">
+          <a:xfrm>
+            <a:off x="7373389" y="3429000"/>
+            <a:ext cx="990600" cy="1781175"/>
+          </a:xfrm>
+          <a:prstGeom prst="rect">
+            <a:avLst/>
+          </a:prstGeom>
+          <a:noFill/>
+          <a:extLst>
+            <a:ext uri="{909E8E84-426E-40DD-AFC4-6F175D3DCCD1}">
+              <a14:hiddenFill xmlns:a14="http://schemas.microsoft.com/office/drawing/2010/main">
+                <a:solidFill>
+                  <a:srgbClr val="FFFFFF"/>
+                </a:solidFill>
+              </a14:hiddenFill>
+            </a:ext>
+          </a:extLst>
+        </p:spPr>
+      </p:pic>
     </p:spTree>
     <p:extLst>
       <p:ext uri="{BB962C8B-B14F-4D97-AF65-F5344CB8AC3E}">
@@ -7534,4 +9287,289 @@
   <a:objectDefaults/>
   <a:extraClrSchemeLst/>
 </a:theme>
+</file>
+
+<file path=ppt/theme/theme2.xml><?xml version="1.0" encoding="utf-8"?>
+<a:theme xmlns:a="http://schemas.openxmlformats.org/drawingml/2006/main" name="Office Theme">
+  <a:themeElements>
+    <a:clrScheme name="Office">
+      <a:dk1>
+        <a:sysClr val="windowText" lastClr="000000"/>
+      </a:dk1>
+      <a:lt1>
+        <a:sysClr val="window" lastClr="FFFFFF"/>
+      </a:lt1>
+      <a:dk2>
+        <a:srgbClr val="1F497D"/>
+      </a:dk2>
+      <a:lt2>
+        <a:srgbClr val="EEECE1"/>
+      </a:lt2>
+      <a:accent1>
+        <a:srgbClr val="4F81BD"/>
+      </a:accent1>
+      <a:accent2>
+        <a:srgbClr val="C0504D"/>
+      </a:accent2>
+      <a:accent3>
+        <a:srgbClr val="9BBB59"/>
+      </a:accent3>
+      <a:accent4>
+        <a:srgbClr val="8064A2"/>
+      </a:accent4>
+      <a:accent5>
+        <a:srgbClr val="4BACC6"/>
+      </a:accent5>
+      <a:accent6>
+        <a:srgbClr val="F79646"/>
+      </a:accent6>
+      <a:hlink>
+        <a:srgbClr val="0000FF"/>
+      </a:hlink>
+      <a:folHlink>
+        <a:srgbClr val="800080"/>
+      </a:folHlink>
+    </a:clrScheme>
+    <a:fontScheme name="Office">
+      <a:majorFont>
+        <a:latin typeface="Calibri"/>
+        <a:ea typeface=""/>
+        <a:cs typeface=""/>
+        <a:font script="Jpan" typeface="ＭＳ Ｐゴシック"/>
+        <a:font script="Hang" typeface="맑은 고딕"/>
+        <a:font script="Hans" typeface="宋体"/>
+        <a:font script="Hant" typeface="新細明體"/>
+        <a:font script="Arab" typeface="Times New Roman"/>
+        <a:font script="Hebr" typeface="Times New Roman"/>
+        <a:font script="Thai" typeface="Angsana New"/>
+        <a:font script="Ethi" typeface="Nyala"/>
+        <a:font script="Beng" typeface="Vrinda"/>
+        <a:font script="Gujr" typeface="Shruti"/>
+        <a:font script="Khmr" typeface="MoolBoran"/>
+        <a:font script="Knda" typeface="Tunga"/>
+        <a:font script="Guru" typeface="Raavi"/>
+        <a:font script="Cans" typeface="Euphemia"/>
+        <a:font script="Cher" typeface="Plantagenet Cherokee"/>
+        <a:font script="Yiii" typeface="Microsoft Yi Baiti"/>
+        <a:font script="Tibt" typeface="Microsoft Himalaya"/>
+        <a:font script="Thaa" typeface="MV Boli"/>
+        <a:font script="Deva" typeface="Mangal"/>
+        <a:font script="Telu" typeface="Gautami"/>
+        <a:font script="Taml" typeface="Latha"/>
+        <a:font script="Syrc" typeface="Estrangelo Edessa"/>
+        <a:font script="Orya" typeface="Kalinga"/>
+        <a:font script="Mlym" typeface="Kartika"/>
+        <a:font script="Laoo" typeface="DokChampa"/>
+        <a:font script="Sinh" typeface="Iskoola Pota"/>
+        <a:font script="Mong" typeface="Mongolian Baiti"/>
+        <a:font script="Viet" typeface="Times New Roman"/>
+        <a:font script="Uigh" typeface="Microsoft Uighur"/>
+        <a:font script="Geor" typeface="Sylfaen"/>
+      </a:majorFont>
+      <a:minorFont>
+        <a:latin typeface="Calibri"/>
+        <a:ea typeface=""/>
+        <a:cs typeface=""/>
+        <a:font script="Jpan" typeface="ＭＳ Ｐゴシック"/>
+        <a:font script="Hang" typeface="맑은 고딕"/>
+        <a:font script="Hans" typeface="宋体"/>
+        <a:font script="Hant" typeface="新細明體"/>
+        <a:font script="Arab" typeface="Arial"/>
+        <a:font script="Hebr" typeface="Arial"/>
+        <a:font script="Thai" typeface="Cordia New"/>
+        <a:font script="Ethi" typeface="Nyala"/>
+        <a:font script="Beng" typeface="Vrinda"/>
+        <a:font script="Gujr" typeface="Shruti"/>
+        <a:font script="Khmr" typeface="DaunPenh"/>
+        <a:font script="Knda" typeface="Tunga"/>
+        <a:font script="Guru" typeface="Raavi"/>
+        <a:font script="Cans" typeface="Euphemia"/>
+        <a:font script="Cher" typeface="Plantagenet Cherokee"/>
+        <a:font script="Yiii" typeface="Microsoft Yi Baiti"/>
+        <a:font script="Tibt" typeface="Microsoft Himalaya"/>
+        <a:font script="Thaa" typeface="MV Boli"/>
+        <a:font script="Deva" typeface="Mangal"/>
+        <a:font script="Telu" typeface="Gautami"/>
+        <a:font script="Taml" typeface="Latha"/>
+        <a:font script="Syrc" typeface="Estrangelo Edessa"/>
+        <a:font script="Orya" typeface="Kalinga"/>
+        <a:font script="Mlym" typeface="Kartika"/>
+        <a:font script="Laoo" typeface="DokChampa"/>
+        <a:font script="Sinh" typeface="Iskoola Pota"/>
+        <a:font script="Mong" typeface="Mongolian Baiti"/>
+        <a:font script="Viet" typeface="Arial"/>
+        <a:font script="Uigh" typeface="Microsoft Uighur"/>
+        <a:font script="Geor" typeface="Sylfaen"/>
+      </a:minorFont>
+    </a:fontScheme>
+    <a:fmtScheme name="Office">
+      <a:fillStyleLst>
+        <a:solidFill>
+          <a:schemeClr val="phClr"/>
+        </a:solidFill>
+        <a:gradFill rotWithShape="1">
+          <a:gsLst>
+            <a:gs pos="0">
+              <a:schemeClr val="phClr">
+                <a:tint val="50000"/>
+                <a:satMod val="300000"/>
+              </a:schemeClr>
+            </a:gs>
+            <a:gs pos="35000">
+              <a:schemeClr val="phClr">
+                <a:tint val="37000"/>
+                <a:satMod val="300000"/>
+              </a:schemeClr>
+            </a:gs>
+            <a:gs pos="100000">
+              <a:schemeClr val="phClr">
+                <a:tint val="15000"/>
+                <a:satMod val="350000"/>
+              </a:schemeClr>
+            </a:gs>
+          </a:gsLst>
+          <a:lin ang="16200000" scaled="1"/>
+        </a:gradFill>
+        <a:gradFill rotWithShape="1">
+          <a:gsLst>
+            <a:gs pos="0">
+              <a:schemeClr val="phClr">
+                <a:shade val="51000"/>
+                <a:satMod val="130000"/>
+              </a:schemeClr>
+            </a:gs>
+            <a:gs pos="80000">
+              <a:schemeClr val="phClr">
+                <a:shade val="93000"/>
+                <a:satMod val="130000"/>
+              </a:schemeClr>
+            </a:gs>
+            <a:gs pos="100000">
+              <a:schemeClr val="phClr">
+                <a:shade val="94000"/>
+                <a:satMod val="135000"/>
+              </a:schemeClr>
+            </a:gs>
+          </a:gsLst>
+          <a:lin ang="16200000" scaled="0"/>
+        </a:gradFill>
+      </a:fillStyleLst>
+      <a:lnStyleLst>
+        <a:ln w="9525" cap="flat" cmpd="sng" algn="ctr">
+          <a:solidFill>
+            <a:schemeClr val="phClr">
+              <a:shade val="95000"/>
+              <a:satMod val="105000"/>
+            </a:schemeClr>
+          </a:solidFill>
+          <a:prstDash val="solid"/>
+        </a:ln>
+        <a:ln w="25400" cap="flat" cmpd="sng" algn="ctr">
+          <a:solidFill>
+            <a:schemeClr val="phClr"/>
+          </a:solidFill>
+          <a:prstDash val="solid"/>
+        </a:ln>
+        <a:ln w="38100" cap="flat" cmpd="sng" algn="ctr">
+          <a:solidFill>
+            <a:schemeClr val="phClr"/>
+          </a:solidFill>
+          <a:prstDash val="solid"/>
+        </a:ln>
+      </a:lnStyleLst>
+      <a:effectStyleLst>
+        <a:effectStyle>
+          <a:effectLst>
+            <a:outerShdw blurRad="40000" dist="20000" dir="5400000" rotWithShape="0">
+              <a:srgbClr val="000000">
+                <a:alpha val="38000"/>
+              </a:srgbClr>
+            </a:outerShdw>
+          </a:effectLst>
+        </a:effectStyle>
+        <a:effectStyle>
+          <a:effectLst>
+            <a:outerShdw blurRad="40000" dist="23000" dir="5400000" rotWithShape="0">
+              <a:srgbClr val="000000">
+                <a:alpha val="35000"/>
+              </a:srgbClr>
+            </a:outerShdw>
+          </a:effectLst>
+        </a:effectStyle>
+        <a:effectStyle>
+          <a:effectLst>
+            <a:outerShdw blurRad="40000" dist="23000" dir="5400000" rotWithShape="0">
+              <a:srgbClr val="000000">
+                <a:alpha val="35000"/>
+              </a:srgbClr>
+            </a:outerShdw>
+          </a:effectLst>
+          <a:scene3d>
+            <a:camera prst="orthographicFront">
+              <a:rot lat="0" lon="0" rev="0"/>
+            </a:camera>
+            <a:lightRig rig="threePt" dir="t">
+              <a:rot lat="0" lon="0" rev="1200000"/>
+            </a:lightRig>
+          </a:scene3d>
+          <a:sp3d>
+            <a:bevelT w="63500" h="25400"/>
+          </a:sp3d>
+        </a:effectStyle>
+      </a:effectStyleLst>
+      <a:bgFillStyleLst>
+        <a:solidFill>
+          <a:schemeClr val="phClr"/>
+        </a:solidFill>
+        <a:gradFill rotWithShape="1">
+          <a:gsLst>
+            <a:gs pos="0">
+              <a:schemeClr val="phClr">
+                <a:tint val="40000"/>
+                <a:satMod val="350000"/>
+              </a:schemeClr>
+            </a:gs>
+            <a:gs pos="40000">
+              <a:schemeClr val="phClr">
+                <a:tint val="45000"/>
+                <a:shade val="99000"/>
+                <a:satMod val="350000"/>
+              </a:schemeClr>
+            </a:gs>
+            <a:gs pos="100000">
+              <a:schemeClr val="phClr">
+                <a:shade val="20000"/>
+                <a:satMod val="255000"/>
+              </a:schemeClr>
+            </a:gs>
+          </a:gsLst>
+          <a:path path="circle">
+            <a:fillToRect l="50000" t="-80000" r="50000" b="180000"/>
+          </a:path>
+        </a:gradFill>
+        <a:gradFill rotWithShape="1">
+          <a:gsLst>
+            <a:gs pos="0">
+              <a:schemeClr val="phClr">
+                <a:tint val="80000"/>
+                <a:satMod val="300000"/>
+              </a:schemeClr>
+            </a:gs>
+            <a:gs pos="100000">
+              <a:schemeClr val="phClr">
+                <a:shade val="30000"/>
+                <a:satMod val="200000"/>
+              </a:schemeClr>
+            </a:gs>
+          </a:gsLst>
+          <a:path path="circle">
+            <a:fillToRect l="50000" t="50000" r="50000" b="50000"/>
+          </a:path>
+        </a:gradFill>
+      </a:bgFillStyleLst>
+    </a:fmtScheme>
+  </a:themeElements>
+  <a:objectDefaults/>
+  <a:extraClrSchemeLst/>
+</a:theme>
 </file>
</xml_diff>

<commit_message>
only 2 slides missing!!!
</commit_message>
<xml_diff>
--- a/agile2011/presentation.pptx
+++ b/agile2011/presentation.pptx
@@ -1186,15 +1186,26 @@
             <p:ph type="title"/>
           </p:nvPr>
         </p:nvSpPr>
-        <p:spPr/>
+        <p:spPr>
+          <a:noFill/>
+          <a:ln w="31750">
+            <a:noFill/>
+          </a:ln>
+        </p:spPr>
         <p:txBody>
           <a:bodyPr/>
           <a:lstStyle>
             <a:lvl1pPr>
-              <a:defRPr>
+              <a:defRPr u="none">
+                <a:ln w="0">
+                  <a:solidFill>
+                    <a:schemeClr val="tx1"/>
+                  </a:solidFill>
+                </a:ln>
                 <a:solidFill>
                   <a:schemeClr val="tx1"/>
                 </a:solidFill>
+                <a:effectLst/>
               </a:defRPr>
             </a:lvl1pPr>
           </a:lstStyle>
@@ -3086,7 +3097,7 @@
         </p:nvSpPr>
         <p:spPr>
           <a:xfrm>
-            <a:off x="775127" y="0"/>
+            <a:off x="775127" y="68759"/>
             <a:ext cx="7593745" cy="769441"/>
           </a:xfrm>
           <a:prstGeom prst="rect">
@@ -3636,8 +3647,8 @@
         </p:blipFill>
         <p:spPr bwMode="auto">
           <a:xfrm>
-            <a:off x="1051560" y="1820333"/>
-            <a:ext cx="7040880" cy="4120744"/>
+            <a:off x="1051560" y="1742702"/>
+            <a:ext cx="7040880" cy="4004657"/>
           </a:xfrm>
           <a:prstGeom prst="rect">
             <a:avLst/>
@@ -3677,7 +3688,7 @@
         </p:blipFill>
         <p:spPr bwMode="auto">
           <a:xfrm>
-            <a:off x="1051560" y="1820333"/>
+            <a:off x="1051560" y="1710343"/>
             <a:ext cx="7040880" cy="4054761"/>
           </a:xfrm>
           <a:prstGeom prst="rect">
@@ -3703,8 +3714,8 @@
         </p:nvGrpSpPr>
         <p:grpSpPr>
           <a:xfrm>
-            <a:off x="8148711" y="5726817"/>
-            <a:ext cx="625149" cy="702257"/>
+            <a:off x="8240798" y="5870128"/>
+            <a:ext cx="756430" cy="772483"/>
             <a:chOff x="3481387" y="3260725"/>
             <a:chExt cx="703237" cy="777875"/>
           </a:xfrm>
@@ -3864,8 +3875,8 @@
         </p:nvGrpSpPr>
         <p:grpSpPr>
           <a:xfrm>
-            <a:off x="7386712" y="5734862"/>
-            <a:ext cx="623584" cy="702257"/>
+            <a:off x="7348983" y="5878173"/>
+            <a:ext cx="754536" cy="772483"/>
             <a:chOff x="6375895" y="3274445"/>
             <a:chExt cx="701477" cy="777875"/>
           </a:xfrm>
@@ -3961,8 +3972,8 @@
         </p:nvGrpSpPr>
         <p:grpSpPr>
           <a:xfrm>
-            <a:off x="6610622" y="5734863"/>
-            <a:ext cx="623584" cy="702257"/>
+            <a:off x="6457167" y="5878174"/>
+            <a:ext cx="754536" cy="772483"/>
             <a:chOff x="4931643" y="3242520"/>
             <a:chExt cx="701477" cy="777875"/>
           </a:xfrm>
@@ -4186,7 +4197,7 @@
         </p:nvSpPr>
         <p:spPr>
           <a:xfrm>
-            <a:off x="6627261" y="6456288"/>
+            <a:off x="6564334" y="6634712"/>
             <a:ext cx="509755" cy="184666"/>
           </a:xfrm>
           <a:prstGeom prst="rect">
@@ -4216,7 +4227,7 @@
         </p:nvSpPr>
         <p:spPr>
           <a:xfrm>
-            <a:off x="7300879" y="6456288"/>
+            <a:off x="7313521" y="6634712"/>
             <a:ext cx="798873" cy="184666"/>
           </a:xfrm>
           <a:prstGeom prst="rect">
@@ -4246,7 +4257,7 @@
         </p:nvSpPr>
         <p:spPr>
           <a:xfrm>
-            <a:off x="8161867" y="6456288"/>
+            <a:off x="8323107" y="6634712"/>
             <a:ext cx="597921" cy="184666"/>
           </a:xfrm>
           <a:prstGeom prst="rect">
@@ -4972,7 +4983,7 @@
         </p:blipFill>
         <p:spPr bwMode="auto">
           <a:xfrm>
-            <a:off x="2895600" y="990600"/>
+            <a:off x="2871788" y="1066800"/>
             <a:ext cx="3400425" cy="1842234"/>
           </a:xfrm>
           <a:prstGeom prst="rect">
@@ -5013,7 +5024,7 @@
         </p:blipFill>
         <p:spPr bwMode="auto">
           <a:xfrm>
-            <a:off x="3962400" y="2031076"/>
+            <a:off x="3907517" y="2105130"/>
             <a:ext cx="3941083" cy="3457470"/>
           </a:xfrm>
           <a:prstGeom prst="rect">
@@ -5287,7 +5298,7 @@
         </p:blipFill>
         <p:spPr bwMode="auto">
           <a:xfrm>
-            <a:off x="2362200" y="914400"/>
+            <a:off x="2667000" y="990600"/>
             <a:ext cx="4572000" cy="3149150"/>
           </a:xfrm>
           <a:prstGeom prst="rect">
@@ -5328,7 +5339,7 @@
         </p:blipFill>
         <p:spPr bwMode="auto">
           <a:xfrm>
-            <a:off x="3429000" y="3505200"/>
+            <a:off x="3657600" y="3418314"/>
             <a:ext cx="4572000" cy="1687086"/>
           </a:xfrm>
           <a:prstGeom prst="rect">
@@ -5602,7 +5613,7 @@
         </p:blipFill>
         <p:spPr bwMode="auto">
           <a:xfrm>
-            <a:off x="999066" y="1524000"/>
+            <a:off x="999066" y="1066800"/>
             <a:ext cx="7145869" cy="3762375"/>
           </a:xfrm>
           <a:prstGeom prst="rect">
@@ -5643,7 +5654,7 @@
         </p:blipFill>
         <p:spPr bwMode="auto">
           <a:xfrm>
-            <a:off x="7467600" y="3638550"/>
+            <a:off x="7217210" y="3612715"/>
             <a:ext cx="752475" cy="2305050"/>
           </a:xfrm>
           <a:prstGeom prst="rect">
@@ -5744,7 +5755,7 @@
         </p:blipFill>
         <p:spPr bwMode="auto">
           <a:xfrm>
-            <a:off x="5024535" y="1402847"/>
+            <a:off x="5024535" y="1021847"/>
             <a:ext cx="3662265" cy="1721353"/>
           </a:xfrm>
           <a:prstGeom prst="rect">
@@ -5785,7 +5796,7 @@
         </p:blipFill>
         <p:spPr bwMode="auto">
           <a:xfrm>
-            <a:off x="533401" y="1402847"/>
+            <a:off x="533401" y="1021847"/>
             <a:ext cx="4309562" cy="4769353"/>
           </a:xfrm>
           <a:prstGeom prst="rect">
@@ -6059,7 +6070,7 @@
         </p:blipFill>
         <p:spPr bwMode="auto">
           <a:xfrm>
-            <a:off x="685800" y="1371600"/>
+            <a:off x="685800" y="1066800"/>
             <a:ext cx="3747847" cy="5105400"/>
           </a:xfrm>
           <a:prstGeom prst="rect">
@@ -6100,7 +6111,7 @@
         </p:blipFill>
         <p:spPr bwMode="auto">
           <a:xfrm>
-            <a:off x="4724400" y="1371600"/>
+            <a:off x="4724400" y="1066800"/>
             <a:ext cx="3981449" cy="2041123"/>
           </a:xfrm>
           <a:prstGeom prst="rect">
@@ -6242,7 +6253,7 @@
         </p:blipFill>
         <p:spPr bwMode="auto">
           <a:xfrm>
-            <a:off x="656432" y="1447800"/>
+            <a:off x="656432" y="995233"/>
             <a:ext cx="7831137" cy="4872167"/>
           </a:xfrm>
           <a:prstGeom prst="rect">
@@ -6384,7 +6395,7 @@
         </p:blipFill>
         <p:spPr bwMode="auto">
           <a:xfrm>
-            <a:off x="628650" y="1523999"/>
+            <a:off x="628650" y="1066800"/>
             <a:ext cx="3830855" cy="4572000"/>
           </a:xfrm>
           <a:prstGeom prst="rect">
@@ -6425,7 +6436,7 @@
         </p:blipFill>
         <p:spPr bwMode="auto">
           <a:xfrm>
-            <a:off x="4724399" y="1523999"/>
+            <a:off x="4724399" y="1066800"/>
             <a:ext cx="3794760" cy="4572000"/>
           </a:xfrm>
           <a:prstGeom prst="rect">
@@ -6567,7 +6578,7 @@
         </p:blipFill>
         <p:spPr bwMode="auto">
           <a:xfrm>
-            <a:off x="6103796" y="2309024"/>
+            <a:off x="6103796" y="1600200"/>
             <a:ext cx="2735404" cy="2447925"/>
           </a:xfrm>
           <a:prstGeom prst="rect">
@@ -6608,7 +6619,7 @@
         </p:blipFill>
         <p:spPr bwMode="auto">
           <a:xfrm>
-            <a:off x="3200400" y="2309024"/>
+            <a:off x="3200400" y="1600200"/>
             <a:ext cx="2819400" cy="3234526"/>
           </a:xfrm>
           <a:prstGeom prst="rect">
@@ -6649,7 +6660,7 @@
         </p:blipFill>
         <p:spPr bwMode="auto">
           <a:xfrm>
-            <a:off x="304801" y="2309024"/>
+            <a:off x="304801" y="1600200"/>
             <a:ext cx="2800960" cy="2514600"/>
           </a:xfrm>
           <a:prstGeom prst="rect">
@@ -6690,7 +6701,7 @@
         </p:blipFill>
         <p:spPr bwMode="auto">
           <a:xfrm>
-            <a:off x="2757487" y="3333750"/>
+            <a:off x="2743200" y="2895600"/>
             <a:ext cx="752475" cy="2305050"/>
           </a:xfrm>
           <a:prstGeom prst="rect">
@@ -6731,7 +6742,7 @@
         </p:blipFill>
         <p:spPr bwMode="auto">
           <a:xfrm>
-            <a:off x="5486400" y="3333750"/>
+            <a:off x="5486400" y="3105150"/>
             <a:ext cx="752475" cy="2305050"/>
           </a:xfrm>
           <a:prstGeom prst="rect">
@@ -6772,7 +6783,7 @@
         </p:blipFill>
         <p:spPr bwMode="auto">
           <a:xfrm>
-            <a:off x="8153400" y="3333750"/>
+            <a:off x="8153400" y="2876550"/>
             <a:ext cx="752475" cy="2305050"/>
           </a:xfrm>
           <a:prstGeom prst="rect">
@@ -7353,8 +7364,8 @@
         </p:blipFill>
         <p:spPr bwMode="auto">
           <a:xfrm>
-            <a:off x="2743200" y="1155700"/>
-            <a:ext cx="5014082" cy="5092700"/>
+            <a:off x="2591802" y="1003300"/>
+            <a:ext cx="4113798" cy="4178300"/>
           </a:xfrm>
           <a:prstGeom prst="rect">
             <a:avLst/>
@@ -7394,7 +7405,7 @@
         </p:blipFill>
         <p:spPr bwMode="auto">
           <a:xfrm>
-            <a:off x="7315200" y="4171950"/>
+            <a:off x="6172200" y="3638550"/>
             <a:ext cx="752475" cy="2305050"/>
           </a:xfrm>
           <a:prstGeom prst="rect">
@@ -7499,7 +7510,7 @@
         </p:blipFill>
         <p:spPr bwMode="auto">
           <a:xfrm>
-            <a:off x="400050" y="1752600"/>
+            <a:off x="400050" y="1198542"/>
             <a:ext cx="8343900" cy="4460916"/>
           </a:xfrm>
           <a:prstGeom prst="rect">
@@ -7527,7 +7538,7 @@
         </p:nvSpPr>
         <p:spPr>
           <a:xfrm>
-            <a:off x="2171700" y="1143000"/>
+            <a:off x="2171700" y="609600"/>
             <a:ext cx="4800600" cy="685800"/>
           </a:xfrm>
           <a:prstGeom prst="rect">
@@ -7556,17 +7567,97 @@
           </a:lstStyle>
           <a:p>
             <a:r>
-              <a:rPr lang="en-US" sz="3200" dirty="0" smtClean="0">
-                <a:latin typeface="+mn-lt"/>
-              </a:rPr>
+              <a:rPr lang="en-US" sz="2800" dirty="0" smtClean="0"/>
               <a:t>Update Compensation</a:t>
             </a:r>
-            <a:endParaRPr lang="en-US" sz="3200" dirty="0">
+            <a:endParaRPr lang="en-US" sz="2800" b="1" dirty="0">
               <a:latin typeface="+mn-lt"/>
             </a:endParaRPr>
           </a:p>
         </p:txBody>
       </p:sp>
+      <p:pic>
+        <p:nvPicPr>
+          <p:cNvPr id="5" name="Picture 3" descr="A:\dev\porfolio\agile2011\img\_0000s_0001_Ulti.png"/>
+          <p:cNvPicPr>
+            <a:picLocks noChangeAspect="1" noChangeArrowheads="1"/>
+          </p:cNvPicPr>
+          <p:nvPr/>
+        </p:nvPicPr>
+        <p:blipFill>
+          <a:blip r:embed="rId3">
+            <a:extLst>
+              <a:ext uri="{28A0092B-C50C-407E-A947-70E740481C1C}">
+                <a14:useLocalDpi xmlns:a14="http://schemas.microsoft.com/office/drawing/2010/main" val="0"/>
+              </a:ext>
+            </a:extLst>
+          </a:blip>
+          <a:srcRect/>
+          <a:stretch>
+            <a:fillRect/>
+          </a:stretch>
+        </p:blipFill>
+        <p:spPr bwMode="auto">
+          <a:xfrm>
+            <a:off x="2324100" y="5384104"/>
+            <a:ext cx="4495800" cy="1609725"/>
+          </a:xfrm>
+          <a:prstGeom prst="rect">
+            <a:avLst/>
+          </a:prstGeom>
+          <a:noFill/>
+          <a:extLst>
+            <a:ext uri="{909E8E84-426E-40DD-AFC4-6F175D3DCCD1}">
+              <a14:hiddenFill xmlns:a14="http://schemas.microsoft.com/office/drawing/2010/main">
+                <a:solidFill>
+                  <a:srgbClr val="FFFFFF"/>
+                </a:solidFill>
+              </a14:hiddenFill>
+            </a:ext>
+          </a:extLst>
+        </p:spPr>
+      </p:pic>
+      <p:pic>
+        <p:nvPicPr>
+          <p:cNvPr id="6" name="Picture 4" descr="A:\dev\porfolio\agile2011\img\_0000s_0000_Best.png"/>
+          <p:cNvPicPr>
+            <a:picLocks noChangeAspect="1" noChangeArrowheads="1"/>
+          </p:cNvPicPr>
+          <p:nvPr/>
+        </p:nvPicPr>
+        <p:blipFill>
+          <a:blip r:embed="rId4">
+            <a:extLst>
+              <a:ext uri="{28A0092B-C50C-407E-A947-70E740481C1C}">
+                <a14:useLocalDpi xmlns:a14="http://schemas.microsoft.com/office/drawing/2010/main" val="0"/>
+              </a:ext>
+            </a:extLst>
+          </a:blip>
+          <a:srcRect/>
+          <a:stretch>
+            <a:fillRect/>
+          </a:stretch>
+        </p:blipFill>
+        <p:spPr bwMode="auto">
+          <a:xfrm>
+            <a:off x="6675851" y="5943600"/>
+            <a:ext cx="2257425" cy="704850"/>
+          </a:xfrm>
+          <a:prstGeom prst="rect">
+            <a:avLst/>
+          </a:prstGeom>
+          <a:noFill/>
+          <a:extLst>
+            <a:ext uri="{909E8E84-426E-40DD-AFC4-6F175D3DCCD1}">
+              <a14:hiddenFill xmlns:a14="http://schemas.microsoft.com/office/drawing/2010/main">
+                <a:solidFill>
+                  <a:srgbClr val="FFFFFF"/>
+                </a:solidFill>
+              </a14:hiddenFill>
+            </a:ext>
+          </a:extLst>
+        </p:spPr>
+      </p:pic>
     </p:spTree>
     <p:extLst>
       <p:ext uri="{BB962C8B-B14F-4D97-AF65-F5344CB8AC3E}">
@@ -7604,86 +7695,9 @@
           <a:chExt cx="0" cy="0"/>
         </a:xfrm>
       </p:grpSpPr>
-      <p:sp>
-        <p:nvSpPr>
-          <p:cNvPr id="2" name="Title 1"/>
-          <p:cNvSpPr>
-            <a:spLocks noGrp="1"/>
-          </p:cNvSpPr>
-          <p:nvPr>
-            <p:ph type="title"/>
-          </p:nvPr>
-        </p:nvSpPr>
-        <p:spPr/>
-        <p:txBody>
-          <a:bodyPr/>
-          <a:lstStyle/>
-          <a:p>
-            <a:r>
-              <a:rPr lang="en-US" dirty="0" err="1" smtClean="0"/>
-              <a:t>UltiPro</a:t>
-            </a:r>
-            <a:r>
-              <a:rPr lang="en-US" dirty="0" smtClean="0"/>
-              <a:t> Web Services</a:t>
-            </a:r>
-            <a:endParaRPr lang="en-US" dirty="0"/>
-          </a:p>
-        </p:txBody>
-      </p:sp>
-      <p:sp>
-        <p:nvSpPr>
-          <p:cNvPr id="4" name="Title 1"/>
-          <p:cNvSpPr txBox="1">
-            <a:spLocks/>
-          </p:cNvSpPr>
-          <p:nvPr/>
-        </p:nvSpPr>
-        <p:spPr>
-          <a:xfrm>
-            <a:off x="2171700" y="1143000"/>
-            <a:ext cx="4800600" cy="685800"/>
-          </a:xfrm>
-          <a:prstGeom prst="rect">
-            <a:avLst/>
-          </a:prstGeom>
-        </p:spPr>
-        <p:txBody>
-          <a:bodyPr vert="horz" lIns="91440" tIns="45720" rIns="91440" bIns="45720" rtlCol="0" anchor="ctr">
-            <a:normAutofit/>
-          </a:bodyPr>
-          <a:lstStyle>
-            <a:lvl1pPr algn="ctr" defTabSz="914400" rtl="0" eaLnBrk="1" latinLnBrk="0" hangingPunct="1">
-              <a:spcBef>
-                <a:spcPct val="0"/>
-              </a:spcBef>
-              <a:buNone/>
-              <a:defRPr sz="4400" kern="1200">
-                <a:solidFill>
-                  <a:schemeClr val="tx1"/>
-                </a:solidFill>
-                <a:latin typeface="+mj-lt"/>
-                <a:ea typeface="+mj-ea"/>
-                <a:cs typeface="+mj-cs"/>
-              </a:defRPr>
-            </a:lvl1pPr>
-          </a:lstStyle>
-          <a:p>
-            <a:r>
-              <a:rPr lang="en-US" sz="3200" dirty="0" smtClean="0">
-                <a:latin typeface="+mn-lt"/>
-              </a:rPr>
-              <a:t>Validate Job</a:t>
-            </a:r>
-            <a:endParaRPr lang="en-US" sz="3200" dirty="0">
-              <a:latin typeface="+mn-lt"/>
-            </a:endParaRPr>
-          </a:p>
-        </p:txBody>
-      </p:sp>
       <p:pic>
         <p:nvPicPr>
-          <p:cNvPr id="5122" name="Picture 2" descr="\\THE-ARCHTK\a$\dev\porfolio\agile2011\img\change_job.png"/>
+          <p:cNvPr id="1027" name="Picture 3" descr="A:\dev\porfolio\agile2011\img\_0000s_0001_Ulti.png"/>
           <p:cNvPicPr>
             <a:picLocks noChangeAspect="1" noChangeArrowheads="1"/>
           </p:cNvPicPr>
@@ -7704,8 +7718,165 @@
         </p:blipFill>
         <p:spPr bwMode="auto">
           <a:xfrm>
-            <a:off x="1262409" y="1752600"/>
+            <a:off x="2324100" y="5421682"/>
+            <a:ext cx="4495800" cy="1609725"/>
+          </a:xfrm>
+          <a:prstGeom prst="rect">
+            <a:avLst/>
+          </a:prstGeom>
+          <a:noFill/>
+          <a:extLst>
+            <a:ext uri="{909E8E84-426E-40DD-AFC4-6F175D3DCCD1}">
+              <a14:hiddenFill xmlns:a14="http://schemas.microsoft.com/office/drawing/2010/main">
+                <a:solidFill>
+                  <a:srgbClr val="FFFFFF"/>
+                </a:solidFill>
+              </a14:hiddenFill>
+            </a:ext>
+          </a:extLst>
+        </p:spPr>
+      </p:pic>
+      <p:sp>
+        <p:nvSpPr>
+          <p:cNvPr id="2" name="Title 1"/>
+          <p:cNvSpPr>
+            <a:spLocks noGrp="1"/>
+          </p:cNvSpPr>
+          <p:nvPr>
+            <p:ph type="title"/>
+          </p:nvPr>
+        </p:nvSpPr>
+        <p:spPr/>
+        <p:txBody>
+          <a:bodyPr/>
+          <a:lstStyle/>
+          <a:p>
+            <a:r>
+              <a:rPr lang="en-US" dirty="0" err="1" smtClean="0"/>
+              <a:t>UltiPro</a:t>
+            </a:r>
+            <a:r>
+              <a:rPr lang="en-US" dirty="0" smtClean="0"/>
+              <a:t> Web Services</a:t>
+            </a:r>
+            <a:endParaRPr lang="en-US" dirty="0"/>
+          </a:p>
+        </p:txBody>
+      </p:sp>
+      <p:sp>
+        <p:nvSpPr>
+          <p:cNvPr id="4" name="Title 1"/>
+          <p:cNvSpPr txBox="1">
+            <a:spLocks/>
+          </p:cNvSpPr>
+          <p:nvPr/>
+        </p:nvSpPr>
+        <p:spPr>
+          <a:xfrm>
+            <a:off x="2171700" y="609600"/>
+            <a:ext cx="4800600" cy="685800"/>
+          </a:xfrm>
+          <a:prstGeom prst="rect">
+            <a:avLst/>
+          </a:prstGeom>
+        </p:spPr>
+        <p:txBody>
+          <a:bodyPr vert="horz" lIns="91440" tIns="45720" rIns="91440" bIns="45720" rtlCol="0" anchor="ctr">
+            <a:normAutofit/>
+          </a:bodyPr>
+          <a:lstStyle>
+            <a:lvl1pPr algn="ctr" defTabSz="914400" rtl="0" eaLnBrk="1" latinLnBrk="0" hangingPunct="1">
+              <a:spcBef>
+                <a:spcPct val="0"/>
+              </a:spcBef>
+              <a:buNone/>
+              <a:defRPr sz="4400" kern="1200">
+                <a:solidFill>
+                  <a:schemeClr val="tx1"/>
+                </a:solidFill>
+                <a:latin typeface="+mj-lt"/>
+                <a:ea typeface="+mj-ea"/>
+                <a:cs typeface="+mj-cs"/>
+              </a:defRPr>
+            </a:lvl1pPr>
+          </a:lstStyle>
+          <a:p>
+            <a:r>
+              <a:rPr lang="en-US" sz="2800" dirty="0" smtClean="0"/>
+              <a:t>Validate Job</a:t>
+            </a:r>
+            <a:endParaRPr lang="en-US" sz="2800" dirty="0">
+              <a:latin typeface="+mn-lt"/>
+            </a:endParaRPr>
+          </a:p>
+        </p:txBody>
+      </p:sp>
+      <p:pic>
+        <p:nvPicPr>
+          <p:cNvPr id="5122" name="Picture 2" descr="\\THE-ARCHTK\a$\dev\porfolio\agile2011\img\change_job.png"/>
+          <p:cNvPicPr>
+            <a:picLocks noChangeAspect="1" noChangeArrowheads="1"/>
+          </p:cNvPicPr>
+          <p:nvPr/>
+        </p:nvPicPr>
+        <p:blipFill>
+          <a:blip r:embed="rId4">
+            <a:extLst>
+              <a:ext uri="{28A0092B-C50C-407E-A947-70E740481C1C}">
+                <a14:useLocalDpi xmlns:a14="http://schemas.microsoft.com/office/drawing/2010/main" val="0"/>
+              </a:ext>
+            </a:extLst>
+          </a:blip>
+          <a:srcRect/>
+          <a:stretch>
+            <a:fillRect/>
+          </a:stretch>
+        </p:blipFill>
+        <p:spPr bwMode="auto">
+          <a:xfrm>
+            <a:off x="1262409" y="1108746"/>
             <a:ext cx="6619183" cy="4640508"/>
+          </a:xfrm>
+          <a:prstGeom prst="rect">
+            <a:avLst/>
+          </a:prstGeom>
+          <a:noFill/>
+          <a:extLst>
+            <a:ext uri="{909E8E84-426E-40DD-AFC4-6F175D3DCCD1}">
+              <a14:hiddenFill xmlns:a14="http://schemas.microsoft.com/office/drawing/2010/main">
+                <a:solidFill>
+                  <a:srgbClr val="FFFFFF"/>
+                </a:solidFill>
+              </a14:hiddenFill>
+            </a:ext>
+          </a:extLst>
+        </p:spPr>
+      </p:pic>
+      <p:pic>
+        <p:nvPicPr>
+          <p:cNvPr id="1028" name="Picture 4" descr="A:\dev\porfolio\agile2011\img\_0000s_0000_Best.png"/>
+          <p:cNvPicPr>
+            <a:picLocks noChangeAspect="1" noChangeArrowheads="1"/>
+          </p:cNvPicPr>
+          <p:nvPr/>
+        </p:nvPicPr>
+        <p:blipFill>
+          <a:blip r:embed="rId5">
+            <a:extLst>
+              <a:ext uri="{28A0092B-C50C-407E-A947-70E740481C1C}">
+                <a14:useLocalDpi xmlns:a14="http://schemas.microsoft.com/office/drawing/2010/main" val="0"/>
+              </a:ext>
+            </a:extLst>
+          </a:blip>
+          <a:srcRect/>
+          <a:stretch>
+            <a:fillRect/>
+          </a:stretch>
+        </p:blipFill>
+        <p:spPr bwMode="auto">
+          <a:xfrm>
+            <a:off x="6675851" y="5981178"/>
+            <a:ext cx="2257425" cy="704850"/>
           </a:xfrm>
           <a:prstGeom prst="rect">
             <a:avLst/>
@@ -7927,6 +8098,13 @@
         <p:txBody>
           <a:bodyPr vert="horz" lIns="0" tIns="0" rIns="0" bIns="0" rtlCol="0">
             <a:noAutofit/>
+            <a:scene3d>
+              <a:camera prst="orthographicFront"/>
+              <a:lightRig rig="threePt" dir="t"/>
+            </a:scene3d>
+            <a:sp3d prstMaterial="metal">
+              <a:bevelT w="133350" h="57150"/>
+            </a:sp3d>
           </a:bodyPr>
           <a:lstStyle>
             <a:lvl1pPr marL="342900" indent="-342900" algn="l" defTabSz="914400" rtl="0" eaLnBrk="1" latinLnBrk="0" hangingPunct="1">
@@ -8254,9 +8432,426 @@
   <p:timing>
     <p:tnLst>
       <p:par>
-        <p:cTn id="1" dur="indefinite" restart="never" nodeType="tmRoot"/>
+        <p:cTn id="1" dur="indefinite" restart="never" nodeType="tmRoot">
+          <p:childTnLst>
+            <p:seq concurrent="1" nextAc="seek">
+              <p:cTn id="2" dur="indefinite" nodeType="mainSeq">
+                <p:childTnLst>
+                  <p:par>
+                    <p:cTn id="3" fill="hold">
+                      <p:stCondLst>
+                        <p:cond delay="indefinite"/>
+                      </p:stCondLst>
+                      <p:childTnLst>
+                        <p:par>
+                          <p:cTn id="4" fill="hold">
+                            <p:stCondLst>
+                              <p:cond delay="0"/>
+                            </p:stCondLst>
+                            <p:childTnLst>
+                              <p:par>
+                                <p:cTn id="5" presetID="10" presetClass="entr" presetSubtype="0" fill="hold" grpId="0" nodeType="clickEffect">
+                                  <p:stCondLst>
+                                    <p:cond delay="0"/>
+                                  </p:stCondLst>
+                                  <p:childTnLst>
+                                    <p:set>
+                                      <p:cBhvr>
+                                        <p:cTn id="6" dur="1" fill="hold">
+                                          <p:stCondLst>
+                                            <p:cond delay="0"/>
+                                          </p:stCondLst>
+                                        </p:cTn>
+                                        <p:tgtEl>
+                                          <p:spTgt spid="3">
+                                            <p:txEl>
+                                              <p:pRg st="0" end="0"/>
+                                            </p:txEl>
+                                          </p:spTgt>
+                                        </p:tgtEl>
+                                        <p:attrNameLst>
+                                          <p:attrName>style.visibility</p:attrName>
+                                        </p:attrNameLst>
+                                      </p:cBhvr>
+                                      <p:to>
+                                        <p:strVal val="visible"/>
+                                      </p:to>
+                                    </p:set>
+                                    <p:animEffect transition="in" filter="fade">
+                                      <p:cBhvr>
+                                        <p:cTn id="7" dur="500"/>
+                                        <p:tgtEl>
+                                          <p:spTgt spid="3">
+                                            <p:txEl>
+                                              <p:pRg st="0" end="0"/>
+                                            </p:txEl>
+                                          </p:spTgt>
+                                        </p:tgtEl>
+                                      </p:cBhvr>
+                                    </p:animEffect>
+                                  </p:childTnLst>
+                                </p:cTn>
+                              </p:par>
+                            </p:childTnLst>
+                          </p:cTn>
+                        </p:par>
+                      </p:childTnLst>
+                    </p:cTn>
+                  </p:par>
+                  <p:par>
+                    <p:cTn id="8" fill="hold">
+                      <p:stCondLst>
+                        <p:cond delay="indefinite"/>
+                      </p:stCondLst>
+                      <p:childTnLst>
+                        <p:par>
+                          <p:cTn id="9" fill="hold">
+                            <p:stCondLst>
+                              <p:cond delay="0"/>
+                            </p:stCondLst>
+                            <p:childTnLst>
+                              <p:par>
+                                <p:cTn id="10" presetID="10" presetClass="entr" presetSubtype="0" fill="hold" grpId="0" nodeType="clickEffect">
+                                  <p:stCondLst>
+                                    <p:cond delay="0"/>
+                                  </p:stCondLst>
+                                  <p:childTnLst>
+                                    <p:set>
+                                      <p:cBhvr>
+                                        <p:cTn id="11" dur="1" fill="hold">
+                                          <p:stCondLst>
+                                            <p:cond delay="0"/>
+                                          </p:stCondLst>
+                                        </p:cTn>
+                                        <p:tgtEl>
+                                          <p:spTgt spid="3">
+                                            <p:txEl>
+                                              <p:pRg st="1" end="1"/>
+                                            </p:txEl>
+                                          </p:spTgt>
+                                        </p:tgtEl>
+                                        <p:attrNameLst>
+                                          <p:attrName>style.visibility</p:attrName>
+                                        </p:attrNameLst>
+                                      </p:cBhvr>
+                                      <p:to>
+                                        <p:strVal val="visible"/>
+                                      </p:to>
+                                    </p:set>
+                                    <p:animEffect transition="in" filter="fade">
+                                      <p:cBhvr>
+                                        <p:cTn id="12" dur="500"/>
+                                        <p:tgtEl>
+                                          <p:spTgt spid="3">
+                                            <p:txEl>
+                                              <p:pRg st="1" end="1"/>
+                                            </p:txEl>
+                                          </p:spTgt>
+                                        </p:tgtEl>
+                                      </p:cBhvr>
+                                    </p:animEffect>
+                                  </p:childTnLst>
+                                </p:cTn>
+                              </p:par>
+                            </p:childTnLst>
+                          </p:cTn>
+                        </p:par>
+                      </p:childTnLst>
+                    </p:cTn>
+                  </p:par>
+                  <p:par>
+                    <p:cTn id="13" fill="hold">
+                      <p:stCondLst>
+                        <p:cond delay="indefinite"/>
+                      </p:stCondLst>
+                      <p:childTnLst>
+                        <p:par>
+                          <p:cTn id="14" fill="hold">
+                            <p:stCondLst>
+                              <p:cond delay="0"/>
+                            </p:stCondLst>
+                            <p:childTnLst>
+                              <p:par>
+                                <p:cTn id="15" presetID="10" presetClass="entr" presetSubtype="0" fill="hold" grpId="0" nodeType="clickEffect">
+                                  <p:stCondLst>
+                                    <p:cond delay="0"/>
+                                  </p:stCondLst>
+                                  <p:childTnLst>
+                                    <p:set>
+                                      <p:cBhvr>
+                                        <p:cTn id="16" dur="1" fill="hold">
+                                          <p:stCondLst>
+                                            <p:cond delay="0"/>
+                                          </p:stCondLst>
+                                        </p:cTn>
+                                        <p:tgtEl>
+                                          <p:spTgt spid="3">
+                                            <p:txEl>
+                                              <p:pRg st="2" end="2"/>
+                                            </p:txEl>
+                                          </p:spTgt>
+                                        </p:tgtEl>
+                                        <p:attrNameLst>
+                                          <p:attrName>style.visibility</p:attrName>
+                                        </p:attrNameLst>
+                                      </p:cBhvr>
+                                      <p:to>
+                                        <p:strVal val="visible"/>
+                                      </p:to>
+                                    </p:set>
+                                    <p:animEffect transition="in" filter="fade">
+                                      <p:cBhvr>
+                                        <p:cTn id="17" dur="500"/>
+                                        <p:tgtEl>
+                                          <p:spTgt spid="3">
+                                            <p:txEl>
+                                              <p:pRg st="2" end="2"/>
+                                            </p:txEl>
+                                          </p:spTgt>
+                                        </p:tgtEl>
+                                      </p:cBhvr>
+                                    </p:animEffect>
+                                  </p:childTnLst>
+                                </p:cTn>
+                              </p:par>
+                            </p:childTnLst>
+                          </p:cTn>
+                        </p:par>
+                      </p:childTnLst>
+                    </p:cTn>
+                  </p:par>
+                  <p:par>
+                    <p:cTn id="18" fill="hold">
+                      <p:stCondLst>
+                        <p:cond delay="indefinite"/>
+                      </p:stCondLst>
+                      <p:childTnLst>
+                        <p:par>
+                          <p:cTn id="19" fill="hold">
+                            <p:stCondLst>
+                              <p:cond delay="0"/>
+                            </p:stCondLst>
+                            <p:childTnLst>
+                              <p:par>
+                                <p:cTn id="20" presetID="10" presetClass="entr" presetSubtype="0" fill="hold" grpId="0" nodeType="clickEffect">
+                                  <p:stCondLst>
+                                    <p:cond delay="0"/>
+                                  </p:stCondLst>
+                                  <p:childTnLst>
+                                    <p:set>
+                                      <p:cBhvr>
+                                        <p:cTn id="21" dur="1" fill="hold">
+                                          <p:stCondLst>
+                                            <p:cond delay="0"/>
+                                          </p:stCondLst>
+                                        </p:cTn>
+                                        <p:tgtEl>
+                                          <p:spTgt spid="3">
+                                            <p:txEl>
+                                              <p:pRg st="3" end="3"/>
+                                            </p:txEl>
+                                          </p:spTgt>
+                                        </p:tgtEl>
+                                        <p:attrNameLst>
+                                          <p:attrName>style.visibility</p:attrName>
+                                        </p:attrNameLst>
+                                      </p:cBhvr>
+                                      <p:to>
+                                        <p:strVal val="visible"/>
+                                      </p:to>
+                                    </p:set>
+                                    <p:animEffect transition="in" filter="fade">
+                                      <p:cBhvr>
+                                        <p:cTn id="22" dur="500"/>
+                                        <p:tgtEl>
+                                          <p:spTgt spid="3">
+                                            <p:txEl>
+                                              <p:pRg st="3" end="3"/>
+                                            </p:txEl>
+                                          </p:spTgt>
+                                        </p:tgtEl>
+                                      </p:cBhvr>
+                                    </p:animEffect>
+                                  </p:childTnLst>
+                                </p:cTn>
+                              </p:par>
+                            </p:childTnLst>
+                          </p:cTn>
+                        </p:par>
+                      </p:childTnLst>
+                    </p:cTn>
+                  </p:par>
+                  <p:par>
+                    <p:cTn id="23" fill="hold">
+                      <p:stCondLst>
+                        <p:cond delay="indefinite"/>
+                      </p:stCondLst>
+                      <p:childTnLst>
+                        <p:par>
+                          <p:cTn id="24" fill="hold">
+                            <p:stCondLst>
+                              <p:cond delay="0"/>
+                            </p:stCondLst>
+                            <p:childTnLst>
+                              <p:par>
+                                <p:cTn id="25" presetID="10" presetClass="entr" presetSubtype="0" fill="hold" grpId="0" nodeType="clickEffect">
+                                  <p:stCondLst>
+                                    <p:cond delay="0"/>
+                                  </p:stCondLst>
+                                  <p:childTnLst>
+                                    <p:set>
+                                      <p:cBhvr>
+                                        <p:cTn id="26" dur="1" fill="hold">
+                                          <p:stCondLst>
+                                            <p:cond delay="0"/>
+                                          </p:stCondLst>
+                                        </p:cTn>
+                                        <p:tgtEl>
+                                          <p:spTgt spid="3">
+                                            <p:txEl>
+                                              <p:pRg st="4" end="4"/>
+                                            </p:txEl>
+                                          </p:spTgt>
+                                        </p:tgtEl>
+                                        <p:attrNameLst>
+                                          <p:attrName>style.visibility</p:attrName>
+                                        </p:attrNameLst>
+                                      </p:cBhvr>
+                                      <p:to>
+                                        <p:strVal val="visible"/>
+                                      </p:to>
+                                    </p:set>
+                                    <p:animEffect transition="in" filter="fade">
+                                      <p:cBhvr>
+                                        <p:cTn id="27" dur="500"/>
+                                        <p:tgtEl>
+                                          <p:spTgt spid="3">
+                                            <p:txEl>
+                                              <p:pRg st="4" end="4"/>
+                                            </p:txEl>
+                                          </p:spTgt>
+                                        </p:tgtEl>
+                                      </p:cBhvr>
+                                    </p:animEffect>
+                                  </p:childTnLst>
+                                </p:cTn>
+                              </p:par>
+                              <p:par>
+                                <p:cTn id="28" presetID="10" presetClass="entr" presetSubtype="0" fill="hold" grpId="0" nodeType="withEffect">
+                                  <p:stCondLst>
+                                    <p:cond delay="0"/>
+                                  </p:stCondLst>
+                                  <p:childTnLst>
+                                    <p:set>
+                                      <p:cBhvr>
+                                        <p:cTn id="29" dur="1" fill="hold">
+                                          <p:stCondLst>
+                                            <p:cond delay="0"/>
+                                          </p:stCondLst>
+                                        </p:cTn>
+                                        <p:tgtEl>
+                                          <p:spTgt spid="3">
+                                            <p:txEl>
+                                              <p:pRg st="5" end="5"/>
+                                            </p:txEl>
+                                          </p:spTgt>
+                                        </p:tgtEl>
+                                        <p:attrNameLst>
+                                          <p:attrName>style.visibility</p:attrName>
+                                        </p:attrNameLst>
+                                      </p:cBhvr>
+                                      <p:to>
+                                        <p:strVal val="visible"/>
+                                      </p:to>
+                                    </p:set>
+                                    <p:animEffect transition="in" filter="fade">
+                                      <p:cBhvr>
+                                        <p:cTn id="30" dur="500"/>
+                                        <p:tgtEl>
+                                          <p:spTgt spid="3">
+                                            <p:txEl>
+                                              <p:pRg st="5" end="5"/>
+                                            </p:txEl>
+                                          </p:spTgt>
+                                        </p:tgtEl>
+                                      </p:cBhvr>
+                                    </p:animEffect>
+                                  </p:childTnLst>
+                                </p:cTn>
+                              </p:par>
+                              <p:par>
+                                <p:cTn id="31" presetID="10" presetClass="entr" presetSubtype="0" fill="hold" grpId="0" nodeType="withEffect">
+                                  <p:stCondLst>
+                                    <p:cond delay="0"/>
+                                  </p:stCondLst>
+                                  <p:childTnLst>
+                                    <p:set>
+                                      <p:cBhvr>
+                                        <p:cTn id="32" dur="1" fill="hold">
+                                          <p:stCondLst>
+                                            <p:cond delay="0"/>
+                                          </p:stCondLst>
+                                        </p:cTn>
+                                        <p:tgtEl>
+                                          <p:spTgt spid="3">
+                                            <p:txEl>
+                                              <p:pRg st="6" end="6"/>
+                                            </p:txEl>
+                                          </p:spTgt>
+                                        </p:tgtEl>
+                                        <p:attrNameLst>
+                                          <p:attrName>style.visibility</p:attrName>
+                                        </p:attrNameLst>
+                                      </p:cBhvr>
+                                      <p:to>
+                                        <p:strVal val="visible"/>
+                                      </p:to>
+                                    </p:set>
+                                    <p:animEffect transition="in" filter="fade">
+                                      <p:cBhvr>
+                                        <p:cTn id="33" dur="500"/>
+                                        <p:tgtEl>
+                                          <p:spTgt spid="3">
+                                            <p:txEl>
+                                              <p:pRg st="6" end="6"/>
+                                            </p:txEl>
+                                          </p:spTgt>
+                                        </p:tgtEl>
+                                      </p:cBhvr>
+                                    </p:animEffect>
+                                  </p:childTnLst>
+                                </p:cTn>
+                              </p:par>
+                            </p:childTnLst>
+                          </p:cTn>
+                        </p:par>
+                      </p:childTnLst>
+                    </p:cTn>
+                  </p:par>
+                </p:childTnLst>
+              </p:cTn>
+              <p:prevCondLst>
+                <p:cond evt="onPrev" delay="0">
+                  <p:tgtEl>
+                    <p:sldTgt/>
+                  </p:tgtEl>
+                </p:cond>
+              </p:prevCondLst>
+              <p:nextCondLst>
+                <p:cond evt="onNext" delay="0">
+                  <p:tgtEl>
+                    <p:sldTgt/>
+                  </p:tgtEl>
+                </p:cond>
+              </p:nextCondLst>
+            </p:seq>
+          </p:childTnLst>
+        </p:cTn>
       </p:par>
     </p:tnLst>
+    <p:bldLst>
+      <p:bldP spid="3" grpId="0" uiExpand="1" build="p"/>
+    </p:bldLst>
   </p:timing>
 </p:sld>
 </file>

</xml_diff>